<commit_message>
[1803] Update issue lifecycle diagram to reflect github
Fixes #1803
</commit_message>
<xml_diff>
--- a/doc/diagrams/IssueLifecycle.pptx
+++ b/doc/diagrams/IssueLifecycle.pptx
@@ -192,7 +192,7 @@
           <a:p>
             <a:fld id="{EB56B9F1-9881-483D-AC17-B3C6E9A32E68}" type="datetimeFigureOut">
               <a:rPr lang="en-SG" smtClean="0"/>
-              <a:t>18/12/2012</a:t>
+              <a:t>5/5/2014</a:t>
             </a:fld>
             <a:endParaRPr lang="en-SG"/>
           </a:p>
@@ -731,7 +731,7 @@
             <a:fld id="{1D8BD707-D9CF-40AE-B4C6-C98DA3205C09}" type="datetimeFigureOut">
               <a:rPr lang="en-US" smtClean="0"/>
               <a:pPr/>
-              <a:t>12/18/2012</a:t>
+              <a:t>5/5/2014</a:t>
             </a:fld>
             <a:endParaRPr lang="en-US"/>
           </a:p>
@@ -898,7 +898,7 @@
             <a:fld id="{1D8BD707-D9CF-40AE-B4C6-C98DA3205C09}" type="datetimeFigureOut">
               <a:rPr lang="en-US" smtClean="0"/>
               <a:pPr/>
-              <a:t>12/18/2012</a:t>
+              <a:t>5/5/2014</a:t>
             </a:fld>
             <a:endParaRPr lang="en-US"/>
           </a:p>
@@ -1075,7 +1075,7 @@
             <a:fld id="{1D8BD707-D9CF-40AE-B4C6-C98DA3205C09}" type="datetimeFigureOut">
               <a:rPr lang="en-US" smtClean="0"/>
               <a:pPr/>
-              <a:t>12/18/2012</a:t>
+              <a:t>5/5/2014</a:t>
             </a:fld>
             <a:endParaRPr lang="en-US"/>
           </a:p>
@@ -1242,7 +1242,7 @@
             <a:fld id="{1D8BD707-D9CF-40AE-B4C6-C98DA3205C09}" type="datetimeFigureOut">
               <a:rPr lang="en-US" smtClean="0"/>
               <a:pPr/>
-              <a:t>12/18/2012</a:t>
+              <a:t>5/5/2014</a:t>
             </a:fld>
             <a:endParaRPr lang="en-US"/>
           </a:p>
@@ -1485,7 +1485,7 @@
             <a:fld id="{1D8BD707-D9CF-40AE-B4C6-C98DA3205C09}" type="datetimeFigureOut">
               <a:rPr lang="en-US" smtClean="0"/>
               <a:pPr/>
-              <a:t>12/18/2012</a:t>
+              <a:t>5/5/2014</a:t>
             </a:fld>
             <a:endParaRPr lang="en-US"/>
           </a:p>
@@ -1770,7 +1770,7 @@
             <a:fld id="{1D8BD707-D9CF-40AE-B4C6-C98DA3205C09}" type="datetimeFigureOut">
               <a:rPr lang="en-US" smtClean="0"/>
               <a:pPr/>
-              <a:t>12/18/2012</a:t>
+              <a:t>5/5/2014</a:t>
             </a:fld>
             <a:endParaRPr lang="en-US"/>
           </a:p>
@@ -2189,7 +2189,7 @@
             <a:fld id="{1D8BD707-D9CF-40AE-B4C6-C98DA3205C09}" type="datetimeFigureOut">
               <a:rPr lang="en-US" smtClean="0"/>
               <a:pPr/>
-              <a:t>12/18/2012</a:t>
+              <a:t>5/5/2014</a:t>
             </a:fld>
             <a:endParaRPr lang="en-US"/>
           </a:p>
@@ -2304,7 +2304,7 @@
             <a:fld id="{1D8BD707-D9CF-40AE-B4C6-C98DA3205C09}" type="datetimeFigureOut">
               <a:rPr lang="en-US" smtClean="0"/>
               <a:pPr/>
-              <a:t>12/18/2012</a:t>
+              <a:t>5/5/2014</a:t>
             </a:fld>
             <a:endParaRPr lang="en-US"/>
           </a:p>
@@ -2396,7 +2396,7 @@
             <a:fld id="{1D8BD707-D9CF-40AE-B4C6-C98DA3205C09}" type="datetimeFigureOut">
               <a:rPr lang="en-US" smtClean="0"/>
               <a:pPr/>
-              <a:t>12/18/2012</a:t>
+              <a:t>5/5/2014</a:t>
             </a:fld>
             <a:endParaRPr lang="en-US"/>
           </a:p>
@@ -2670,7 +2670,7 @@
             <a:fld id="{1D8BD707-D9CF-40AE-B4C6-C98DA3205C09}" type="datetimeFigureOut">
               <a:rPr lang="en-US" smtClean="0"/>
               <a:pPr/>
-              <a:t>12/18/2012</a:t>
+              <a:t>5/5/2014</a:t>
             </a:fld>
             <a:endParaRPr lang="en-US"/>
           </a:p>
@@ -2920,7 +2920,7 @@
             <a:fld id="{1D8BD707-D9CF-40AE-B4C6-C98DA3205C09}" type="datetimeFigureOut">
               <a:rPr lang="en-US" smtClean="0"/>
               <a:pPr/>
-              <a:t>12/18/2012</a:t>
+              <a:t>5/5/2014</a:t>
             </a:fld>
             <a:endParaRPr lang="en-US"/>
           </a:p>
@@ -3130,7 +3130,7 @@
             <a:fld id="{1D8BD707-D9CF-40AE-B4C6-C98DA3205C09}" type="datetimeFigureOut">
               <a:rPr lang="en-US" smtClean="0"/>
               <a:pPr/>
-              <a:t>12/18/2012</a:t>
+              <a:t>5/5/2014</a:t>
             </a:fld>
             <a:endParaRPr lang="en-US"/>
           </a:p>
@@ -3509,8 +3509,8 @@
         </p:nvSpPr>
         <p:spPr>
           <a:xfrm>
-            <a:off x="1050649" y="939107"/>
-            <a:ext cx="1053581" cy="228600"/>
+            <a:off x="1431925" y="177911"/>
+            <a:ext cx="1219476" cy="228600"/>
           </a:xfrm>
           <a:prstGeom prst="roundRect">
             <a:avLst>
@@ -3543,7 +3543,17 @@
           <a:p>
             <a:pPr algn="ctr"/>
             <a:r>
-              <a:rPr lang="en-US" sz="1400" b="1" dirty="0" smtClean="0">
+              <a:rPr lang="en-US" sz="1400" dirty="0" err="1" smtClean="0">
+                <a:solidFill>
+                  <a:srgbClr val="00B050"/>
+                </a:solidFill>
+                <a:latin typeface="Consolas" pitchFamily="49" charset="0"/>
+                <a:cs typeface="Consolas" pitchFamily="49" charset="0"/>
+              </a:rPr>
+              <a:t>s.</a:t>
+            </a:r>
+            <a:r>
+              <a:rPr lang="en-US" sz="1400" b="1" dirty="0" err="1" smtClean="0">
                 <a:solidFill>
                   <a:srgbClr val="00B050"/>
                 </a:solidFill>
@@ -3600,67 +3610,6 @@
       </p:cxnSp>
       <p:sp>
         <p:nvSpPr>
-          <p:cNvPr id="137" name="Rounded Rectangle 136"/>
-          <p:cNvSpPr/>
-          <p:nvPr/>
-        </p:nvSpPr>
-        <p:spPr>
-          <a:xfrm>
-            <a:off x="1967633" y="341950"/>
-            <a:ext cx="898597" cy="297780"/>
-          </a:xfrm>
-          <a:prstGeom prst="roundRect">
-            <a:avLst>
-              <a:gd name="adj" fmla="val 9190"/>
-            </a:avLst>
-          </a:prstGeom>
-          <a:ln>
-            <a:solidFill>
-              <a:srgbClr val="00B050"/>
-            </a:solidFill>
-          </a:ln>
-        </p:spPr>
-        <p:style>
-          <a:lnRef idx="2">
-            <a:schemeClr val="accent2"/>
-          </a:lnRef>
-          <a:fillRef idx="1">
-            <a:schemeClr val="lt1"/>
-          </a:fillRef>
-          <a:effectRef idx="0">
-            <a:schemeClr val="accent2"/>
-          </a:effectRef>
-          <a:fontRef idx="minor">
-            <a:schemeClr val="dk1"/>
-          </a:fontRef>
-        </p:style>
-        <p:txBody>
-          <a:bodyPr vert="horz" rtlCol="0" anchor="ctr" anchorCtr="0"/>
-          <a:lstStyle/>
-          <a:p>
-            <a:pPr algn="ctr"/>
-            <a:r>
-              <a:rPr lang="en-US" sz="1400" b="1" dirty="0" smtClean="0">
-                <a:solidFill>
-                  <a:srgbClr val="00B050"/>
-                </a:solidFill>
-                <a:latin typeface="Consolas" pitchFamily="49" charset="0"/>
-                <a:cs typeface="Consolas" pitchFamily="49" charset="0"/>
-              </a:rPr>
-              <a:t>Started</a:t>
-            </a:r>
-            <a:endParaRPr lang="en-US" sz="1400" b="1" dirty="0" smtClean="0">
-              <a:solidFill>
-                <a:srgbClr val="00B050"/>
-              </a:solidFill>
-              <a:latin typeface="Consolas" pitchFamily="49" charset="0"/>
-              <a:cs typeface="Consolas" pitchFamily="49" charset="0"/>
-            </a:endParaRPr>
-          </a:p>
-        </p:txBody>
-      </p:sp>
-      <p:sp>
-        <p:nvSpPr>
           <p:cNvPr id="138" name="Rounded Rectangle 137"/>
           <p:cNvSpPr/>
           <p:nvPr/>
@@ -3668,7 +3617,7 @@
         <p:spPr>
           <a:xfrm>
             <a:off x="1355449" y="2128528"/>
-            <a:ext cx="2806182" cy="274102"/>
+            <a:ext cx="3962676" cy="274102"/>
           </a:xfrm>
           <a:prstGeom prst="roundRect">
             <a:avLst>
@@ -3703,6 +3652,30 @@
           <a:p>
             <a:pPr algn="ctr"/>
             <a:r>
+              <a:rPr lang="en-US" sz="1400" dirty="0" err="1" smtClean="0">
+                <a:solidFill>
+                  <a:schemeClr val="bg1">
+                    <a:lumMod val="50000"/>
+                  </a:schemeClr>
+                </a:solidFill>
+                <a:latin typeface="Consolas" pitchFamily="49" charset="0"/>
+                <a:cs typeface="Consolas" pitchFamily="49" charset="0"/>
+              </a:rPr>
+              <a:t>s.</a:t>
+            </a:r>
+            <a:r>
+              <a:rPr lang="en-US" sz="1400" b="1" dirty="0" err="1" smtClean="0">
+                <a:solidFill>
+                  <a:schemeClr val="bg1">
+                    <a:lumMod val="50000"/>
+                  </a:schemeClr>
+                </a:solidFill>
+                <a:latin typeface="Consolas" pitchFamily="49" charset="0"/>
+                <a:cs typeface="Consolas" pitchFamily="49" charset="0"/>
+              </a:rPr>
+              <a:t>Invalid</a:t>
+            </a:r>
+            <a:r>
               <a:rPr lang="en-US" sz="1400" b="1" dirty="0" smtClean="0">
                 <a:solidFill>
                   <a:schemeClr val="bg1">
@@ -3712,7 +3685,19 @@
                 <a:latin typeface="Consolas" pitchFamily="49" charset="0"/>
                 <a:cs typeface="Consolas" pitchFamily="49" charset="0"/>
               </a:rPr>
-              <a:t>Invalid/</a:t>
+              <a:t>/</a:t>
+            </a:r>
+            <a:r>
+              <a:rPr lang="en-US" sz="1400" dirty="0" err="1" smtClean="0">
+                <a:solidFill>
+                  <a:schemeClr val="bg1">
+                    <a:lumMod val="50000"/>
+                  </a:schemeClr>
+                </a:solidFill>
+                <a:latin typeface="Consolas" pitchFamily="49" charset="0"/>
+                <a:cs typeface="Consolas" pitchFamily="49" charset="0"/>
+              </a:rPr>
+              <a:t>s.</a:t>
             </a:r>
             <a:r>
               <a:rPr lang="en-US" sz="1400" b="1" dirty="0" err="1" smtClean="0">
@@ -3736,7 +3721,31 @@
                 <a:latin typeface="Consolas" pitchFamily="49" charset="0"/>
                 <a:cs typeface="Consolas" pitchFamily="49" charset="0"/>
               </a:rPr>
-              <a:t>/Duplicate</a:t>
+              <a:t>/</a:t>
+            </a:r>
+            <a:r>
+              <a:rPr lang="en-US" sz="1400" dirty="0" err="1" smtClean="0">
+                <a:solidFill>
+                  <a:schemeClr val="bg1">
+                    <a:lumMod val="50000"/>
+                  </a:schemeClr>
+                </a:solidFill>
+                <a:latin typeface="Consolas" pitchFamily="49" charset="0"/>
+                <a:cs typeface="Consolas" pitchFamily="49" charset="0"/>
+              </a:rPr>
+              <a:t>s.</a:t>
+            </a:r>
+            <a:r>
+              <a:rPr lang="en-US" sz="1400" b="1" dirty="0" err="1" smtClean="0">
+                <a:solidFill>
+                  <a:schemeClr val="bg1">
+                    <a:lumMod val="50000"/>
+                  </a:schemeClr>
+                </a:solidFill>
+                <a:latin typeface="Consolas" pitchFamily="49" charset="0"/>
+                <a:cs typeface="Consolas" pitchFamily="49" charset="0"/>
+              </a:rPr>
+              <a:t>Duplicate</a:t>
             </a:r>
             <a:endParaRPr lang="en-US" sz="1400" b="1" dirty="0" smtClean="0">
               <a:solidFill>
@@ -3758,8 +3767,8 @@
         </p:nvSpPr>
         <p:spPr>
           <a:xfrm>
-            <a:off x="5076031" y="341950"/>
-            <a:ext cx="1396696" cy="297780"/>
+            <a:off x="4937125" y="153194"/>
+            <a:ext cx="1600200" cy="297780"/>
           </a:xfrm>
           <a:prstGeom prst="roundRect">
             <a:avLst>
@@ -3794,6 +3803,18 @@
           <a:p>
             <a:pPr algn="ctr"/>
             <a:r>
+              <a:rPr lang="en-US" sz="1400" dirty="0" err="1" smtClean="0">
+                <a:solidFill>
+                  <a:schemeClr val="accent6">
+                    <a:lumMod val="75000"/>
+                  </a:schemeClr>
+                </a:solidFill>
+                <a:latin typeface="Consolas" pitchFamily="49" charset="0"/>
+                <a:cs typeface="Consolas" pitchFamily="49" charset="0"/>
+              </a:rPr>
+              <a:t>s.</a:t>
+            </a:r>
+            <a:r>
               <a:rPr lang="en-US" sz="1400" b="1" dirty="0" err="1" smtClean="0">
                 <a:solidFill>
                   <a:schemeClr val="accent6">
@@ -3825,7 +3846,7 @@
         </p:nvSpPr>
         <p:spPr>
           <a:xfrm>
-            <a:off x="46831" y="1559384"/>
+            <a:off x="46831" y="1289470"/>
             <a:ext cx="159420" cy="159420"/>
           </a:xfrm>
           <a:prstGeom prst="flowChartConnector">
@@ -3873,7 +3894,7 @@
         </p:nvSpPr>
         <p:spPr>
           <a:xfrm>
-            <a:off x="6205592" y="1600994"/>
+            <a:off x="6308724" y="1382183"/>
             <a:ext cx="1066801" cy="228600"/>
           </a:xfrm>
           <a:prstGeom prst="roundRect">
@@ -3914,7 +3935,7 @@
                 <a:latin typeface="Consolas" pitchFamily="49" charset="0"/>
                 <a:cs typeface="Consolas" pitchFamily="49" charset="0"/>
               </a:rPr>
-              <a:t>Deployed</a:t>
+              <a:t>Closed</a:t>
             </a:r>
             <a:endParaRPr lang="en-US" sz="1400" b="1" dirty="0" smtClean="0">
               <a:solidFill>
@@ -3934,7 +3955,7 @@
         </p:nvGrpSpPr>
         <p:grpSpPr>
           <a:xfrm>
-            <a:off x="6630993" y="2157579"/>
+            <a:off x="6736223" y="2157579"/>
             <a:ext cx="216000" cy="216000"/>
             <a:chOff x="6834497" y="2146994"/>
             <a:chExt cx="216000" cy="216000"/>
@@ -4045,8 +4066,8 @@
         </p:nvCxnSpPr>
         <p:spPr>
           <a:xfrm>
-            <a:off x="4390231" y="644984"/>
-            <a:ext cx="0" cy="810630"/>
+            <a:off x="4237831" y="480967"/>
+            <a:ext cx="0" cy="974647"/>
           </a:xfrm>
           <a:prstGeom prst="straightConnector1">
             <a:avLst/>
@@ -4057,88 +4078,8 @@
                 <a:lumMod val="75000"/>
               </a:schemeClr>
             </a:solidFill>
-            <a:headEnd type="none" w="med" len="med"/>
-            <a:tailEnd type="triangle" w="med" len="med"/>
-          </a:ln>
-        </p:spPr>
-        <p:style>
-          <a:lnRef idx="1">
-            <a:schemeClr val="accent1"/>
-          </a:lnRef>
-          <a:fillRef idx="0">
-            <a:schemeClr val="accent1"/>
-          </a:fillRef>
-          <a:effectRef idx="0">
-            <a:schemeClr val="accent1"/>
-          </a:effectRef>
-          <a:fontRef idx="minor">
-            <a:schemeClr val="tx1"/>
-          </a:fontRef>
-        </p:style>
-      </p:cxnSp>
-      <p:cxnSp>
-        <p:nvCxnSpPr>
-          <p:cNvPr id="147" name="Curved Connector 146"/>
-          <p:cNvCxnSpPr>
-            <a:stCxn id="135" idx="0"/>
-            <a:endCxn id="137" idx="1"/>
-          </p:cNvCxnSpPr>
-          <p:nvPr/>
-        </p:nvCxnSpPr>
-        <p:spPr>
-          <a:xfrm rot="5400000" flipH="1" flipV="1">
-            <a:off x="1548403" y="519878"/>
-            <a:ext cx="448267" cy="390193"/>
-          </a:xfrm>
-          <a:prstGeom prst="curvedConnector2">
-            <a:avLst/>
-          </a:prstGeom>
-          <a:ln w="28575">
-            <a:solidFill>
-              <a:srgbClr val="00B050"/>
-            </a:solidFill>
-            <a:headEnd type="none" w="med" len="med"/>
-            <a:tailEnd type="triangle" w="med" len="med"/>
-          </a:ln>
-        </p:spPr>
-        <p:style>
-          <a:lnRef idx="1">
-            <a:schemeClr val="accent1"/>
-          </a:lnRef>
-          <a:fillRef idx="0">
-            <a:schemeClr val="accent1"/>
-          </a:fillRef>
-          <a:effectRef idx="0">
-            <a:schemeClr val="accent1"/>
-          </a:effectRef>
-          <a:fontRef idx="minor">
-            <a:schemeClr val="tx1"/>
-          </a:fontRef>
-        </p:style>
-      </p:cxnSp>
-      <p:cxnSp>
-        <p:nvCxnSpPr>
-          <p:cNvPr id="148" name="Straight Arrow Connector 147"/>
-          <p:cNvCxnSpPr>
-            <a:stCxn id="137" idx="3"/>
-            <a:endCxn id="177" idx="1"/>
-          </p:cNvCxnSpPr>
-          <p:nvPr/>
-        </p:nvCxnSpPr>
-        <p:spPr>
-          <a:xfrm>
-            <a:off x="2866230" y="490840"/>
-            <a:ext cx="304801" cy="0"/>
-          </a:xfrm>
-          <a:prstGeom prst="straightConnector1">
-            <a:avLst/>
-          </a:prstGeom>
-          <a:ln w="28575">
-            <a:solidFill>
-              <a:srgbClr val="00B050"/>
-            </a:solidFill>
-            <a:headEnd type="none" w="med" len="med"/>
-            <a:tailEnd type="triangle" w="med" len="med"/>
+            <a:headEnd type="triangle" w="med" len="med"/>
+            <a:tailEnd type="none" w="med" len="med"/>
           </a:ln>
         </p:spPr>
         <p:style>
@@ -4161,13 +4102,12 @@
           <p:cNvPr id="149" name="Straight Arrow Connector 148"/>
           <p:cNvCxnSpPr>
             <a:stCxn id="177" idx="3"/>
-            <a:endCxn id="139" idx="1"/>
           </p:cNvCxnSpPr>
           <p:nvPr/>
         </p:nvCxnSpPr>
         <p:spPr>
           <a:xfrm>
-            <a:off x="4847431" y="490840"/>
+            <a:off x="4695031" y="302084"/>
             <a:ext cx="228600" cy="0"/>
           </a:xfrm>
           <a:prstGeom prst="straightConnector1">
@@ -4206,8 +4146,8 @@
         </p:nvCxnSpPr>
         <p:spPr>
           <a:xfrm flipV="1">
-            <a:off x="3552031" y="648094"/>
-            <a:ext cx="0" cy="807520"/>
+            <a:off x="3399631" y="450974"/>
+            <a:ext cx="0" cy="1004640"/>
           </a:xfrm>
           <a:prstGeom prst="straightConnector1">
             <a:avLst/>
@@ -4216,8 +4156,8 @@
             <a:solidFill>
               <a:srgbClr val="00B050"/>
             </a:solidFill>
-            <a:headEnd type="none" w="med" len="med"/>
-            <a:tailEnd type="triangle" w="med" len="med"/>
+            <a:headEnd type="triangle" w="med" len="med"/>
+            <a:tailEnd type="none" w="med" len="med"/>
           </a:ln>
         </p:spPr>
         <p:style>
@@ -4240,14 +4180,13 @@
           <p:cNvPr id="151" name="Curved Connector 150"/>
           <p:cNvCxnSpPr>
             <a:stCxn id="139" idx="3"/>
-            <a:endCxn id="140" idx="0"/>
           </p:cNvCxnSpPr>
           <p:nvPr/>
         </p:nvCxnSpPr>
         <p:spPr>
           <a:xfrm>
-            <a:off x="6472727" y="490840"/>
-            <a:ext cx="266700" cy="448267"/>
+            <a:off x="6537325" y="302084"/>
+            <a:ext cx="304800" cy="637023"/>
           </a:xfrm>
           <a:prstGeom prst="curvedConnector2">
             <a:avLst/>
@@ -4286,8 +4225,8 @@
         </p:nvCxnSpPr>
         <p:spPr>
           <a:xfrm rot="5400000">
-            <a:off x="4866618" y="696743"/>
-            <a:ext cx="964774" cy="850748"/>
+            <a:off x="4677463" y="544742"/>
+            <a:ext cx="1153530" cy="965994"/>
           </a:xfrm>
           <a:prstGeom prst="curvedConnector2">
             <a:avLst/>
@@ -4326,8 +4265,8 @@
         </p:nvCxnSpPr>
         <p:spPr>
           <a:xfrm rot="16200000" flipH="1">
-            <a:off x="805022" y="1715151"/>
-            <a:ext cx="512185" cy="588670"/>
+            <a:off x="848334" y="1758464"/>
+            <a:ext cx="671606" cy="342624"/>
           </a:xfrm>
           <a:prstGeom prst="curvedConnector2">
             <a:avLst/>
@@ -4368,8 +4307,8 @@
         </p:nvCxnSpPr>
         <p:spPr>
           <a:xfrm rot="5400000" flipH="1" flipV="1">
-            <a:off x="673021" y="1147166"/>
-            <a:ext cx="471387" cy="283870"/>
+            <a:off x="796584" y="508453"/>
+            <a:ext cx="851583" cy="419100"/>
           </a:xfrm>
           <a:prstGeom prst="curvedConnector2">
             <a:avLst/>
@@ -4401,15 +4340,15 @@
         <p:nvCxnSpPr>
           <p:cNvPr id="173" name="Straight Arrow Connector 172"/>
           <p:cNvCxnSpPr>
-            <a:stCxn id="142" idx="2"/>
+            <a:stCxn id="103" idx="2"/>
             <a:endCxn id="144" idx="0"/>
           </p:cNvCxnSpPr>
           <p:nvPr/>
         </p:nvCxnSpPr>
         <p:spPr>
           <a:xfrm>
-            <a:off x="6738993" y="1829594"/>
-            <a:ext cx="0" cy="327985"/>
+            <a:off x="6842125" y="1970110"/>
+            <a:ext cx="2098" cy="187469"/>
           </a:xfrm>
           <a:prstGeom prst="straightConnector1">
             <a:avLst/>
@@ -4448,8 +4387,8 @@
         </p:nvCxnSpPr>
         <p:spPr>
           <a:xfrm>
-            <a:off x="4161631" y="2265579"/>
-            <a:ext cx="2469362" cy="0"/>
+            <a:off x="5318125" y="2265579"/>
+            <a:ext cx="1418098" cy="0"/>
           </a:xfrm>
           <a:prstGeom prst="straightConnector1">
             <a:avLst/>
@@ -4489,9 +4428,9 @@
           <p:nvPr/>
         </p:nvCxnSpPr>
         <p:spPr>
-          <a:xfrm>
-            <a:off x="206251" y="1639094"/>
-            <a:ext cx="297779" cy="0"/>
+          <a:xfrm flipV="1">
+            <a:off x="206251" y="1368884"/>
+            <a:ext cx="235074" cy="296"/>
           </a:xfrm>
           <a:prstGeom prst="straightConnector1">
             <a:avLst/>
@@ -4523,15 +4462,14 @@
         <p:nvCxnSpPr>
           <p:cNvPr id="176" name="Straight Arrow Connector 175"/>
           <p:cNvCxnSpPr>
-            <a:stCxn id="140" idx="2"/>
             <a:endCxn id="142" idx="0"/>
           </p:cNvCxnSpPr>
           <p:nvPr/>
         </p:nvCxnSpPr>
         <p:spPr>
-          <a:xfrm flipH="1">
-            <a:off x="6738993" y="1167707"/>
-            <a:ext cx="434" cy="433287"/>
+          <a:xfrm>
+            <a:off x="6833056" y="1167707"/>
+            <a:ext cx="9069" cy="214476"/>
           </a:xfrm>
           <a:prstGeom prst="straightConnector1">
             <a:avLst/>
@@ -4567,8 +4505,8 @@
         </p:nvSpPr>
         <p:spPr>
           <a:xfrm>
-            <a:off x="3171031" y="341950"/>
-            <a:ext cx="1676400" cy="297780"/>
+            <a:off x="2879725" y="153194"/>
+            <a:ext cx="1815306" cy="297780"/>
           </a:xfrm>
           <a:prstGeom prst="roundRect">
             <a:avLst>
@@ -4601,6 +4539,16 @@
           <a:p>
             <a:pPr algn="ctr"/>
             <a:r>
+              <a:rPr lang="en-US" sz="1400" dirty="0" err="1" smtClean="0">
+                <a:solidFill>
+                  <a:srgbClr val="00B050"/>
+                </a:solidFill>
+                <a:latin typeface="Consolas" pitchFamily="49" charset="0"/>
+                <a:cs typeface="Consolas" pitchFamily="49" charset="0"/>
+              </a:rPr>
+              <a:t>s.</a:t>
+            </a:r>
+            <a:r>
               <a:rPr lang="en-US" sz="1400" b="1" dirty="0" err="1" smtClean="0">
                 <a:solidFill>
                   <a:srgbClr val="00B050"/>
@@ -4608,7 +4556,7 @@
                 <a:latin typeface="Consolas" pitchFamily="49" charset="0"/>
                 <a:cs typeface="Consolas" pitchFamily="49" charset="0"/>
               </a:rPr>
-              <a:t>ReadyForReview</a:t>
+              <a:t>WorkInProgress</a:t>
             </a:r>
             <a:endParaRPr lang="en-US" sz="1400" b="1" dirty="0" smtClean="0">
               <a:solidFill>
@@ -4628,7 +4576,7 @@
         </p:nvSpPr>
         <p:spPr>
           <a:xfrm>
-            <a:off x="3094831" y="1455614"/>
+            <a:off x="2942431" y="1455614"/>
             <a:ext cx="1828800" cy="297780"/>
           </a:xfrm>
           <a:prstGeom prst="roundRect">
@@ -4638,9 +4586,7 @@
           </a:prstGeom>
           <a:ln>
             <a:solidFill>
-              <a:schemeClr val="accent6">
-                <a:lumMod val="75000"/>
-              </a:schemeClr>
+              <a:srgbClr val="00B050"/>
             </a:solidFill>
           </a:ln>
         </p:spPr>
@@ -4664,22 +4610,28 @@
           <a:p>
             <a:pPr algn="ctr"/>
             <a:r>
-              <a:rPr lang="en-US" sz="1400" b="1" dirty="0" err="1" smtClean="0">
+              <a:rPr lang="en-US" sz="1400" dirty="0" err="1" smtClean="0">
                 <a:solidFill>
-                  <a:schemeClr val="accent6">
-                    <a:lumMod val="75000"/>
-                  </a:schemeClr>
+                  <a:srgbClr val="00B050"/>
                 </a:solidFill>
                 <a:latin typeface="Consolas" pitchFamily="49" charset="0"/>
                 <a:cs typeface="Consolas" pitchFamily="49" charset="0"/>
               </a:rPr>
-              <a:t>ChangesRequested</a:t>
-            </a:r>
-            <a:endParaRPr lang="en-US" sz="1400" b="1" dirty="0" smtClean="0">
+              <a:t>s.</a:t>
+            </a:r>
+            <a:r>
+              <a:rPr lang="en-US" sz="1400" b="1" dirty="0" err="1" smtClean="0">
+                <a:solidFill>
+                  <a:srgbClr val="00B050"/>
+                </a:solidFill>
+                <a:latin typeface="Consolas" pitchFamily="49" charset="0"/>
+                <a:cs typeface="Consolas" pitchFamily="49" charset="0"/>
+              </a:rPr>
+              <a:t>ReadyForReview</a:t>
+            </a:r>
+            <a:endParaRPr lang="en-US" sz="1400" b="1" dirty="0">
               <a:solidFill>
-                <a:schemeClr val="accent6">
-                  <a:lumMod val="75000"/>
-                </a:schemeClr>
+                <a:srgbClr val="00B050"/>
               </a:solidFill>
               <a:latin typeface="Consolas" pitchFamily="49" charset="0"/>
               <a:cs typeface="Consolas" pitchFamily="49" charset="0"/>
@@ -4695,8 +4647,8 @@
         </p:nvSpPr>
         <p:spPr>
           <a:xfrm>
-            <a:off x="504030" y="1524794"/>
-            <a:ext cx="525497" cy="228600"/>
+            <a:off x="441325" y="1143794"/>
+            <a:ext cx="1143000" cy="450179"/>
           </a:xfrm>
           <a:prstGeom prst="roundRect">
             <a:avLst>
@@ -4724,7 +4676,7 @@
           </a:fontRef>
         </p:style>
         <p:txBody>
-          <a:bodyPr vert="horz" rtlCol="0" anchor="ctr" anchorCtr="0"/>
+          <a:bodyPr vert="horz" lIns="0" rIns="0" rtlCol="0" anchor="ctr" anchorCtr="0"/>
           <a:lstStyle/>
           <a:p>
             <a:pPr algn="ctr"/>
@@ -4736,9 +4688,28 @@
                 <a:latin typeface="Consolas" pitchFamily="49" charset="0"/>
                 <a:cs typeface="Consolas" pitchFamily="49" charset="0"/>
               </a:rPr>
-              <a:t>New</a:t>
-            </a:r>
-            <a:endParaRPr lang="en-US" sz="1400" b="1" dirty="0" smtClean="0">
+              <a:t>New </a:t>
+            </a:r>
+            <a:br>
+              <a:rPr lang="en-US" sz="1400" b="1" dirty="0" smtClean="0">
+                <a:solidFill>
+                  <a:schemeClr val="tx1"/>
+                </a:solidFill>
+                <a:latin typeface="Consolas" pitchFamily="49" charset="0"/>
+                <a:cs typeface="Consolas" pitchFamily="49" charset="0"/>
+              </a:rPr>
+            </a:br>
+            <a:r>
+              <a:rPr lang="en-US" sz="1400" dirty="0" smtClean="0">
+                <a:solidFill>
+                  <a:schemeClr val="tx1"/>
+                </a:solidFill>
+                <a:latin typeface="Consolas" pitchFamily="49" charset="0"/>
+                <a:cs typeface="Consolas" pitchFamily="49" charset="0"/>
+              </a:rPr>
+              <a:t>[no status]</a:t>
+            </a:r>
+            <a:endParaRPr lang="en-US" sz="1400" dirty="0" smtClean="0">
               <a:solidFill>
                 <a:schemeClr val="tx1"/>
               </a:solidFill>
@@ -4758,7 +4729,7 @@
         </p:nvGrpSpPr>
         <p:grpSpPr>
           <a:xfrm>
-            <a:off x="2524870" y="757722"/>
+            <a:off x="3561681" y="713187"/>
             <a:ext cx="192024" cy="336042"/>
             <a:chOff x="2339181" y="3718719"/>
             <a:chExt cx="304800" cy="533400"/>
@@ -4873,7 +4844,7 @@
         </p:nvGrpSpPr>
         <p:grpSpPr>
           <a:xfrm>
-            <a:off x="4824547" y="751558"/>
+            <a:off x="4672147" y="599158"/>
             <a:ext cx="192024" cy="336042"/>
             <a:chOff x="2339181" y="3718719"/>
             <a:chExt cx="304800" cy="533400"/>
@@ -5067,7 +5038,7 @@
         </p:nvGrpSpPr>
         <p:grpSpPr>
           <a:xfrm>
-            <a:off x="5750376" y="1471073"/>
+            <a:off x="5891174" y="1397574"/>
             <a:ext cx="192024" cy="336042"/>
             <a:chOff x="2339181" y="3718719"/>
             <a:chExt cx="304800" cy="533400"/>
@@ -5162,7 +5133,7 @@
         </p:nvSpPr>
         <p:spPr>
           <a:xfrm>
-            <a:off x="2376314" y="1063779"/>
+            <a:off x="3413125" y="1019244"/>
             <a:ext cx="533400" cy="323165"/>
           </a:xfrm>
           <a:prstGeom prst="rect">
@@ -5200,7 +5171,7 @@
         </p:nvSpPr>
         <p:spPr>
           <a:xfrm>
-            <a:off x="4449053" y="1049229"/>
+            <a:off x="4449053" y="896829"/>
             <a:ext cx="958774" cy="323165"/>
           </a:xfrm>
           <a:prstGeom prst="rect">
@@ -5280,7 +5251,7 @@
         </p:nvSpPr>
         <p:spPr>
           <a:xfrm>
-            <a:off x="5634527" y="1808528"/>
+            <a:off x="5775325" y="1735029"/>
             <a:ext cx="533400" cy="323165"/>
           </a:xfrm>
           <a:prstGeom prst="rect">
@@ -5318,8 +5289,8 @@
         </p:nvSpPr>
         <p:spPr>
           <a:xfrm>
-            <a:off x="6167927" y="939107"/>
-            <a:ext cx="1143000" cy="228600"/>
+            <a:off x="5775326" y="939107"/>
+            <a:ext cx="1905000" cy="228600"/>
           </a:xfrm>
           <a:prstGeom prst="roundRect">
             <a:avLst>
@@ -5352,14 +5323,24 @@
           <a:p>
             <a:pPr algn="ctr"/>
             <a:r>
-              <a:rPr lang="en-US" sz="1400" b="1" dirty="0" smtClean="0">
+              <a:rPr lang="en-US" sz="1400" dirty="0" err="1" smtClean="0">
                 <a:solidFill>
                   <a:srgbClr val="7030A0"/>
                 </a:solidFill>
                 <a:latin typeface="Consolas" pitchFamily="49" charset="0"/>
                 <a:cs typeface="Consolas" pitchFamily="49" charset="0"/>
               </a:rPr>
-              <a:t>Delivered</a:t>
+              <a:t>s.</a:t>
+            </a:r>
+            <a:r>
+              <a:rPr lang="en-US" sz="1400" b="1" dirty="0" err="1" smtClean="0">
+                <a:solidFill>
+                  <a:srgbClr val="7030A0"/>
+                </a:solidFill>
+                <a:latin typeface="Consolas" pitchFamily="49" charset="0"/>
+                <a:cs typeface="Consolas" pitchFamily="49" charset="0"/>
+              </a:rPr>
+              <a:t>MergeInProgress</a:t>
             </a:r>
             <a:endParaRPr lang="en-US" sz="1400" b="1" dirty="0" smtClean="0">
               <a:solidFill>
@@ -5371,6 +5352,137 @@
           </a:p>
         </p:txBody>
       </p:sp>
+      <p:sp>
+        <p:nvSpPr>
+          <p:cNvPr id="103" name="Rounded Rectangle 102"/>
+          <p:cNvSpPr/>
+          <p:nvPr/>
+        </p:nvSpPr>
+        <p:spPr>
+          <a:xfrm>
+            <a:off x="6308724" y="1741510"/>
+            <a:ext cx="1066801" cy="228600"/>
+          </a:xfrm>
+          <a:prstGeom prst="roundRect">
+            <a:avLst>
+              <a:gd name="adj" fmla="val 9190"/>
+            </a:avLst>
+          </a:prstGeom>
+          <a:ln>
+            <a:solidFill>
+              <a:srgbClr val="0070C0"/>
+            </a:solidFill>
+          </a:ln>
+        </p:spPr>
+        <p:style>
+          <a:lnRef idx="2">
+            <a:schemeClr val="accent2"/>
+          </a:lnRef>
+          <a:fillRef idx="1">
+            <a:schemeClr val="lt1"/>
+          </a:fillRef>
+          <a:effectRef idx="0">
+            <a:schemeClr val="accent2"/>
+          </a:effectRef>
+          <a:fontRef idx="minor">
+            <a:schemeClr val="dk1"/>
+          </a:fontRef>
+        </p:style>
+        <p:txBody>
+          <a:bodyPr vert="horz" rtlCol="0" anchor="ctr" anchorCtr="0"/>
+          <a:lstStyle/>
+          <a:p>
+            <a:pPr algn="ctr"/>
+            <a:r>
+              <a:rPr lang="en-US" sz="1400" b="1" dirty="0" smtClean="0">
+                <a:solidFill>
+                  <a:srgbClr val="0070C0"/>
+                </a:solidFill>
+                <a:latin typeface="Consolas" pitchFamily="49" charset="0"/>
+                <a:cs typeface="Consolas" pitchFamily="49" charset="0"/>
+              </a:rPr>
+              <a:t>Deployed</a:t>
+            </a:r>
+          </a:p>
+        </p:txBody>
+      </p:sp>
+      <p:cxnSp>
+        <p:nvCxnSpPr>
+          <p:cNvPr id="107" name="Straight Arrow Connector 106"/>
+          <p:cNvCxnSpPr>
+            <a:stCxn id="142" idx="2"/>
+            <a:endCxn id="103" idx="0"/>
+          </p:cNvCxnSpPr>
+          <p:nvPr/>
+        </p:nvCxnSpPr>
+        <p:spPr>
+          <a:xfrm>
+            <a:off x="6842125" y="1610783"/>
+            <a:ext cx="0" cy="130727"/>
+          </a:xfrm>
+          <a:prstGeom prst="straightConnector1">
+            <a:avLst/>
+          </a:prstGeom>
+          <a:ln w="28575">
+            <a:solidFill>
+              <a:srgbClr val="0070C0"/>
+            </a:solidFill>
+            <a:headEnd type="none" w="med" len="med"/>
+            <a:tailEnd type="triangle" w="med" len="med"/>
+          </a:ln>
+        </p:spPr>
+        <p:style>
+          <a:lnRef idx="1">
+            <a:schemeClr val="accent1"/>
+          </a:lnRef>
+          <a:fillRef idx="0">
+            <a:schemeClr val="accent1"/>
+          </a:fillRef>
+          <a:effectRef idx="0">
+            <a:schemeClr val="accent1"/>
+          </a:effectRef>
+          <a:fontRef idx="minor">
+            <a:schemeClr val="tx1"/>
+          </a:fontRef>
+        </p:style>
+      </p:cxnSp>
+      <p:cxnSp>
+        <p:nvCxnSpPr>
+          <p:cNvPr id="127" name="Straight Arrow Connector 126"/>
+          <p:cNvCxnSpPr/>
+          <p:nvPr/>
+        </p:nvCxnSpPr>
+        <p:spPr>
+          <a:xfrm>
+            <a:off x="2660896" y="302084"/>
+            <a:ext cx="228600" cy="0"/>
+          </a:xfrm>
+          <a:prstGeom prst="straightConnector1">
+            <a:avLst/>
+          </a:prstGeom>
+          <a:ln w="28575">
+            <a:solidFill>
+              <a:srgbClr val="00B050"/>
+            </a:solidFill>
+            <a:headEnd type="none" w="med" len="med"/>
+            <a:tailEnd type="triangle" w="med" len="med"/>
+          </a:ln>
+        </p:spPr>
+        <p:style>
+          <a:lnRef idx="1">
+            <a:schemeClr val="accent1"/>
+          </a:lnRef>
+          <a:fillRef idx="0">
+            <a:schemeClr val="accent1"/>
+          </a:fillRef>
+          <a:effectRef idx="0">
+            <a:schemeClr val="accent1"/>
+          </a:effectRef>
+          <a:fontRef idx="minor">
+            <a:schemeClr val="tx1"/>
+          </a:fontRef>
+        </p:style>
+      </p:cxnSp>
     </p:spTree>
     <p:extLst>
       <p:ext uri="{BB962C8B-B14F-4D97-AF65-F5344CB8AC3E}">

</xml_diff>

<commit_message>
Updated process.md with refined instructions/diagrams
</commit_message>
<xml_diff>
--- a/doc/diagrams/IssueLifecycle.pptx
+++ b/doc/diagrams/IssueLifecycle.pptx
@@ -192,7 +192,7 @@
           <a:p>
             <a:fld id="{EB56B9F1-9881-483D-AC17-B3C6E9A32E68}" type="datetimeFigureOut">
               <a:rPr lang="en-SG" smtClean="0"/>
-              <a:t>5/5/2014</a:t>
+              <a:t>6/5/2014</a:t>
             </a:fld>
             <a:endParaRPr lang="en-SG"/>
           </a:p>
@@ -731,7 +731,7 @@
             <a:fld id="{1D8BD707-D9CF-40AE-B4C6-C98DA3205C09}" type="datetimeFigureOut">
               <a:rPr lang="en-US" smtClean="0"/>
               <a:pPr/>
-              <a:t>5/5/2014</a:t>
+              <a:t>5/6/2014</a:t>
             </a:fld>
             <a:endParaRPr lang="en-US"/>
           </a:p>
@@ -898,7 +898,7 @@
             <a:fld id="{1D8BD707-D9CF-40AE-B4C6-C98DA3205C09}" type="datetimeFigureOut">
               <a:rPr lang="en-US" smtClean="0"/>
               <a:pPr/>
-              <a:t>5/5/2014</a:t>
+              <a:t>5/6/2014</a:t>
             </a:fld>
             <a:endParaRPr lang="en-US"/>
           </a:p>
@@ -1075,7 +1075,7 @@
             <a:fld id="{1D8BD707-D9CF-40AE-B4C6-C98DA3205C09}" type="datetimeFigureOut">
               <a:rPr lang="en-US" smtClean="0"/>
               <a:pPr/>
-              <a:t>5/5/2014</a:t>
+              <a:t>5/6/2014</a:t>
             </a:fld>
             <a:endParaRPr lang="en-US"/>
           </a:p>
@@ -1242,7 +1242,7 @@
             <a:fld id="{1D8BD707-D9CF-40AE-B4C6-C98DA3205C09}" type="datetimeFigureOut">
               <a:rPr lang="en-US" smtClean="0"/>
               <a:pPr/>
-              <a:t>5/5/2014</a:t>
+              <a:t>5/6/2014</a:t>
             </a:fld>
             <a:endParaRPr lang="en-US"/>
           </a:p>
@@ -1485,7 +1485,7 @@
             <a:fld id="{1D8BD707-D9CF-40AE-B4C6-C98DA3205C09}" type="datetimeFigureOut">
               <a:rPr lang="en-US" smtClean="0"/>
               <a:pPr/>
-              <a:t>5/5/2014</a:t>
+              <a:t>5/6/2014</a:t>
             </a:fld>
             <a:endParaRPr lang="en-US"/>
           </a:p>
@@ -1770,7 +1770,7 @@
             <a:fld id="{1D8BD707-D9CF-40AE-B4C6-C98DA3205C09}" type="datetimeFigureOut">
               <a:rPr lang="en-US" smtClean="0"/>
               <a:pPr/>
-              <a:t>5/5/2014</a:t>
+              <a:t>5/6/2014</a:t>
             </a:fld>
             <a:endParaRPr lang="en-US"/>
           </a:p>
@@ -2189,7 +2189,7 @@
             <a:fld id="{1D8BD707-D9CF-40AE-B4C6-C98DA3205C09}" type="datetimeFigureOut">
               <a:rPr lang="en-US" smtClean="0"/>
               <a:pPr/>
-              <a:t>5/5/2014</a:t>
+              <a:t>5/6/2014</a:t>
             </a:fld>
             <a:endParaRPr lang="en-US"/>
           </a:p>
@@ -2304,7 +2304,7 @@
             <a:fld id="{1D8BD707-D9CF-40AE-B4C6-C98DA3205C09}" type="datetimeFigureOut">
               <a:rPr lang="en-US" smtClean="0"/>
               <a:pPr/>
-              <a:t>5/5/2014</a:t>
+              <a:t>5/6/2014</a:t>
             </a:fld>
             <a:endParaRPr lang="en-US"/>
           </a:p>
@@ -2396,7 +2396,7 @@
             <a:fld id="{1D8BD707-D9CF-40AE-B4C6-C98DA3205C09}" type="datetimeFigureOut">
               <a:rPr lang="en-US" smtClean="0"/>
               <a:pPr/>
-              <a:t>5/5/2014</a:t>
+              <a:t>5/6/2014</a:t>
             </a:fld>
             <a:endParaRPr lang="en-US"/>
           </a:p>
@@ -2670,7 +2670,7 @@
             <a:fld id="{1D8BD707-D9CF-40AE-B4C6-C98DA3205C09}" type="datetimeFigureOut">
               <a:rPr lang="en-US" smtClean="0"/>
               <a:pPr/>
-              <a:t>5/5/2014</a:t>
+              <a:t>5/6/2014</a:t>
             </a:fld>
             <a:endParaRPr lang="en-US"/>
           </a:p>
@@ -2920,7 +2920,7 @@
             <a:fld id="{1D8BD707-D9CF-40AE-B4C6-C98DA3205C09}" type="datetimeFigureOut">
               <a:rPr lang="en-US" smtClean="0"/>
               <a:pPr/>
-              <a:t>5/5/2014</a:t>
+              <a:t>5/6/2014</a:t>
             </a:fld>
             <a:endParaRPr lang="en-US"/>
           </a:p>
@@ -3130,7 +3130,7 @@
             <a:fld id="{1D8BD707-D9CF-40AE-B4C6-C98DA3205C09}" type="datetimeFigureOut">
               <a:rPr lang="en-US" smtClean="0"/>
               <a:pPr/>
-              <a:t>5/5/2014</a:t>
+              <a:t>5/6/2014</a:t>
             </a:fld>
             <a:endParaRPr lang="en-US"/>
           </a:p>
@@ -3894,8 +3894,8 @@
         </p:nvSpPr>
         <p:spPr>
           <a:xfrm>
-            <a:off x="6308724" y="1382183"/>
-            <a:ext cx="1066801" cy="228600"/>
+            <a:off x="6255384" y="1382183"/>
+            <a:ext cx="1173481" cy="228600"/>
           </a:xfrm>
           <a:prstGeom prst="roundRect">
             <a:avLst>
@@ -3904,7 +3904,7 @@
           </a:prstGeom>
           <a:ln>
             <a:solidFill>
-              <a:srgbClr val="0070C0"/>
+              <a:srgbClr val="7030A0"/>
             </a:solidFill>
           </a:ln>
         </p:spPr>
@@ -3928,22 +3928,15 @@
           <a:p>
             <a:pPr algn="ctr"/>
             <a:r>
-              <a:rPr lang="en-US" sz="1400" b="1" dirty="0" smtClean="0">
+              <a:rPr lang="en-US" sz="1400" dirty="0">
                 <a:solidFill>
-                  <a:srgbClr val="0070C0"/>
+                  <a:srgbClr val="7030A0"/>
                 </a:solidFill>
                 <a:latin typeface="Consolas" pitchFamily="49" charset="0"/>
                 <a:cs typeface="Consolas" pitchFamily="49" charset="0"/>
               </a:rPr>
               <a:t>Closed</a:t>
             </a:r>
-            <a:endParaRPr lang="en-US" sz="1400" b="1" dirty="0" smtClean="0">
-              <a:solidFill>
-                <a:srgbClr val="0070C0"/>
-              </a:solidFill>
-              <a:latin typeface="Consolas" pitchFamily="49" charset="0"/>
-              <a:cs typeface="Consolas" pitchFamily="49" charset="0"/>
-            </a:endParaRPr>
           </a:p>
         </p:txBody>
       </p:sp>
@@ -4107,8 +4100,8 @@
         </p:nvCxnSpPr>
         <p:spPr>
           <a:xfrm>
-            <a:off x="4695031" y="302084"/>
-            <a:ext cx="228600" cy="0"/>
+            <a:off x="4537505" y="302084"/>
+            <a:ext cx="386126" cy="0"/>
           </a:xfrm>
           <a:prstGeom prst="straightConnector1">
             <a:avLst/>
@@ -4476,7 +4469,7 @@
           </a:prstGeom>
           <a:ln w="28575">
             <a:solidFill>
-              <a:srgbClr val="0070C0"/>
+              <a:srgbClr val="7030A0"/>
             </a:solidFill>
             <a:headEnd type="none" w="med" len="med"/>
             <a:tailEnd type="triangle" w="med" len="med"/>
@@ -4505,8 +4498,8 @@
         </p:nvSpPr>
         <p:spPr>
           <a:xfrm>
-            <a:off x="2879725" y="153194"/>
-            <a:ext cx="1815306" cy="297780"/>
+            <a:off x="3037252" y="153194"/>
+            <a:ext cx="1500253" cy="297780"/>
           </a:xfrm>
           <a:prstGeom prst="roundRect">
             <a:avLst>
@@ -4556,7 +4549,7 @@
                 <a:latin typeface="Consolas" pitchFamily="49" charset="0"/>
                 <a:cs typeface="Consolas" pitchFamily="49" charset="0"/>
               </a:rPr>
-              <a:t>WorkInProgress</a:t>
+              <a:t>Fixing</a:t>
             </a:r>
             <a:endParaRPr lang="en-US" sz="1400" b="1" dirty="0" smtClean="0">
               <a:solidFill>
@@ -4627,7 +4620,7 @@
                 <a:latin typeface="Consolas" pitchFamily="49" charset="0"/>
                 <a:cs typeface="Consolas" pitchFamily="49" charset="0"/>
               </a:rPr>
-              <a:t>ReadyForReview</a:t>
+              <a:t>PendingReview</a:t>
             </a:r>
             <a:endParaRPr lang="en-US" sz="1400" b="1" dirty="0">
               <a:solidFill>
@@ -4709,13 +4702,6 @@
               </a:rPr>
               <a:t>[no status]</a:t>
             </a:r>
-            <a:endParaRPr lang="en-US" sz="1400" dirty="0" smtClean="0">
-              <a:solidFill>
-                <a:schemeClr val="tx1"/>
-              </a:solidFill>
-              <a:latin typeface="Consolas" pitchFamily="49" charset="0"/>
-              <a:cs typeface="Consolas" pitchFamily="49" charset="0"/>
-            </a:endParaRPr>
           </a:p>
         </p:txBody>
       </p:sp>
@@ -5289,8 +5275,8 @@
         </p:nvSpPr>
         <p:spPr>
           <a:xfrm>
-            <a:off x="5775326" y="939107"/>
-            <a:ext cx="1905000" cy="228600"/>
+            <a:off x="6260861" y="939107"/>
+            <a:ext cx="1182855" cy="228600"/>
           </a:xfrm>
           <a:prstGeom prst="roundRect">
             <a:avLst>
@@ -5340,7 +5326,7 @@
                 <a:latin typeface="Consolas" pitchFamily="49" charset="0"/>
                 <a:cs typeface="Consolas" pitchFamily="49" charset="0"/>
               </a:rPr>
-              <a:t>MergeInProgress</a:t>
+              <a:t>Merging</a:t>
             </a:r>
             <a:endParaRPr lang="en-US" sz="1400" b="1" dirty="0" smtClean="0">
               <a:solidFill>
@@ -5360,8 +5346,8 @@
         </p:nvSpPr>
         <p:spPr>
           <a:xfrm>
-            <a:off x="6308724" y="1741510"/>
-            <a:ext cx="1066801" cy="228600"/>
+            <a:off x="6255384" y="1741510"/>
+            <a:ext cx="1173481" cy="228600"/>
           </a:xfrm>
           <a:prstGeom prst="roundRect">
             <a:avLst>
@@ -5449,13 +5435,15 @@
       <p:cxnSp>
         <p:nvCxnSpPr>
           <p:cNvPr id="127" name="Straight Arrow Connector 126"/>
-          <p:cNvCxnSpPr/>
+          <p:cNvCxnSpPr>
+            <a:endCxn id="177" idx="1"/>
+          </p:cNvCxnSpPr>
           <p:nvPr/>
         </p:nvCxnSpPr>
         <p:spPr>
           <a:xfrm>
             <a:off x="2660896" y="302084"/>
-            <a:ext cx="228600" cy="0"/>
+            <a:ext cx="376356" cy="0"/>
           </a:xfrm>
           <a:prstGeom prst="straightConnector1">
             <a:avLst/>

</xml_diff>

<commit_message>
[2388] Update developer workflow for GitHub Fixes #2388
</commit_message>
<xml_diff>
--- a/doc/diagrams/IssueLifecycle.pptx
+++ b/doc/diagrams/IssueLifecycle.pptx
@@ -192,7 +192,7 @@
           <a:p>
             <a:fld id="{EB56B9F1-9881-483D-AC17-B3C6E9A32E68}" type="datetimeFigureOut">
               <a:rPr lang="en-SG" smtClean="0"/>
-              <a:t>6/5/2014</a:t>
+              <a:t>11/8/2014</a:t>
             </a:fld>
             <a:endParaRPr lang="en-SG"/>
           </a:p>
@@ -731,7 +731,7 @@
             <a:fld id="{1D8BD707-D9CF-40AE-B4C6-C98DA3205C09}" type="datetimeFigureOut">
               <a:rPr lang="en-US" smtClean="0"/>
               <a:pPr/>
-              <a:t>5/6/2014</a:t>
+              <a:t>8/11/2014</a:t>
             </a:fld>
             <a:endParaRPr lang="en-US"/>
           </a:p>
@@ -898,7 +898,7 @@
             <a:fld id="{1D8BD707-D9CF-40AE-B4C6-C98DA3205C09}" type="datetimeFigureOut">
               <a:rPr lang="en-US" smtClean="0"/>
               <a:pPr/>
-              <a:t>5/6/2014</a:t>
+              <a:t>8/11/2014</a:t>
             </a:fld>
             <a:endParaRPr lang="en-US"/>
           </a:p>
@@ -1075,7 +1075,7 @@
             <a:fld id="{1D8BD707-D9CF-40AE-B4C6-C98DA3205C09}" type="datetimeFigureOut">
               <a:rPr lang="en-US" smtClean="0"/>
               <a:pPr/>
-              <a:t>5/6/2014</a:t>
+              <a:t>8/11/2014</a:t>
             </a:fld>
             <a:endParaRPr lang="en-US"/>
           </a:p>
@@ -1242,7 +1242,7 @@
             <a:fld id="{1D8BD707-D9CF-40AE-B4C6-C98DA3205C09}" type="datetimeFigureOut">
               <a:rPr lang="en-US" smtClean="0"/>
               <a:pPr/>
-              <a:t>5/6/2014</a:t>
+              <a:t>8/11/2014</a:t>
             </a:fld>
             <a:endParaRPr lang="en-US"/>
           </a:p>
@@ -1485,7 +1485,7 @@
             <a:fld id="{1D8BD707-D9CF-40AE-B4C6-C98DA3205C09}" type="datetimeFigureOut">
               <a:rPr lang="en-US" smtClean="0"/>
               <a:pPr/>
-              <a:t>5/6/2014</a:t>
+              <a:t>8/11/2014</a:t>
             </a:fld>
             <a:endParaRPr lang="en-US"/>
           </a:p>
@@ -1770,7 +1770,7 @@
             <a:fld id="{1D8BD707-D9CF-40AE-B4C6-C98DA3205C09}" type="datetimeFigureOut">
               <a:rPr lang="en-US" smtClean="0"/>
               <a:pPr/>
-              <a:t>5/6/2014</a:t>
+              <a:t>8/11/2014</a:t>
             </a:fld>
             <a:endParaRPr lang="en-US"/>
           </a:p>
@@ -2189,7 +2189,7 @@
             <a:fld id="{1D8BD707-D9CF-40AE-B4C6-C98DA3205C09}" type="datetimeFigureOut">
               <a:rPr lang="en-US" smtClean="0"/>
               <a:pPr/>
-              <a:t>5/6/2014</a:t>
+              <a:t>8/11/2014</a:t>
             </a:fld>
             <a:endParaRPr lang="en-US"/>
           </a:p>
@@ -2304,7 +2304,7 @@
             <a:fld id="{1D8BD707-D9CF-40AE-B4C6-C98DA3205C09}" type="datetimeFigureOut">
               <a:rPr lang="en-US" smtClean="0"/>
               <a:pPr/>
-              <a:t>5/6/2014</a:t>
+              <a:t>8/11/2014</a:t>
             </a:fld>
             <a:endParaRPr lang="en-US"/>
           </a:p>
@@ -2396,7 +2396,7 @@
             <a:fld id="{1D8BD707-D9CF-40AE-B4C6-C98DA3205C09}" type="datetimeFigureOut">
               <a:rPr lang="en-US" smtClean="0"/>
               <a:pPr/>
-              <a:t>5/6/2014</a:t>
+              <a:t>8/11/2014</a:t>
             </a:fld>
             <a:endParaRPr lang="en-US"/>
           </a:p>
@@ -2670,7 +2670,7 @@
             <a:fld id="{1D8BD707-D9CF-40AE-B4C6-C98DA3205C09}" type="datetimeFigureOut">
               <a:rPr lang="en-US" smtClean="0"/>
               <a:pPr/>
-              <a:t>5/6/2014</a:t>
+              <a:t>8/11/2014</a:t>
             </a:fld>
             <a:endParaRPr lang="en-US"/>
           </a:p>
@@ -2920,7 +2920,7 @@
             <a:fld id="{1D8BD707-D9CF-40AE-B4C6-C98DA3205C09}" type="datetimeFigureOut">
               <a:rPr lang="en-US" smtClean="0"/>
               <a:pPr/>
-              <a:t>5/6/2014</a:t>
+              <a:t>8/11/2014</a:t>
             </a:fld>
             <a:endParaRPr lang="en-US"/>
           </a:p>
@@ -3130,7 +3130,7 @@
             <a:fld id="{1D8BD707-D9CF-40AE-B4C6-C98DA3205C09}" type="datetimeFigureOut">
               <a:rPr lang="en-US" smtClean="0"/>
               <a:pPr/>
-              <a:t>5/6/2014</a:t>
+              <a:t>8/11/2014</a:t>
             </a:fld>
             <a:endParaRPr lang="en-US"/>
           </a:p>
@@ -3503,362 +3503,28 @@
       </p:grpSpPr>
       <p:sp>
         <p:nvSpPr>
-          <p:cNvPr id="135" name="Rounded Rectangle 134"/>
+          <p:cNvPr id="200" name="Rounded Rectangle 199"/>
           <p:cNvSpPr/>
           <p:nvPr/>
         </p:nvSpPr>
         <p:spPr>
           <a:xfrm>
-            <a:off x="1431925" y="177911"/>
-            <a:ext cx="1219476" cy="228600"/>
+            <a:off x="3979440" y="76993"/>
+            <a:ext cx="3742061" cy="1594097"/>
           </a:xfrm>
           <a:prstGeom prst="roundRect">
             <a:avLst>
-              <a:gd name="adj" fmla="val 9190"/>
+              <a:gd name="adj" fmla="val 8258"/>
             </a:avLst>
           </a:prstGeom>
-          <a:ln>
-            <a:solidFill>
-              <a:srgbClr val="00B050"/>
-            </a:solidFill>
-          </a:ln>
-        </p:spPr>
-        <p:style>
-          <a:lnRef idx="2">
-            <a:schemeClr val="accent2"/>
-          </a:lnRef>
-          <a:fillRef idx="1">
-            <a:schemeClr val="lt1"/>
-          </a:fillRef>
-          <a:effectRef idx="0">
-            <a:schemeClr val="accent2"/>
-          </a:effectRef>
-          <a:fontRef idx="minor">
-            <a:schemeClr val="dk1"/>
-          </a:fontRef>
-        </p:style>
-        <p:txBody>
-          <a:bodyPr vert="horz" rtlCol="0" anchor="ctr" anchorCtr="0"/>
-          <a:lstStyle/>
-          <a:p>
-            <a:pPr algn="ctr"/>
-            <a:r>
-              <a:rPr lang="en-US" sz="1400" dirty="0" err="1" smtClean="0">
-                <a:solidFill>
-                  <a:srgbClr val="00B050"/>
-                </a:solidFill>
-                <a:latin typeface="Consolas" pitchFamily="49" charset="0"/>
-                <a:cs typeface="Consolas" pitchFamily="49" charset="0"/>
-              </a:rPr>
-              <a:t>s.</a:t>
-            </a:r>
-            <a:r>
-              <a:rPr lang="en-US" sz="1400" b="1" dirty="0" err="1" smtClean="0">
-                <a:solidFill>
-                  <a:srgbClr val="00B050"/>
-                </a:solidFill>
-                <a:latin typeface="Consolas" pitchFamily="49" charset="0"/>
-                <a:cs typeface="Consolas" pitchFamily="49" charset="0"/>
-              </a:rPr>
-              <a:t>Accepted</a:t>
-            </a:r>
-            <a:endParaRPr lang="en-US" sz="1400" b="1" dirty="0" smtClean="0">
-              <a:solidFill>
-                <a:srgbClr val="00B050"/>
-              </a:solidFill>
-              <a:latin typeface="Consolas" pitchFamily="49" charset="0"/>
-              <a:cs typeface="Consolas" pitchFamily="49" charset="0"/>
-            </a:endParaRPr>
-          </a:p>
-        </p:txBody>
-      </p:sp>
-      <p:cxnSp>
-        <p:nvCxnSpPr>
-          <p:cNvPr id="136" name="Straight Connector 135"/>
-          <p:cNvCxnSpPr/>
-          <p:nvPr/>
-        </p:nvCxnSpPr>
-        <p:spPr>
-          <a:xfrm>
-            <a:off x="76200" y="556967"/>
-            <a:ext cx="7438231" cy="0"/>
-          </a:xfrm>
-          <a:prstGeom prst="line">
-            <a:avLst/>
-          </a:prstGeom>
-          <a:ln w="19050">
-            <a:solidFill>
-              <a:schemeClr val="bg1"/>
-            </a:solidFill>
-            <a:prstDash val="sysDot"/>
-          </a:ln>
-        </p:spPr>
-        <p:style>
-          <a:lnRef idx="1">
-            <a:schemeClr val="accent1"/>
-          </a:lnRef>
-          <a:fillRef idx="0">
-            <a:schemeClr val="accent1"/>
-          </a:fillRef>
-          <a:effectRef idx="0">
-            <a:schemeClr val="accent1"/>
-          </a:effectRef>
-          <a:fontRef idx="minor">
-            <a:schemeClr val="tx1"/>
-          </a:fontRef>
-        </p:style>
-      </p:cxnSp>
-      <p:sp>
-        <p:nvSpPr>
-          <p:cNvPr id="138" name="Rounded Rectangle 137"/>
-          <p:cNvSpPr/>
-          <p:nvPr/>
-        </p:nvSpPr>
-        <p:spPr>
-          <a:xfrm>
-            <a:off x="1355449" y="2128528"/>
-            <a:ext cx="3962676" cy="274102"/>
-          </a:xfrm>
-          <a:prstGeom prst="roundRect">
-            <a:avLst>
-              <a:gd name="adj" fmla="val 9190"/>
-            </a:avLst>
-          </a:prstGeom>
-          <a:ln>
-            <a:solidFill>
-              <a:schemeClr val="bg1">
-                <a:lumMod val="50000"/>
-              </a:schemeClr>
-            </a:solidFill>
-          </a:ln>
-        </p:spPr>
-        <p:style>
-          <a:lnRef idx="2">
-            <a:schemeClr val="accent2"/>
-          </a:lnRef>
-          <a:fillRef idx="1">
-            <a:schemeClr val="lt1"/>
-          </a:fillRef>
-          <a:effectRef idx="0">
-            <a:schemeClr val="accent2"/>
-          </a:effectRef>
-          <a:fontRef idx="minor">
-            <a:schemeClr val="dk1"/>
-          </a:fontRef>
-        </p:style>
-        <p:txBody>
-          <a:bodyPr vert="horz" rtlCol="0" anchor="ctr" anchorCtr="0"/>
-          <a:lstStyle/>
-          <a:p>
-            <a:pPr algn="ctr"/>
-            <a:r>
-              <a:rPr lang="en-US" sz="1400" dirty="0" err="1" smtClean="0">
-                <a:solidFill>
-                  <a:schemeClr val="bg1">
-                    <a:lumMod val="50000"/>
-                  </a:schemeClr>
-                </a:solidFill>
-                <a:latin typeface="Consolas" pitchFamily="49" charset="0"/>
-                <a:cs typeface="Consolas" pitchFamily="49" charset="0"/>
-              </a:rPr>
-              <a:t>s.</a:t>
-            </a:r>
-            <a:r>
-              <a:rPr lang="en-US" sz="1400" b="1" dirty="0" err="1" smtClean="0">
-                <a:solidFill>
-                  <a:schemeClr val="bg1">
-                    <a:lumMod val="50000"/>
-                  </a:schemeClr>
-                </a:solidFill>
-                <a:latin typeface="Consolas" pitchFamily="49" charset="0"/>
-                <a:cs typeface="Consolas" pitchFamily="49" charset="0"/>
-              </a:rPr>
-              <a:t>Invalid</a:t>
-            </a:r>
-            <a:r>
-              <a:rPr lang="en-US" sz="1400" b="1" dirty="0" smtClean="0">
-                <a:solidFill>
-                  <a:schemeClr val="bg1">
-                    <a:lumMod val="50000"/>
-                  </a:schemeClr>
-                </a:solidFill>
-                <a:latin typeface="Consolas" pitchFamily="49" charset="0"/>
-                <a:cs typeface="Consolas" pitchFamily="49" charset="0"/>
-              </a:rPr>
-              <a:t>/</a:t>
-            </a:r>
-            <a:r>
-              <a:rPr lang="en-US" sz="1400" dirty="0" err="1" smtClean="0">
-                <a:solidFill>
-                  <a:schemeClr val="bg1">
-                    <a:lumMod val="50000"/>
-                  </a:schemeClr>
-                </a:solidFill>
-                <a:latin typeface="Consolas" pitchFamily="49" charset="0"/>
-                <a:cs typeface="Consolas" pitchFamily="49" charset="0"/>
-              </a:rPr>
-              <a:t>s.</a:t>
-            </a:r>
-            <a:r>
-              <a:rPr lang="en-US" sz="1400" b="1" dirty="0" err="1" smtClean="0">
-                <a:solidFill>
-                  <a:schemeClr val="bg1">
-                    <a:lumMod val="50000"/>
-                  </a:schemeClr>
-                </a:solidFill>
-                <a:latin typeface="Consolas" pitchFamily="49" charset="0"/>
-                <a:cs typeface="Consolas" pitchFamily="49" charset="0"/>
-              </a:rPr>
-              <a:t>WontFix</a:t>
-            </a:r>
-            <a:r>
-              <a:rPr lang="en-US" sz="1400" b="1" dirty="0" smtClean="0">
-                <a:solidFill>
-                  <a:schemeClr val="bg1">
-                    <a:lumMod val="50000"/>
-                  </a:schemeClr>
-                </a:solidFill>
-                <a:latin typeface="Consolas" pitchFamily="49" charset="0"/>
-                <a:cs typeface="Consolas" pitchFamily="49" charset="0"/>
-              </a:rPr>
-              <a:t>/</a:t>
-            </a:r>
-            <a:r>
-              <a:rPr lang="en-US" sz="1400" dirty="0" err="1" smtClean="0">
-                <a:solidFill>
-                  <a:schemeClr val="bg1">
-                    <a:lumMod val="50000"/>
-                  </a:schemeClr>
-                </a:solidFill>
-                <a:latin typeface="Consolas" pitchFamily="49" charset="0"/>
-                <a:cs typeface="Consolas" pitchFamily="49" charset="0"/>
-              </a:rPr>
-              <a:t>s.</a:t>
-            </a:r>
-            <a:r>
-              <a:rPr lang="en-US" sz="1400" b="1" dirty="0" err="1" smtClean="0">
-                <a:solidFill>
-                  <a:schemeClr val="bg1">
-                    <a:lumMod val="50000"/>
-                  </a:schemeClr>
-                </a:solidFill>
-                <a:latin typeface="Consolas" pitchFamily="49" charset="0"/>
-                <a:cs typeface="Consolas" pitchFamily="49" charset="0"/>
-              </a:rPr>
-              <a:t>Duplicate</a:t>
-            </a:r>
-            <a:endParaRPr lang="en-US" sz="1400" b="1" dirty="0" smtClean="0">
-              <a:solidFill>
-                <a:schemeClr val="bg1">
-                  <a:lumMod val="50000"/>
-                </a:schemeClr>
-              </a:solidFill>
-              <a:latin typeface="Consolas" pitchFamily="49" charset="0"/>
-              <a:cs typeface="Consolas" pitchFamily="49" charset="0"/>
-            </a:endParaRPr>
-          </a:p>
-        </p:txBody>
-      </p:sp>
-      <p:sp>
-        <p:nvSpPr>
-          <p:cNvPr id="139" name="Rounded Rectangle 138"/>
-          <p:cNvSpPr/>
-          <p:nvPr/>
-        </p:nvSpPr>
-        <p:spPr>
-          <a:xfrm>
-            <a:off x="4937125" y="153194"/>
-            <a:ext cx="1600200" cy="297780"/>
-          </a:xfrm>
-          <a:prstGeom prst="roundRect">
-            <a:avLst>
-              <a:gd name="adj" fmla="val 9190"/>
-            </a:avLst>
-          </a:prstGeom>
-          <a:ln>
-            <a:solidFill>
-              <a:schemeClr val="accent6">
-                <a:lumMod val="75000"/>
-              </a:schemeClr>
-            </a:solidFill>
-          </a:ln>
-        </p:spPr>
-        <p:style>
-          <a:lnRef idx="2">
-            <a:schemeClr val="accent2"/>
-          </a:lnRef>
-          <a:fillRef idx="1">
-            <a:schemeClr val="lt1"/>
-          </a:fillRef>
-          <a:effectRef idx="0">
-            <a:schemeClr val="accent2"/>
-          </a:effectRef>
-          <a:fontRef idx="minor">
-            <a:schemeClr val="dk1"/>
-          </a:fontRef>
-        </p:style>
-        <p:txBody>
-          <a:bodyPr vert="horz" rtlCol="0" anchor="ctr" anchorCtr="0"/>
-          <a:lstStyle/>
-          <a:p>
-            <a:pPr algn="ctr"/>
-            <a:r>
-              <a:rPr lang="en-US" sz="1400" dirty="0" err="1" smtClean="0">
-                <a:solidFill>
-                  <a:schemeClr val="accent6">
-                    <a:lumMod val="75000"/>
-                  </a:schemeClr>
-                </a:solidFill>
-                <a:latin typeface="Consolas" pitchFamily="49" charset="0"/>
-                <a:cs typeface="Consolas" pitchFamily="49" charset="0"/>
-              </a:rPr>
-              <a:t>s.</a:t>
-            </a:r>
-            <a:r>
-              <a:rPr lang="en-US" sz="1400" b="1" dirty="0" err="1" smtClean="0">
-                <a:solidFill>
-                  <a:schemeClr val="accent6">
-                    <a:lumMod val="75000"/>
-                  </a:schemeClr>
-                </a:solidFill>
-                <a:latin typeface="Consolas" pitchFamily="49" charset="0"/>
-                <a:cs typeface="Consolas" pitchFamily="49" charset="0"/>
-              </a:rPr>
-              <a:t>ReadyToMerge</a:t>
-            </a:r>
-            <a:endParaRPr lang="en-US" sz="1400" b="1" dirty="0" smtClean="0">
-              <a:solidFill>
-                <a:schemeClr val="accent6">
-                  <a:lumMod val="75000"/>
-                </a:schemeClr>
-              </a:solidFill>
-              <a:latin typeface="Consolas" pitchFamily="49" charset="0"/>
-              <a:cs typeface="Consolas" pitchFamily="49" charset="0"/>
-            </a:endParaRPr>
-          </a:p>
-        </p:txBody>
-      </p:sp>
-      <p:sp>
-        <p:nvSpPr>
-          <p:cNvPr id="141" name="Flowchart: Connector 140"/>
-          <p:cNvSpPr/>
-          <p:nvPr/>
-        </p:nvSpPr>
-        <p:spPr>
-          <a:xfrm>
-            <a:off x="46831" y="1289470"/>
-            <a:ext cx="159420" cy="159420"/>
-          </a:xfrm>
-          <a:prstGeom prst="flowChartConnector">
-            <a:avLst/>
-          </a:prstGeom>
           <a:solidFill>
-            <a:schemeClr val="tx1"/>
+            <a:schemeClr val="accent6">
+              <a:lumMod val="40000"/>
+              <a:lumOff val="60000"/>
+            </a:schemeClr>
           </a:solidFill>
           <a:ln>
-            <a:solidFill>
-              <a:schemeClr val="tx1"/>
-            </a:solidFill>
+            <a:noFill/>
           </a:ln>
         </p:spPr>
         <p:style>
@@ -3888,24 +3554,124 @@
       </p:sp>
       <p:sp>
         <p:nvSpPr>
-          <p:cNvPr id="142" name="Rounded Rectangle 141"/>
+          <p:cNvPr id="157" name="Rounded Rectangle 156"/>
           <p:cNvSpPr/>
           <p:nvPr/>
         </p:nvSpPr>
         <p:spPr>
           <a:xfrm>
-            <a:off x="6255384" y="1382183"/>
-            <a:ext cx="1173481" cy="228600"/>
+            <a:off x="107393" y="76994"/>
+            <a:ext cx="3657600" cy="1594097"/>
+          </a:xfrm>
+          <a:prstGeom prst="roundRect">
+            <a:avLst>
+              <a:gd name="adj" fmla="val 10661"/>
+            </a:avLst>
+          </a:prstGeom>
+          <a:solidFill>
+            <a:schemeClr val="tx2">
+              <a:lumMod val="20000"/>
+              <a:lumOff val="80000"/>
+            </a:schemeClr>
+          </a:solidFill>
+          <a:ln>
+            <a:noFill/>
+          </a:ln>
+        </p:spPr>
+        <p:style>
+          <a:lnRef idx="2">
+            <a:schemeClr val="accent1">
+              <a:shade val="50000"/>
+            </a:schemeClr>
+          </a:lnRef>
+          <a:fillRef idx="1">
+            <a:schemeClr val="accent1"/>
+          </a:fillRef>
+          <a:effectRef idx="0">
+            <a:schemeClr val="accent1"/>
+          </a:effectRef>
+          <a:fontRef idx="minor">
+            <a:schemeClr val="lt1"/>
+          </a:fontRef>
+        </p:style>
+        <p:txBody>
+          <a:bodyPr rtlCol="0" anchor="ctr"/>
+          <a:lstStyle/>
+          <a:p>
+            <a:pPr algn="ctr"/>
+            <a:endParaRPr lang="en-SG"/>
+          </a:p>
+        </p:txBody>
+      </p:sp>
+      <p:sp>
+        <p:nvSpPr>
+          <p:cNvPr id="154" name="Rounded Rectangle 153"/>
+          <p:cNvSpPr/>
+          <p:nvPr/>
+        </p:nvSpPr>
+        <p:spPr>
+          <a:xfrm>
+            <a:off x="123207" y="2256368"/>
+            <a:ext cx="3641786" cy="293769"/>
+          </a:xfrm>
+          <a:prstGeom prst="roundRect">
+            <a:avLst/>
+          </a:prstGeom>
+          <a:solidFill>
+            <a:schemeClr val="bg1">
+              <a:lumMod val="95000"/>
+            </a:schemeClr>
+          </a:solidFill>
+          <a:ln>
+            <a:noFill/>
+          </a:ln>
+        </p:spPr>
+        <p:style>
+          <a:lnRef idx="2">
+            <a:schemeClr val="accent1">
+              <a:shade val="50000"/>
+            </a:schemeClr>
+          </a:lnRef>
+          <a:fillRef idx="1">
+            <a:schemeClr val="accent1"/>
+          </a:fillRef>
+          <a:effectRef idx="0">
+            <a:schemeClr val="accent1"/>
+          </a:effectRef>
+          <a:fontRef idx="minor">
+            <a:schemeClr val="lt1"/>
+          </a:fontRef>
+        </p:style>
+        <p:txBody>
+          <a:bodyPr rtlCol="0" anchor="ctr"/>
+          <a:lstStyle/>
+          <a:p>
+            <a:pPr algn="ctr"/>
+            <a:endParaRPr lang="en-SG"/>
+          </a:p>
+        </p:txBody>
+      </p:sp>
+      <p:sp>
+        <p:nvSpPr>
+          <p:cNvPr id="135" name="Rounded Rectangle 134"/>
+          <p:cNvSpPr/>
+          <p:nvPr/>
+        </p:nvSpPr>
+        <p:spPr>
+          <a:xfrm>
+            <a:off x="917476" y="839187"/>
+            <a:ext cx="1700606" cy="239760"/>
           </a:xfrm>
           <a:prstGeom prst="roundRect">
             <a:avLst>
               <a:gd name="adj" fmla="val 9190"/>
             </a:avLst>
           </a:prstGeom>
+          <a:solidFill>
+            <a:schemeClr val="bg1"/>
+          </a:solidFill>
           <a:ln>
-            <a:solidFill>
-              <a:srgbClr val="7030A0"/>
-            </a:solidFill>
+            <a:noFill/>
           </a:ln>
         </p:spPr>
         <p:style>
@@ -3928,298 +3694,190 @@
           <a:p>
             <a:pPr algn="ctr"/>
             <a:r>
-              <a:rPr lang="en-US" sz="1400" dirty="0">
+              <a:rPr lang="en-US" sz="1400" dirty="0" err="1" smtClean="0">
                 <a:solidFill>
-                  <a:srgbClr val="7030A0"/>
+                  <a:schemeClr val="tx1">
+                    <a:lumMod val="50000"/>
+                    <a:lumOff val="50000"/>
+                  </a:schemeClr>
                 </a:solidFill>
                 <a:latin typeface="Consolas" pitchFamily="49" charset="0"/>
                 <a:cs typeface="Consolas" pitchFamily="49" charset="0"/>
               </a:rPr>
-              <a:t>Closed</a:t>
-            </a:r>
-          </a:p>
-        </p:txBody>
-      </p:sp>
-      <p:grpSp>
-        <p:nvGrpSpPr>
-          <p:cNvPr id="143" name="Group 142"/>
-          <p:cNvGrpSpPr/>
+              <a:t>status.</a:t>
+            </a:r>
+            <a:r>
+              <a:rPr lang="en-US" sz="1400" b="1" dirty="0" err="1" smtClean="0">
+                <a:solidFill>
+                  <a:schemeClr val="tx1">
+                    <a:lumMod val="50000"/>
+                    <a:lumOff val="50000"/>
+                  </a:schemeClr>
+                </a:solidFill>
+                <a:latin typeface="Consolas" pitchFamily="49" charset="0"/>
+                <a:cs typeface="Consolas" pitchFamily="49" charset="0"/>
+              </a:rPr>
+              <a:t>Accepted</a:t>
+            </a:r>
+            <a:endParaRPr lang="en-US" sz="1400" b="1" dirty="0" smtClean="0">
+              <a:solidFill>
+                <a:schemeClr val="tx1">
+                  <a:lumMod val="50000"/>
+                  <a:lumOff val="50000"/>
+                </a:schemeClr>
+              </a:solidFill>
+              <a:latin typeface="Consolas" pitchFamily="49" charset="0"/>
+              <a:cs typeface="Consolas" pitchFamily="49" charset="0"/>
+            </a:endParaRPr>
+          </a:p>
+        </p:txBody>
+      </p:sp>
+      <p:sp>
+        <p:nvSpPr>
+          <p:cNvPr id="139" name="Rounded Rectangle 138"/>
+          <p:cNvSpPr/>
           <p:nvPr/>
-        </p:nvGrpSpPr>
-        <p:grpSpPr>
+        </p:nvSpPr>
+        <p:spPr>
           <a:xfrm>
-            <a:off x="6736223" y="2157579"/>
-            <a:ext cx="216000" cy="216000"/>
-            <a:chOff x="6834497" y="2146994"/>
-            <a:chExt cx="216000" cy="216000"/>
-          </a:xfrm>
-        </p:grpSpPr>
-        <p:sp>
-          <p:nvSpPr>
-            <p:cNvPr id="144" name="Flowchart: Connector 143"/>
-            <p:cNvSpPr/>
-            <p:nvPr/>
-          </p:nvSpPr>
-          <p:spPr>
-            <a:xfrm>
-              <a:off x="6834497" y="2146994"/>
-              <a:ext cx="216000" cy="216000"/>
-            </a:xfrm>
-            <a:prstGeom prst="flowChartConnector">
-              <a:avLst/>
-            </a:prstGeom>
-            <a:solidFill>
-              <a:schemeClr val="tx1"/>
-            </a:solidFill>
-            <a:ln>
+            <a:off x="6041894" y="1201381"/>
+            <a:ext cx="1600200" cy="252000"/>
+          </a:xfrm>
+          <a:prstGeom prst="roundRect">
+            <a:avLst>
+              <a:gd name="adj" fmla="val 9190"/>
+            </a:avLst>
+          </a:prstGeom>
+          <a:solidFill>
+            <a:schemeClr val="bg1"/>
+          </a:solidFill>
+          <a:ln>
+            <a:noFill/>
+          </a:ln>
+        </p:spPr>
+        <p:style>
+          <a:lnRef idx="2">
+            <a:schemeClr val="accent2"/>
+          </a:lnRef>
+          <a:fillRef idx="1">
+            <a:schemeClr val="lt1"/>
+          </a:fillRef>
+          <a:effectRef idx="0">
+            <a:schemeClr val="accent2"/>
+          </a:effectRef>
+          <a:fontRef idx="minor">
+            <a:schemeClr val="dk1"/>
+          </a:fontRef>
+        </p:style>
+        <p:txBody>
+          <a:bodyPr vert="horz" rtlCol="0" anchor="ctr" anchorCtr="0"/>
+          <a:lstStyle/>
+          <a:p>
+            <a:pPr algn="ctr"/>
+            <a:r>
+              <a:rPr lang="en-US" sz="1400" dirty="0" err="1" smtClean="0">
+                <a:solidFill>
+                  <a:schemeClr val="tx1">
+                    <a:lumMod val="50000"/>
+                    <a:lumOff val="50000"/>
+                  </a:schemeClr>
+                </a:solidFill>
+                <a:latin typeface="Consolas" pitchFamily="49" charset="0"/>
+                <a:cs typeface="Consolas" pitchFamily="49" charset="0"/>
+              </a:rPr>
+              <a:t>s.</a:t>
+            </a:r>
+            <a:r>
+              <a:rPr lang="en-US" sz="1400" b="1" dirty="0" err="1" smtClean="0">
+                <a:solidFill>
+                  <a:schemeClr val="tx1">
+                    <a:lumMod val="50000"/>
+                    <a:lumOff val="50000"/>
+                  </a:schemeClr>
+                </a:solidFill>
+                <a:latin typeface="Consolas" pitchFamily="49" charset="0"/>
+                <a:cs typeface="Consolas" pitchFamily="49" charset="0"/>
+              </a:rPr>
+              <a:t>ReadyToMerge</a:t>
+            </a:r>
+            <a:endParaRPr lang="en-US" sz="1400" b="1" dirty="0" smtClean="0">
               <a:solidFill>
-                <a:schemeClr val="tx1"/>
+                <a:schemeClr val="tx1">
+                  <a:lumMod val="50000"/>
+                  <a:lumOff val="50000"/>
+                </a:schemeClr>
               </a:solidFill>
-            </a:ln>
-          </p:spPr>
-          <p:style>
-            <a:lnRef idx="2">
-              <a:schemeClr val="accent1">
-                <a:shade val="50000"/>
-              </a:schemeClr>
-            </a:lnRef>
-            <a:fillRef idx="1">
-              <a:schemeClr val="accent1"/>
-            </a:fillRef>
-            <a:effectRef idx="0">
-              <a:schemeClr val="accent1"/>
-            </a:effectRef>
-            <a:fontRef idx="minor">
-              <a:schemeClr val="lt1"/>
-            </a:fontRef>
-          </p:style>
-          <p:txBody>
-            <a:bodyPr rtlCol="0" anchor="ctr"/>
-            <a:lstStyle/>
-            <a:p>
-              <a:pPr algn="ctr"/>
-              <a:endParaRPr lang="en-SG"/>
-            </a:p>
-          </p:txBody>
-        </p:sp>
-        <p:sp>
-          <p:nvSpPr>
-            <p:cNvPr id="145" name="Flowchart: Connector 144"/>
-            <p:cNvSpPr>
-              <a:spLocks noChangeAspect="1"/>
-            </p:cNvSpPr>
-            <p:nvPr/>
-          </p:nvSpPr>
-          <p:spPr>
-            <a:xfrm>
-              <a:off x="6871532" y="2184568"/>
-              <a:ext cx="145440" cy="144000"/>
-            </a:xfrm>
-            <a:prstGeom prst="flowChartConnector">
-              <a:avLst/>
-            </a:prstGeom>
-            <a:noFill/>
-            <a:ln>
-              <a:solidFill>
-                <a:srgbClr val="FAFBF7"/>
-              </a:solidFill>
-            </a:ln>
-          </p:spPr>
-          <p:style>
-            <a:lnRef idx="2">
-              <a:schemeClr val="accent1">
-                <a:shade val="50000"/>
-              </a:schemeClr>
-            </a:lnRef>
-            <a:fillRef idx="1">
-              <a:schemeClr val="accent1"/>
-            </a:fillRef>
-            <a:effectRef idx="0">
-              <a:schemeClr val="accent1"/>
-            </a:effectRef>
-            <a:fontRef idx="minor">
-              <a:schemeClr val="lt1"/>
-            </a:fontRef>
-          </p:style>
-          <p:txBody>
-            <a:bodyPr rtlCol="0" anchor="ctr"/>
-            <a:lstStyle/>
-            <a:p>
-              <a:pPr algn="ctr"/>
-              <a:endParaRPr lang="en-SG"/>
-            </a:p>
-          </p:txBody>
-        </p:sp>
-      </p:grpSp>
-      <p:cxnSp>
-        <p:nvCxnSpPr>
-          <p:cNvPr id="146" name="Straight Arrow Connector 145"/>
-          <p:cNvCxnSpPr/>
+              <a:latin typeface="Consolas" pitchFamily="49" charset="0"/>
+              <a:cs typeface="Consolas" pitchFamily="49" charset="0"/>
+            </a:endParaRPr>
+          </a:p>
+        </p:txBody>
+      </p:sp>
+      <p:sp>
+        <p:nvSpPr>
+          <p:cNvPr id="141" name="Flowchart: Connector 140"/>
+          <p:cNvSpPr/>
           <p:nvPr/>
-        </p:nvCxnSpPr>
+        </p:nvSpPr>
         <p:spPr>
           <a:xfrm>
-            <a:off x="4237831" y="480967"/>
-            <a:ext cx="0" cy="974647"/>
-          </a:xfrm>
-          <a:prstGeom prst="straightConnector1">
+            <a:off x="27683" y="384955"/>
+            <a:ext cx="159420" cy="159420"/>
+          </a:xfrm>
+          <a:prstGeom prst="flowChartConnector">
             <a:avLst/>
           </a:prstGeom>
-          <a:ln w="28575">
+          <a:solidFill>
+            <a:schemeClr val="bg1">
+              <a:lumMod val="75000"/>
+            </a:schemeClr>
+          </a:solidFill>
+          <a:ln>
             <a:solidFill>
-              <a:schemeClr val="accent6">
+              <a:schemeClr val="bg1">
                 <a:lumMod val="75000"/>
               </a:schemeClr>
             </a:solidFill>
-            <a:headEnd type="triangle" w="med" len="med"/>
-            <a:tailEnd type="none" w="med" len="med"/>
           </a:ln>
         </p:spPr>
         <p:style>
-          <a:lnRef idx="1">
-            <a:schemeClr val="accent1"/>
+          <a:lnRef idx="2">
+            <a:schemeClr val="accent1">
+              <a:shade val="50000"/>
+            </a:schemeClr>
           </a:lnRef>
-          <a:fillRef idx="0">
+          <a:fillRef idx="1">
             <a:schemeClr val="accent1"/>
           </a:fillRef>
           <a:effectRef idx="0">
             <a:schemeClr val="accent1"/>
           </a:effectRef>
           <a:fontRef idx="minor">
-            <a:schemeClr val="tx1"/>
+            <a:schemeClr val="lt1"/>
           </a:fontRef>
         </p:style>
-      </p:cxnSp>
-      <p:cxnSp>
-        <p:nvCxnSpPr>
-          <p:cNvPr id="149" name="Straight Arrow Connector 148"/>
-          <p:cNvCxnSpPr>
-            <a:stCxn id="177" idx="3"/>
-          </p:cNvCxnSpPr>
-          <p:nvPr/>
-        </p:nvCxnSpPr>
-        <p:spPr>
-          <a:xfrm>
-            <a:off x="4537505" y="302084"/>
-            <a:ext cx="386126" cy="0"/>
-          </a:xfrm>
-          <a:prstGeom prst="straightConnector1">
-            <a:avLst/>
-          </a:prstGeom>
-          <a:ln w="28575">
-            <a:solidFill>
-              <a:schemeClr val="accent6">
-                <a:lumMod val="75000"/>
-              </a:schemeClr>
-            </a:solidFill>
-            <a:headEnd type="none" w="med" len="med"/>
-            <a:tailEnd type="triangle" w="med" len="med"/>
-          </a:ln>
-        </p:spPr>
-        <p:style>
-          <a:lnRef idx="1">
-            <a:schemeClr val="accent1"/>
-          </a:lnRef>
-          <a:fillRef idx="0">
-            <a:schemeClr val="accent1"/>
-          </a:fillRef>
-          <a:effectRef idx="0">
-            <a:schemeClr val="accent1"/>
-          </a:effectRef>
-          <a:fontRef idx="minor">
-            <a:schemeClr val="tx1"/>
-          </a:fontRef>
-        </p:style>
-      </p:cxnSp>
-      <p:cxnSp>
-        <p:nvCxnSpPr>
-          <p:cNvPr id="150" name="Straight Arrow Connector 149"/>
-          <p:cNvCxnSpPr/>
-          <p:nvPr/>
-        </p:nvCxnSpPr>
-        <p:spPr>
-          <a:xfrm flipV="1">
-            <a:off x="3399631" y="450974"/>
-            <a:ext cx="0" cy="1004640"/>
-          </a:xfrm>
-          <a:prstGeom prst="straightConnector1">
-            <a:avLst/>
-          </a:prstGeom>
-          <a:ln w="28575">
-            <a:solidFill>
-              <a:srgbClr val="00B050"/>
-            </a:solidFill>
-            <a:headEnd type="triangle" w="med" len="med"/>
-            <a:tailEnd type="none" w="med" len="med"/>
-          </a:ln>
-        </p:spPr>
-        <p:style>
-          <a:lnRef idx="1">
-            <a:schemeClr val="accent1"/>
-          </a:lnRef>
-          <a:fillRef idx="0">
-            <a:schemeClr val="accent1"/>
-          </a:fillRef>
-          <a:effectRef idx="0">
-            <a:schemeClr val="accent1"/>
-          </a:effectRef>
-          <a:fontRef idx="minor">
-            <a:schemeClr val="tx1"/>
-          </a:fontRef>
-        </p:style>
-      </p:cxnSp>
-      <p:cxnSp>
-        <p:nvCxnSpPr>
-          <p:cNvPr id="151" name="Curved Connector 150"/>
-          <p:cNvCxnSpPr>
-            <a:stCxn id="139" idx="3"/>
-          </p:cNvCxnSpPr>
-          <p:nvPr/>
-        </p:nvCxnSpPr>
-        <p:spPr>
-          <a:xfrm>
-            <a:off x="6537325" y="302084"/>
-            <a:ext cx="304800" cy="637023"/>
-          </a:xfrm>
-          <a:prstGeom prst="curvedConnector2">
-            <a:avLst/>
-          </a:prstGeom>
-          <a:ln w="28575">
-            <a:solidFill>
-              <a:srgbClr val="7030A0"/>
-            </a:solidFill>
-            <a:headEnd type="none" w="med" len="med"/>
-            <a:tailEnd type="triangle" w="med" len="med"/>
-          </a:ln>
-        </p:spPr>
-        <p:style>
-          <a:lnRef idx="1">
-            <a:schemeClr val="accent1"/>
-          </a:lnRef>
-          <a:fillRef idx="0">
-            <a:schemeClr val="accent1"/>
-          </a:fillRef>
-          <a:effectRef idx="0">
-            <a:schemeClr val="accent1"/>
-          </a:effectRef>
-          <a:fontRef idx="minor">
-            <a:schemeClr val="tx1"/>
-          </a:fontRef>
-        </p:style>
-      </p:cxnSp>
+        <p:txBody>
+          <a:bodyPr rtlCol="0" anchor="ctr"/>
+          <a:lstStyle/>
+          <a:p>
+            <a:pPr algn="ctr"/>
+            <a:endParaRPr lang="en-SG"/>
+          </a:p>
+        </p:txBody>
+      </p:sp>
       <p:cxnSp>
         <p:nvCxnSpPr>
           <p:cNvPr id="152" name="Curved Connector 151"/>
           <p:cNvCxnSpPr>
             <a:stCxn id="139" idx="2"/>
-            <a:endCxn id="178" idx="3"/>
+            <a:endCxn id="171" idx="3"/>
           </p:cNvCxnSpPr>
           <p:nvPr/>
         </p:nvCxnSpPr>
         <p:spPr>
           <a:xfrm rot="5400000">
-            <a:off x="4677463" y="544742"/>
-            <a:ext cx="1153530" cy="965994"/>
+            <a:off x="4960884" y="143747"/>
+            <a:ext cx="571476" cy="3190744"/>
           </a:xfrm>
           <a:prstGeom prst="curvedConnector2">
             <a:avLst/>
@@ -4251,24 +3909,23 @@
         <p:nvCxnSpPr>
           <p:cNvPr id="158" name="Curved Connector 157"/>
           <p:cNvCxnSpPr>
-            <a:stCxn id="179" idx="2"/>
-            <a:endCxn id="138" idx="1"/>
+            <a:endCxn id="171" idx="1"/>
           </p:cNvCxnSpPr>
           <p:nvPr/>
         </p:nvCxnSpPr>
         <p:spPr>
-          <a:xfrm rot="16200000" flipH="1">
-            <a:off x="848334" y="1758464"/>
-            <a:ext cx="671606" cy="342624"/>
-          </a:xfrm>
-          <a:prstGeom prst="curvedConnector2">
-            <a:avLst/>
+          <a:xfrm>
+            <a:off x="441325" y="690714"/>
+            <a:ext cx="2971800" cy="1334143"/>
+          </a:xfrm>
+          <a:prstGeom prst="curvedConnector3">
+            <a:avLst>
+              <a:gd name="adj1" fmla="val 705"/>
+            </a:avLst>
           </a:prstGeom>
           <a:ln w="28575">
             <a:solidFill>
-              <a:schemeClr val="bg1">
-                <a:lumMod val="50000"/>
-              </a:schemeClr>
+              <a:srgbClr val="7030A0"/>
             </a:solidFill>
             <a:headEnd type="none" w="med" len="med"/>
             <a:tailEnd type="triangle" w="med" len="med"/>
@@ -4293,15 +3950,15 @@
         <p:nvCxnSpPr>
           <p:cNvPr id="172" name="Curved Connector 171"/>
           <p:cNvCxnSpPr>
-            <a:stCxn id="179" idx="0"/>
-            <a:endCxn id="135" idx="1"/>
+            <a:stCxn id="179" idx="3"/>
+            <a:endCxn id="135" idx="0"/>
           </p:cNvCxnSpPr>
           <p:nvPr/>
         </p:nvCxnSpPr>
         <p:spPr>
-          <a:xfrm rot="5400000" flipH="1" flipV="1">
-            <a:off x="796584" y="508453"/>
-            <a:ext cx="851583" cy="419100"/>
+          <a:xfrm>
+            <a:off x="1488977" y="465625"/>
+            <a:ext cx="278802" cy="373562"/>
           </a:xfrm>
           <a:prstGeom prst="curvedConnector2">
             <a:avLst/>
@@ -4309,88 +3966,6 @@
           <a:ln w="28575">
             <a:solidFill>
               <a:srgbClr val="00B050"/>
-            </a:solidFill>
-            <a:headEnd type="none" w="med" len="med"/>
-            <a:tailEnd type="triangle" w="med" len="med"/>
-          </a:ln>
-        </p:spPr>
-        <p:style>
-          <a:lnRef idx="1">
-            <a:schemeClr val="accent1"/>
-          </a:lnRef>
-          <a:fillRef idx="0">
-            <a:schemeClr val="accent1"/>
-          </a:fillRef>
-          <a:effectRef idx="0">
-            <a:schemeClr val="accent1"/>
-          </a:effectRef>
-          <a:fontRef idx="minor">
-            <a:schemeClr val="tx1"/>
-          </a:fontRef>
-        </p:style>
-      </p:cxnSp>
-      <p:cxnSp>
-        <p:nvCxnSpPr>
-          <p:cNvPr id="173" name="Straight Arrow Connector 172"/>
-          <p:cNvCxnSpPr>
-            <a:stCxn id="103" idx="2"/>
-            <a:endCxn id="144" idx="0"/>
-          </p:cNvCxnSpPr>
-          <p:nvPr/>
-        </p:nvCxnSpPr>
-        <p:spPr>
-          <a:xfrm>
-            <a:off x="6842125" y="1970110"/>
-            <a:ext cx="2098" cy="187469"/>
-          </a:xfrm>
-          <a:prstGeom prst="straightConnector1">
-            <a:avLst/>
-          </a:prstGeom>
-          <a:ln w="28575">
-            <a:solidFill>
-              <a:srgbClr val="0070C0"/>
-            </a:solidFill>
-            <a:headEnd type="none" w="med" len="med"/>
-            <a:tailEnd type="triangle" w="med" len="med"/>
-          </a:ln>
-        </p:spPr>
-        <p:style>
-          <a:lnRef idx="1">
-            <a:schemeClr val="accent1"/>
-          </a:lnRef>
-          <a:fillRef idx="0">
-            <a:schemeClr val="accent1"/>
-          </a:fillRef>
-          <a:effectRef idx="0">
-            <a:schemeClr val="accent1"/>
-          </a:effectRef>
-          <a:fontRef idx="minor">
-            <a:schemeClr val="tx1"/>
-          </a:fontRef>
-        </p:style>
-      </p:cxnSp>
-      <p:cxnSp>
-        <p:nvCxnSpPr>
-          <p:cNvPr id="174" name="Straight Arrow Connector 173"/>
-          <p:cNvCxnSpPr>
-            <a:stCxn id="138" idx="3"/>
-            <a:endCxn id="144" idx="2"/>
-          </p:cNvCxnSpPr>
-          <p:nvPr/>
-        </p:nvCxnSpPr>
-        <p:spPr>
-          <a:xfrm>
-            <a:off x="5318125" y="2265579"/>
-            <a:ext cx="1418098" cy="0"/>
-          </a:xfrm>
-          <a:prstGeom prst="straightConnector1">
-            <a:avLst/>
-          </a:prstGeom>
-          <a:ln w="28575">
-            <a:solidFill>
-              <a:schemeClr val="bg1">
-                <a:lumMod val="50000"/>
-              </a:schemeClr>
             </a:solidFill>
             <a:headEnd type="none" w="med" len="med"/>
             <a:tailEnd type="triangle" w="med" len="med"/>
@@ -4421,16 +3996,440 @@
           <p:nvPr/>
         </p:nvCxnSpPr>
         <p:spPr>
-          <a:xfrm flipV="1">
-            <a:off x="206251" y="1368884"/>
-            <a:ext cx="235074" cy="296"/>
+          <a:xfrm>
+            <a:off x="187103" y="464665"/>
+            <a:ext cx="158874" cy="960"/>
           </a:xfrm>
           <a:prstGeom prst="straightConnector1">
             <a:avLst/>
           </a:prstGeom>
           <a:ln w="28575">
             <a:solidFill>
-              <a:schemeClr val="tx1"/>
+              <a:schemeClr val="bg1">
+                <a:lumMod val="75000"/>
+              </a:schemeClr>
+            </a:solidFill>
+            <a:headEnd type="none" w="med" len="med"/>
+            <a:tailEnd type="triangle" w="med" len="med"/>
+          </a:ln>
+        </p:spPr>
+        <p:style>
+          <a:lnRef idx="1">
+            <a:schemeClr val="accent1"/>
+          </a:lnRef>
+          <a:fillRef idx="0">
+            <a:schemeClr val="accent1"/>
+          </a:fillRef>
+          <a:effectRef idx="0">
+            <a:schemeClr val="accent1"/>
+          </a:effectRef>
+          <a:fontRef idx="minor">
+            <a:schemeClr val="tx1"/>
+          </a:fontRef>
+        </p:style>
+      </p:cxnSp>
+      <p:sp>
+        <p:nvSpPr>
+          <p:cNvPr id="177" name="Rounded Rectangle 176"/>
+          <p:cNvSpPr/>
+          <p:nvPr/>
+        </p:nvSpPr>
+        <p:spPr>
+          <a:xfrm>
+            <a:off x="1913979" y="1219994"/>
+            <a:ext cx="1676400" cy="249589"/>
+          </a:xfrm>
+          <a:prstGeom prst="roundRect">
+            <a:avLst>
+              <a:gd name="adj" fmla="val 9190"/>
+            </a:avLst>
+          </a:prstGeom>
+          <a:solidFill>
+            <a:schemeClr val="bg1"/>
+          </a:solidFill>
+          <a:ln>
+            <a:noFill/>
+          </a:ln>
+        </p:spPr>
+        <p:style>
+          <a:lnRef idx="2">
+            <a:schemeClr val="accent2"/>
+          </a:lnRef>
+          <a:fillRef idx="1">
+            <a:schemeClr val="lt1"/>
+          </a:fillRef>
+          <a:effectRef idx="0">
+            <a:schemeClr val="accent2"/>
+          </a:effectRef>
+          <a:fontRef idx="minor">
+            <a:schemeClr val="dk1"/>
+          </a:fontRef>
+        </p:style>
+        <p:txBody>
+          <a:bodyPr vert="horz" rtlCol="0" anchor="ctr" anchorCtr="0"/>
+          <a:lstStyle/>
+          <a:p>
+            <a:pPr algn="ctr"/>
+            <a:r>
+              <a:rPr lang="en-US" sz="1400" dirty="0" err="1" smtClean="0">
+                <a:solidFill>
+                  <a:schemeClr val="tx1">
+                    <a:lumMod val="50000"/>
+                    <a:lumOff val="50000"/>
+                  </a:schemeClr>
+                </a:solidFill>
+                <a:latin typeface="Consolas" pitchFamily="49" charset="0"/>
+                <a:cs typeface="Consolas" pitchFamily="49" charset="0"/>
+              </a:rPr>
+              <a:t>Status.</a:t>
+            </a:r>
+            <a:r>
+              <a:rPr lang="en-US" sz="1400" b="1" dirty="0" err="1" smtClean="0">
+                <a:solidFill>
+                  <a:schemeClr val="tx1">
+                    <a:lumMod val="50000"/>
+                    <a:lumOff val="50000"/>
+                  </a:schemeClr>
+                </a:solidFill>
+                <a:latin typeface="Consolas" pitchFamily="49" charset="0"/>
+                <a:cs typeface="Consolas" pitchFamily="49" charset="0"/>
+              </a:rPr>
+              <a:t>Ongoing</a:t>
+            </a:r>
+            <a:endParaRPr lang="en-US" sz="1400" b="1" dirty="0" smtClean="0">
+              <a:solidFill>
+                <a:schemeClr val="tx1">
+                  <a:lumMod val="50000"/>
+                  <a:lumOff val="50000"/>
+                </a:schemeClr>
+              </a:solidFill>
+              <a:latin typeface="Consolas" pitchFamily="49" charset="0"/>
+              <a:cs typeface="Consolas" pitchFamily="49" charset="0"/>
+            </a:endParaRPr>
+          </a:p>
+        </p:txBody>
+      </p:sp>
+      <p:sp>
+        <p:nvSpPr>
+          <p:cNvPr id="178" name="Rounded Rectangle 177"/>
+          <p:cNvSpPr/>
+          <p:nvPr/>
+        </p:nvSpPr>
+        <p:spPr>
+          <a:xfrm>
+            <a:off x="4233481" y="313064"/>
+            <a:ext cx="2269468" cy="231311"/>
+          </a:xfrm>
+          <a:prstGeom prst="roundRect">
+            <a:avLst>
+              <a:gd name="adj" fmla="val 9190"/>
+            </a:avLst>
+          </a:prstGeom>
+          <a:solidFill>
+            <a:schemeClr val="bg1"/>
+          </a:solidFill>
+          <a:ln>
+            <a:noFill/>
+          </a:ln>
+        </p:spPr>
+        <p:style>
+          <a:lnRef idx="2">
+            <a:schemeClr val="accent2"/>
+          </a:lnRef>
+          <a:fillRef idx="1">
+            <a:schemeClr val="lt1"/>
+          </a:fillRef>
+          <a:effectRef idx="0">
+            <a:schemeClr val="accent2"/>
+          </a:effectRef>
+          <a:fontRef idx="minor">
+            <a:schemeClr val="dk1"/>
+          </a:fontRef>
+        </p:style>
+        <p:txBody>
+          <a:bodyPr vert="horz" rtlCol="0" anchor="ctr" anchorCtr="0"/>
+          <a:lstStyle/>
+          <a:p>
+            <a:pPr algn="ctr"/>
+            <a:r>
+              <a:rPr lang="en-US" sz="1400" dirty="0" err="1" smtClean="0">
+                <a:solidFill>
+                  <a:schemeClr val="tx1">
+                    <a:lumMod val="50000"/>
+                    <a:lumOff val="50000"/>
+                  </a:schemeClr>
+                </a:solidFill>
+                <a:latin typeface="Consolas" pitchFamily="49" charset="0"/>
+                <a:cs typeface="Consolas" pitchFamily="49" charset="0"/>
+              </a:rPr>
+              <a:t>status.</a:t>
+            </a:r>
+            <a:r>
+              <a:rPr lang="en-US" sz="1400" b="1" dirty="0" err="1" smtClean="0">
+                <a:solidFill>
+                  <a:schemeClr val="tx1">
+                    <a:lumMod val="50000"/>
+                    <a:lumOff val="50000"/>
+                  </a:schemeClr>
+                </a:solidFill>
+                <a:latin typeface="Consolas" pitchFamily="49" charset="0"/>
+                <a:cs typeface="Consolas" pitchFamily="49" charset="0"/>
+              </a:rPr>
+              <a:t>PendingReview</a:t>
+            </a:r>
+            <a:endParaRPr lang="en-US" sz="1400" b="1" dirty="0">
+              <a:solidFill>
+                <a:schemeClr val="tx1">
+                  <a:lumMod val="50000"/>
+                  <a:lumOff val="50000"/>
+                </a:schemeClr>
+              </a:solidFill>
+              <a:latin typeface="Consolas" pitchFamily="49" charset="0"/>
+              <a:cs typeface="Consolas" pitchFamily="49" charset="0"/>
+            </a:endParaRPr>
+          </a:p>
+        </p:txBody>
+      </p:sp>
+      <p:sp>
+        <p:nvSpPr>
+          <p:cNvPr id="179" name="Rounded Rectangle 178"/>
+          <p:cNvSpPr/>
+          <p:nvPr/>
+        </p:nvSpPr>
+        <p:spPr>
+          <a:xfrm>
+            <a:off x="345977" y="240535"/>
+            <a:ext cx="1143000" cy="450179"/>
+          </a:xfrm>
+          <a:prstGeom prst="roundRect">
+            <a:avLst>
+              <a:gd name="adj" fmla="val 9190"/>
+            </a:avLst>
+          </a:prstGeom>
+          <a:solidFill>
+            <a:schemeClr val="bg1"/>
+          </a:solidFill>
+          <a:ln>
+            <a:noFill/>
+          </a:ln>
+        </p:spPr>
+        <p:style>
+          <a:lnRef idx="2">
+            <a:schemeClr val="accent2"/>
+          </a:lnRef>
+          <a:fillRef idx="1">
+            <a:schemeClr val="lt1"/>
+          </a:fillRef>
+          <a:effectRef idx="0">
+            <a:schemeClr val="accent2"/>
+          </a:effectRef>
+          <a:fontRef idx="minor">
+            <a:schemeClr val="dk1"/>
+          </a:fontRef>
+        </p:style>
+        <p:txBody>
+          <a:bodyPr vert="horz" lIns="0" rIns="0" rtlCol="0" anchor="ctr" anchorCtr="0"/>
+          <a:lstStyle/>
+          <a:p>
+            <a:pPr algn="ctr"/>
+            <a:r>
+              <a:rPr lang="en-US" sz="1400" b="1" dirty="0" smtClean="0">
+                <a:solidFill>
+                  <a:schemeClr val="tx1">
+                    <a:lumMod val="50000"/>
+                    <a:lumOff val="50000"/>
+                  </a:schemeClr>
+                </a:solidFill>
+                <a:latin typeface="Consolas" pitchFamily="49" charset="0"/>
+                <a:cs typeface="Consolas" pitchFamily="49" charset="0"/>
+              </a:rPr>
+              <a:t>New </a:t>
+            </a:r>
+            <a:br>
+              <a:rPr lang="en-US" sz="1400" b="1" dirty="0" smtClean="0">
+                <a:solidFill>
+                  <a:schemeClr val="tx1">
+                    <a:lumMod val="50000"/>
+                    <a:lumOff val="50000"/>
+                  </a:schemeClr>
+                </a:solidFill>
+                <a:latin typeface="Consolas" pitchFamily="49" charset="0"/>
+                <a:cs typeface="Consolas" pitchFamily="49" charset="0"/>
+              </a:rPr>
+            </a:br>
+            <a:r>
+              <a:rPr lang="en-US" sz="1400" dirty="0" smtClean="0">
+                <a:solidFill>
+                  <a:schemeClr val="tx1">
+                    <a:lumMod val="50000"/>
+                    <a:lumOff val="50000"/>
+                  </a:schemeClr>
+                </a:solidFill>
+                <a:latin typeface="Consolas" pitchFamily="49" charset="0"/>
+                <a:cs typeface="Consolas" pitchFamily="49" charset="0"/>
+              </a:rPr>
+              <a:t>[no status]</a:t>
+            </a:r>
+          </a:p>
+        </p:txBody>
+      </p:sp>
+      <p:sp>
+        <p:nvSpPr>
+          <p:cNvPr id="192" name="TextBox 191"/>
+          <p:cNvSpPr txBox="1"/>
+          <p:nvPr/>
+        </p:nvSpPr>
+        <p:spPr>
+          <a:xfrm>
+            <a:off x="123207" y="2226972"/>
+            <a:ext cx="533400" cy="323165"/>
+          </a:xfrm>
+          <a:prstGeom prst="rect">
+            <a:avLst/>
+          </a:prstGeom>
+          <a:noFill/>
+        </p:spPr>
+        <p:txBody>
+          <a:bodyPr wrap="square" rtlCol="0">
+            <a:spAutoFit/>
+          </a:bodyPr>
+          <a:lstStyle/>
+          <a:p>
+            <a:pPr algn="r"/>
+            <a:r>
+              <a:rPr lang="en-US" b="1" dirty="0" err="1" smtClean="0">
+                <a:solidFill>
+                  <a:srgbClr val="00B050"/>
+                </a:solidFill>
+              </a:rPr>
+              <a:t>Dev</a:t>
+            </a:r>
+            <a:endParaRPr lang="en-SG" b="1" dirty="0">
+              <a:solidFill>
+                <a:srgbClr val="00B050"/>
+              </a:solidFill>
+            </a:endParaRPr>
+          </a:p>
+        </p:txBody>
+      </p:sp>
+      <p:sp>
+        <p:nvSpPr>
+          <p:cNvPr id="193" name="TextBox 192"/>
+          <p:cNvSpPr txBox="1"/>
+          <p:nvPr/>
+        </p:nvSpPr>
+        <p:spPr>
+          <a:xfrm>
+            <a:off x="1009590" y="2236377"/>
+            <a:ext cx="958774" cy="323165"/>
+          </a:xfrm>
+          <a:prstGeom prst="rect">
+            <a:avLst/>
+          </a:prstGeom>
+          <a:noFill/>
+        </p:spPr>
+        <p:txBody>
+          <a:bodyPr wrap="square" rtlCol="0">
+            <a:spAutoFit/>
+          </a:bodyPr>
+          <a:lstStyle/>
+          <a:p>
+            <a:pPr algn="r"/>
+            <a:r>
+              <a:rPr lang="en-US" b="1" dirty="0" smtClean="0">
+                <a:solidFill>
+                  <a:schemeClr val="accent6">
+                    <a:lumMod val="75000"/>
+                  </a:schemeClr>
+                </a:solidFill>
+              </a:rPr>
+              <a:t>Reviewer</a:t>
+            </a:r>
+            <a:endParaRPr lang="en-SG" b="1" dirty="0">
+              <a:solidFill>
+                <a:schemeClr val="accent6">
+                  <a:lumMod val="75000"/>
+                </a:schemeClr>
+              </a:solidFill>
+            </a:endParaRPr>
+          </a:p>
+        </p:txBody>
+      </p:sp>
+      <p:sp>
+        <p:nvSpPr>
+          <p:cNvPr id="194" name="TextBox 193"/>
+          <p:cNvSpPr txBox="1"/>
+          <p:nvPr/>
+        </p:nvSpPr>
+        <p:spPr>
+          <a:xfrm>
+            <a:off x="2270125" y="2256368"/>
+            <a:ext cx="1103123" cy="323165"/>
+          </a:xfrm>
+          <a:prstGeom prst="rect">
+            <a:avLst/>
+          </a:prstGeom>
+          <a:noFill/>
+        </p:spPr>
+        <p:txBody>
+          <a:bodyPr wrap="square" rtlCol="0">
+            <a:spAutoFit/>
+          </a:bodyPr>
+          <a:lstStyle/>
+          <a:p>
+            <a:pPr algn="r"/>
+            <a:r>
+              <a:rPr lang="en-US" b="1" dirty="0" smtClean="0">
+                <a:solidFill>
+                  <a:srgbClr val="7030A0"/>
+                </a:solidFill>
+              </a:rPr>
+              <a:t>Area</a:t>
+            </a:r>
+            <a:r>
+              <a:rPr lang="en-US" b="1" dirty="0" smtClean="0">
+                <a:solidFill>
+                  <a:srgbClr val="7030A0"/>
+                </a:solidFill>
+              </a:rPr>
+              <a:t> </a:t>
+            </a:r>
+            <a:r>
+              <a:rPr lang="en-US" b="1" dirty="0" smtClean="0">
+                <a:solidFill>
+                  <a:srgbClr val="7030A0"/>
+                </a:solidFill>
+              </a:rPr>
+              <a:t>Lead</a:t>
+            </a:r>
+            <a:endParaRPr lang="en-SG" b="1" dirty="0">
+              <a:solidFill>
+                <a:srgbClr val="7030A0"/>
+              </a:solidFill>
+            </a:endParaRPr>
+          </a:p>
+        </p:txBody>
+      </p:sp>
+      <p:cxnSp>
+        <p:nvCxnSpPr>
+          <p:cNvPr id="61" name="Curved Connector 60"/>
+          <p:cNvCxnSpPr>
+            <a:stCxn id="135" idx="3"/>
+            <a:endCxn id="177" idx="0"/>
+          </p:cNvCxnSpPr>
+          <p:nvPr/>
+        </p:nvCxnSpPr>
+        <p:spPr>
+          <a:xfrm>
+            <a:off x="2618082" y="959067"/>
+            <a:ext cx="134097" cy="260927"/>
+          </a:xfrm>
+          <a:prstGeom prst="curvedConnector2">
+            <a:avLst/>
+          </a:prstGeom>
+          <a:ln w="28575">
+            <a:solidFill>
+              <a:srgbClr val="00B050"/>
             </a:solidFill>
             <a:headEnd type="none" w="med" len="med"/>
             <a:tailEnd type="triangle" w="med" len="med"/>
@@ -4453,19 +4452,22 @@
       </p:cxnSp>
       <p:cxnSp>
         <p:nvCxnSpPr>
-          <p:cNvPr id="176" name="Straight Arrow Connector 175"/>
+          <p:cNvPr id="64" name="Curved Connector 63"/>
           <p:cNvCxnSpPr>
-            <a:endCxn id="142" idx="0"/>
+            <a:stCxn id="177" idx="3"/>
+            <a:endCxn id="171" idx="3"/>
           </p:cNvCxnSpPr>
           <p:nvPr/>
         </p:nvCxnSpPr>
         <p:spPr>
           <a:xfrm>
-            <a:off x="6833056" y="1167707"/>
-            <a:ext cx="9069" cy="214476"/>
-          </a:xfrm>
-          <a:prstGeom prst="straightConnector1">
-            <a:avLst/>
+            <a:off x="3590379" y="1344789"/>
+            <a:ext cx="60871" cy="680068"/>
+          </a:xfrm>
+          <a:prstGeom prst="curvedConnector3">
+            <a:avLst>
+              <a:gd name="adj1" fmla="val 475548"/>
+            </a:avLst>
           </a:prstGeom>
           <a:ln w="28575">
             <a:solidFill>
@@ -4492,24 +4494,118 @@
       </p:cxnSp>
       <p:sp>
         <p:nvSpPr>
-          <p:cNvPr id="177" name="Rounded Rectangle 176"/>
+          <p:cNvPr id="114" name="Flowchart: Connector 113"/>
           <p:cNvSpPr/>
           <p:nvPr/>
         </p:nvSpPr>
         <p:spPr>
           <a:xfrm>
-            <a:off x="3037252" y="153194"/>
-            <a:ext cx="1500253" cy="297780"/>
+            <a:off x="3927377" y="384955"/>
+            <a:ext cx="159420" cy="159420"/>
+          </a:xfrm>
+          <a:prstGeom prst="flowChartConnector">
+            <a:avLst/>
+          </a:prstGeom>
+          <a:solidFill>
+            <a:schemeClr val="bg1">
+              <a:lumMod val="75000"/>
+            </a:schemeClr>
+          </a:solidFill>
+          <a:ln>
+            <a:solidFill>
+              <a:schemeClr val="bg1">
+                <a:lumMod val="75000"/>
+              </a:schemeClr>
+            </a:solidFill>
+          </a:ln>
+        </p:spPr>
+        <p:style>
+          <a:lnRef idx="2">
+            <a:schemeClr val="accent1">
+              <a:shade val="50000"/>
+            </a:schemeClr>
+          </a:lnRef>
+          <a:fillRef idx="1">
+            <a:schemeClr val="accent1"/>
+          </a:fillRef>
+          <a:effectRef idx="0">
+            <a:schemeClr val="accent1"/>
+          </a:effectRef>
+          <a:fontRef idx="minor">
+            <a:schemeClr val="lt1"/>
+          </a:fontRef>
+        </p:style>
+        <p:txBody>
+          <a:bodyPr rtlCol="0" anchor="ctr"/>
+          <a:lstStyle/>
+          <a:p>
+            <a:pPr algn="ctr"/>
+            <a:endParaRPr lang="en-SG"/>
+          </a:p>
+        </p:txBody>
+      </p:sp>
+      <p:cxnSp>
+        <p:nvCxnSpPr>
+          <p:cNvPr id="115" name="Straight Arrow Connector 114"/>
+          <p:cNvCxnSpPr>
+            <a:stCxn id="114" idx="6"/>
+          </p:cNvCxnSpPr>
+          <p:nvPr/>
+        </p:nvCxnSpPr>
+        <p:spPr>
+          <a:xfrm>
+            <a:off x="4086797" y="464665"/>
+            <a:ext cx="158874" cy="960"/>
+          </a:xfrm>
+          <a:prstGeom prst="straightConnector1">
+            <a:avLst/>
+          </a:prstGeom>
+          <a:ln w="28575">
+            <a:solidFill>
+              <a:schemeClr val="bg1">
+                <a:lumMod val="75000"/>
+              </a:schemeClr>
+            </a:solidFill>
+            <a:headEnd type="none" w="med" len="med"/>
+            <a:tailEnd type="triangle" w="med" len="med"/>
+          </a:ln>
+        </p:spPr>
+        <p:style>
+          <a:lnRef idx="1">
+            <a:schemeClr val="accent1"/>
+          </a:lnRef>
+          <a:fillRef idx="0">
+            <a:schemeClr val="accent1"/>
+          </a:fillRef>
+          <a:effectRef idx="0">
+            <a:schemeClr val="accent1"/>
+          </a:effectRef>
+          <a:fontRef idx="minor">
+            <a:schemeClr val="tx1"/>
+          </a:fontRef>
+        </p:style>
+      </p:cxnSp>
+      <p:sp>
+        <p:nvSpPr>
+          <p:cNvPr id="120" name="Rounded Rectangle 119"/>
+          <p:cNvSpPr/>
+          <p:nvPr/>
+        </p:nvSpPr>
+        <p:spPr>
+          <a:xfrm>
+            <a:off x="4086797" y="1201381"/>
+            <a:ext cx="1593180" cy="252000"/>
           </a:xfrm>
           <a:prstGeom prst="roundRect">
             <a:avLst>
               <a:gd name="adj" fmla="val 9190"/>
             </a:avLst>
           </a:prstGeom>
+          <a:solidFill>
+            <a:schemeClr val="bg1"/>
+          </a:solidFill>
           <a:ln>
-            <a:solidFill>
-              <a:srgbClr val="00B050"/>
-            </a:solidFill>
+            <a:noFill/>
           </a:ln>
         </p:spPr>
         <p:style>
@@ -4534,26 +4630,35 @@
             <a:r>
               <a:rPr lang="en-US" sz="1400" dirty="0" err="1" smtClean="0">
                 <a:solidFill>
-                  <a:srgbClr val="00B050"/>
+                  <a:schemeClr val="tx1">
+                    <a:lumMod val="50000"/>
+                    <a:lumOff val="50000"/>
+                  </a:schemeClr>
                 </a:solidFill>
                 <a:latin typeface="Consolas" pitchFamily="49" charset="0"/>
                 <a:cs typeface="Consolas" pitchFamily="49" charset="0"/>
               </a:rPr>
-              <a:t>s.</a:t>
+              <a:t>Status.</a:t>
             </a:r>
             <a:r>
               <a:rPr lang="en-US" sz="1400" b="1" dirty="0" err="1" smtClean="0">
                 <a:solidFill>
-                  <a:srgbClr val="00B050"/>
+                  <a:schemeClr val="tx1">
+                    <a:lumMod val="50000"/>
+                    <a:lumOff val="50000"/>
+                  </a:schemeClr>
                 </a:solidFill>
                 <a:latin typeface="Consolas" pitchFamily="49" charset="0"/>
                 <a:cs typeface="Consolas" pitchFamily="49" charset="0"/>
               </a:rPr>
-              <a:t>Fixing</a:t>
+              <a:t>Ongoing</a:t>
             </a:r>
             <a:endParaRPr lang="en-US" sz="1400" b="1" dirty="0" smtClean="0">
               <a:solidFill>
-                <a:srgbClr val="00B050"/>
+                <a:schemeClr val="tx1">
+                  <a:lumMod val="50000"/>
+                  <a:lumOff val="50000"/>
+                </a:schemeClr>
               </a:solidFill>
               <a:latin typeface="Consolas" pitchFamily="49" charset="0"/>
               <a:cs typeface="Consolas" pitchFamily="49" charset="0"/>
@@ -4561,858 +4666,27 @@
           </a:p>
         </p:txBody>
       </p:sp>
-      <p:sp>
-        <p:nvSpPr>
-          <p:cNvPr id="178" name="Rounded Rectangle 177"/>
-          <p:cNvSpPr/>
-          <p:nvPr/>
-        </p:nvSpPr>
-        <p:spPr>
-          <a:xfrm>
-            <a:off x="2942431" y="1455614"/>
-            <a:ext cx="1828800" cy="297780"/>
-          </a:xfrm>
-          <a:prstGeom prst="roundRect">
-            <a:avLst>
-              <a:gd name="adj" fmla="val 9190"/>
-            </a:avLst>
-          </a:prstGeom>
-          <a:ln>
-            <a:solidFill>
-              <a:srgbClr val="00B050"/>
-            </a:solidFill>
-          </a:ln>
-        </p:spPr>
-        <p:style>
-          <a:lnRef idx="2">
-            <a:schemeClr val="accent2"/>
-          </a:lnRef>
-          <a:fillRef idx="1">
-            <a:schemeClr val="lt1"/>
-          </a:fillRef>
-          <a:effectRef idx="0">
-            <a:schemeClr val="accent2"/>
-          </a:effectRef>
-          <a:fontRef idx="minor">
-            <a:schemeClr val="dk1"/>
-          </a:fontRef>
-        </p:style>
-        <p:txBody>
-          <a:bodyPr vert="horz" rtlCol="0" anchor="ctr" anchorCtr="0"/>
-          <a:lstStyle/>
-          <a:p>
-            <a:pPr algn="ctr"/>
-            <a:r>
-              <a:rPr lang="en-US" sz="1400" dirty="0" err="1" smtClean="0">
-                <a:solidFill>
-                  <a:srgbClr val="00B050"/>
-                </a:solidFill>
-                <a:latin typeface="Consolas" pitchFamily="49" charset="0"/>
-                <a:cs typeface="Consolas" pitchFamily="49" charset="0"/>
-              </a:rPr>
-              <a:t>s.</a:t>
-            </a:r>
-            <a:r>
-              <a:rPr lang="en-US" sz="1400" b="1" dirty="0" err="1" smtClean="0">
-                <a:solidFill>
-                  <a:srgbClr val="00B050"/>
-                </a:solidFill>
-                <a:latin typeface="Consolas" pitchFamily="49" charset="0"/>
-                <a:cs typeface="Consolas" pitchFamily="49" charset="0"/>
-              </a:rPr>
-              <a:t>PendingReview</a:t>
-            </a:r>
-            <a:endParaRPr lang="en-US" sz="1400" b="1" dirty="0">
-              <a:solidFill>
-                <a:srgbClr val="00B050"/>
-              </a:solidFill>
-              <a:latin typeface="Consolas" pitchFamily="49" charset="0"/>
-              <a:cs typeface="Consolas" pitchFamily="49" charset="0"/>
-            </a:endParaRPr>
-          </a:p>
-        </p:txBody>
-      </p:sp>
-      <p:sp>
-        <p:nvSpPr>
-          <p:cNvPr id="179" name="Rounded Rectangle 178"/>
-          <p:cNvSpPr/>
-          <p:nvPr/>
-        </p:nvSpPr>
-        <p:spPr>
-          <a:xfrm>
-            <a:off x="441325" y="1143794"/>
-            <a:ext cx="1143000" cy="450179"/>
-          </a:xfrm>
-          <a:prstGeom prst="roundRect">
-            <a:avLst>
-              <a:gd name="adj" fmla="val 9190"/>
-            </a:avLst>
-          </a:prstGeom>
-          <a:ln>
-            <a:solidFill>
-              <a:schemeClr val="tx1"/>
-            </a:solidFill>
-          </a:ln>
-        </p:spPr>
-        <p:style>
-          <a:lnRef idx="2">
-            <a:schemeClr val="accent2"/>
-          </a:lnRef>
-          <a:fillRef idx="1">
-            <a:schemeClr val="lt1"/>
-          </a:fillRef>
-          <a:effectRef idx="0">
-            <a:schemeClr val="accent2"/>
-          </a:effectRef>
-          <a:fontRef idx="minor">
-            <a:schemeClr val="dk1"/>
-          </a:fontRef>
-        </p:style>
-        <p:txBody>
-          <a:bodyPr vert="horz" lIns="0" rIns="0" rtlCol="0" anchor="ctr" anchorCtr="0"/>
-          <a:lstStyle/>
-          <a:p>
-            <a:pPr algn="ctr"/>
-            <a:r>
-              <a:rPr lang="en-US" sz="1400" b="1" dirty="0" smtClean="0">
-                <a:solidFill>
-                  <a:schemeClr val="tx1"/>
-                </a:solidFill>
-                <a:latin typeface="Consolas" pitchFamily="49" charset="0"/>
-                <a:cs typeface="Consolas" pitchFamily="49" charset="0"/>
-              </a:rPr>
-              <a:t>New </a:t>
-            </a:r>
-            <a:br>
-              <a:rPr lang="en-US" sz="1400" b="1" dirty="0" smtClean="0">
-                <a:solidFill>
-                  <a:schemeClr val="tx1"/>
-                </a:solidFill>
-                <a:latin typeface="Consolas" pitchFamily="49" charset="0"/>
-                <a:cs typeface="Consolas" pitchFamily="49" charset="0"/>
-              </a:rPr>
-            </a:br>
-            <a:r>
-              <a:rPr lang="en-US" sz="1400" dirty="0" smtClean="0">
-                <a:solidFill>
-                  <a:schemeClr val="tx1"/>
-                </a:solidFill>
-                <a:latin typeface="Consolas" pitchFamily="49" charset="0"/>
-                <a:cs typeface="Consolas" pitchFamily="49" charset="0"/>
-              </a:rPr>
-              <a:t>[no status]</a:t>
-            </a:r>
-          </a:p>
-        </p:txBody>
-      </p:sp>
-      <p:grpSp>
-        <p:nvGrpSpPr>
-          <p:cNvPr id="180" name="Group 179"/>
-          <p:cNvGrpSpPr>
-            <a:grpSpLocks noChangeAspect="1"/>
-          </p:cNvGrpSpPr>
-          <p:nvPr/>
-        </p:nvGrpSpPr>
-        <p:grpSpPr>
-          <a:xfrm>
-            <a:off x="3561681" y="713187"/>
-            <a:ext cx="192024" cy="336042"/>
-            <a:chOff x="2339181" y="3718719"/>
-            <a:chExt cx="304800" cy="533400"/>
-          </a:xfrm>
-          <a:solidFill>
-            <a:schemeClr val="accent3">
-              <a:lumMod val="60000"/>
-              <a:lumOff val="40000"/>
-            </a:schemeClr>
-          </a:solidFill>
-        </p:grpSpPr>
-        <p:sp>
-          <p:nvSpPr>
-            <p:cNvPr id="181" name="Flowchart: Connector 180"/>
-            <p:cNvSpPr/>
-            <p:nvPr/>
-          </p:nvSpPr>
-          <p:spPr>
-            <a:xfrm>
-              <a:off x="2377281" y="3718719"/>
-              <a:ext cx="228600" cy="228600"/>
-            </a:xfrm>
-            <a:prstGeom prst="flowChartConnector">
-              <a:avLst/>
-            </a:prstGeom>
-            <a:grpFill/>
-            <a:ln>
-              <a:solidFill>
-                <a:srgbClr val="00B050"/>
-              </a:solidFill>
-            </a:ln>
-          </p:spPr>
-          <p:style>
-            <a:lnRef idx="2">
-              <a:schemeClr val="accent5">
-                <a:shade val="50000"/>
-              </a:schemeClr>
-            </a:lnRef>
-            <a:fillRef idx="1">
-              <a:schemeClr val="accent5"/>
-            </a:fillRef>
-            <a:effectRef idx="0">
-              <a:schemeClr val="accent5"/>
-            </a:effectRef>
-            <a:fontRef idx="minor">
-              <a:schemeClr val="lt1"/>
-            </a:fontRef>
-          </p:style>
-          <p:txBody>
-            <a:bodyPr rtlCol="0" anchor="ctr"/>
-            <a:lstStyle/>
-            <a:p>
-              <a:pPr algn="ctr"/>
-              <a:endParaRPr lang="en-US" b="1"/>
-            </a:p>
-          </p:txBody>
-        </p:sp>
-        <p:sp>
-          <p:nvSpPr>
-            <p:cNvPr id="182" name="Flowchart: Delay 181"/>
-            <p:cNvSpPr/>
-            <p:nvPr/>
-          </p:nvSpPr>
-          <p:spPr>
-            <a:xfrm rot="16200000">
-              <a:off x="2339181" y="3947319"/>
-              <a:ext cx="304800" cy="304800"/>
-            </a:xfrm>
-            <a:prstGeom prst="flowChartDelay">
-              <a:avLst/>
-            </a:prstGeom>
-            <a:grpFill/>
-            <a:ln>
-              <a:solidFill>
-                <a:srgbClr val="00B050"/>
-              </a:solidFill>
-            </a:ln>
-          </p:spPr>
-          <p:style>
-            <a:lnRef idx="2">
-              <a:schemeClr val="accent5">
-                <a:shade val="50000"/>
-              </a:schemeClr>
-            </a:lnRef>
-            <a:fillRef idx="1">
-              <a:schemeClr val="accent5"/>
-            </a:fillRef>
-            <a:effectRef idx="0">
-              <a:schemeClr val="accent5"/>
-            </a:effectRef>
-            <a:fontRef idx="minor">
-              <a:schemeClr val="lt1"/>
-            </a:fontRef>
-          </p:style>
-          <p:txBody>
-            <a:bodyPr rtlCol="0" anchor="ctr"/>
-            <a:lstStyle/>
-            <a:p>
-              <a:pPr algn="ctr"/>
-              <a:endParaRPr lang="en-US" b="1"/>
-            </a:p>
-          </p:txBody>
-        </p:sp>
-      </p:grpSp>
-      <p:grpSp>
-        <p:nvGrpSpPr>
-          <p:cNvPr id="183" name="Group 182"/>
-          <p:cNvGrpSpPr>
-            <a:grpSpLocks noChangeAspect="1"/>
-          </p:cNvGrpSpPr>
-          <p:nvPr/>
-        </p:nvGrpSpPr>
-        <p:grpSpPr>
-          <a:xfrm>
-            <a:off x="4672147" y="599158"/>
-            <a:ext cx="192024" cy="336042"/>
-            <a:chOff x="2339181" y="3718719"/>
-            <a:chExt cx="304800" cy="533400"/>
-          </a:xfrm>
-        </p:grpSpPr>
-        <p:sp>
-          <p:nvSpPr>
-            <p:cNvPr id="184" name="Flowchart: Connector 183"/>
-            <p:cNvSpPr/>
-            <p:nvPr/>
-          </p:nvSpPr>
-          <p:spPr>
-            <a:xfrm>
-              <a:off x="2377281" y="3718719"/>
-              <a:ext cx="228600" cy="228600"/>
-            </a:xfrm>
-            <a:prstGeom prst="flowChartConnector">
-              <a:avLst/>
-            </a:prstGeom>
-          </p:spPr>
-          <p:style>
-            <a:lnRef idx="2">
-              <a:schemeClr val="accent6">
-                <a:shade val="50000"/>
-              </a:schemeClr>
-            </a:lnRef>
-            <a:fillRef idx="1">
-              <a:schemeClr val="accent6"/>
-            </a:fillRef>
-            <a:effectRef idx="0">
-              <a:schemeClr val="accent6"/>
-            </a:effectRef>
-            <a:fontRef idx="minor">
-              <a:schemeClr val="lt1"/>
-            </a:fontRef>
-          </p:style>
-          <p:txBody>
-            <a:bodyPr rtlCol="0" anchor="ctr"/>
-            <a:lstStyle/>
-            <a:p>
-              <a:pPr algn="ctr"/>
-              <a:endParaRPr lang="en-US" b="1"/>
-            </a:p>
-          </p:txBody>
-        </p:sp>
-        <p:sp>
-          <p:nvSpPr>
-            <p:cNvPr id="185" name="Flowchart: Delay 184"/>
-            <p:cNvSpPr/>
-            <p:nvPr/>
-          </p:nvSpPr>
-          <p:spPr>
-            <a:xfrm rot="16200000">
-              <a:off x="2339181" y="3947319"/>
-              <a:ext cx="304800" cy="304800"/>
-            </a:xfrm>
-            <a:prstGeom prst="flowChartDelay">
-              <a:avLst/>
-            </a:prstGeom>
-          </p:spPr>
-          <p:style>
-            <a:lnRef idx="2">
-              <a:schemeClr val="accent6">
-                <a:shade val="50000"/>
-              </a:schemeClr>
-            </a:lnRef>
-            <a:fillRef idx="1">
-              <a:schemeClr val="accent6"/>
-            </a:fillRef>
-            <a:effectRef idx="0">
-              <a:schemeClr val="accent6"/>
-            </a:effectRef>
-            <a:fontRef idx="minor">
-              <a:schemeClr val="lt1"/>
-            </a:fontRef>
-          </p:style>
-          <p:txBody>
-            <a:bodyPr rtlCol="0" anchor="ctr"/>
-            <a:lstStyle/>
-            <a:p>
-              <a:pPr algn="ctr"/>
-              <a:endParaRPr lang="en-US" b="1"/>
-            </a:p>
-          </p:txBody>
-        </p:sp>
-      </p:grpSp>
-      <p:grpSp>
-        <p:nvGrpSpPr>
-          <p:cNvPr id="186" name="Group 185"/>
-          <p:cNvGrpSpPr>
-            <a:grpSpLocks noChangeAspect="1"/>
-          </p:cNvGrpSpPr>
-          <p:nvPr/>
-        </p:nvGrpSpPr>
-        <p:grpSpPr>
-          <a:xfrm>
-            <a:off x="7117482" y="240937"/>
-            <a:ext cx="192024" cy="336042"/>
-            <a:chOff x="2339181" y="3718719"/>
-            <a:chExt cx="304800" cy="533400"/>
-          </a:xfrm>
-        </p:grpSpPr>
-        <p:sp>
-          <p:nvSpPr>
-            <p:cNvPr id="187" name="Flowchart: Connector 186"/>
-            <p:cNvSpPr/>
-            <p:nvPr/>
-          </p:nvSpPr>
-          <p:spPr>
-            <a:xfrm>
-              <a:off x="2377281" y="3718719"/>
-              <a:ext cx="228600" cy="228600"/>
-            </a:xfrm>
-            <a:prstGeom prst="flowChartConnector">
-              <a:avLst/>
-            </a:prstGeom>
-          </p:spPr>
-          <p:style>
-            <a:lnRef idx="2">
-              <a:schemeClr val="accent4">
-                <a:shade val="50000"/>
-              </a:schemeClr>
-            </a:lnRef>
-            <a:fillRef idx="1">
-              <a:schemeClr val="accent4"/>
-            </a:fillRef>
-            <a:effectRef idx="0">
-              <a:schemeClr val="accent4"/>
-            </a:effectRef>
-            <a:fontRef idx="minor">
-              <a:schemeClr val="lt1"/>
-            </a:fontRef>
-          </p:style>
-          <p:txBody>
-            <a:bodyPr rtlCol="0" anchor="ctr"/>
-            <a:lstStyle/>
-            <a:p>
-              <a:pPr algn="ctr"/>
-              <a:endParaRPr lang="en-US" b="1"/>
-            </a:p>
-          </p:txBody>
-        </p:sp>
-        <p:sp>
-          <p:nvSpPr>
-            <p:cNvPr id="188" name="Flowchart: Delay 187"/>
-            <p:cNvSpPr/>
-            <p:nvPr/>
-          </p:nvSpPr>
-          <p:spPr>
-            <a:xfrm rot="16200000">
-              <a:off x="2339181" y="3947319"/>
-              <a:ext cx="304800" cy="304800"/>
-            </a:xfrm>
-            <a:prstGeom prst="flowChartDelay">
-              <a:avLst/>
-            </a:prstGeom>
-          </p:spPr>
-          <p:style>
-            <a:lnRef idx="2">
-              <a:schemeClr val="accent4">
-                <a:shade val="50000"/>
-              </a:schemeClr>
-            </a:lnRef>
-            <a:fillRef idx="1">
-              <a:schemeClr val="accent4"/>
-            </a:fillRef>
-            <a:effectRef idx="0">
-              <a:schemeClr val="accent4"/>
-            </a:effectRef>
-            <a:fontRef idx="minor">
-              <a:schemeClr val="lt1"/>
-            </a:fontRef>
-          </p:style>
-          <p:txBody>
-            <a:bodyPr rtlCol="0" anchor="ctr"/>
-            <a:lstStyle/>
-            <a:p>
-              <a:pPr algn="ctr"/>
-              <a:endParaRPr lang="en-US" b="1"/>
-            </a:p>
-          </p:txBody>
-        </p:sp>
-      </p:grpSp>
-      <p:grpSp>
-        <p:nvGrpSpPr>
-          <p:cNvPr id="189" name="Group 188"/>
-          <p:cNvGrpSpPr>
-            <a:grpSpLocks noChangeAspect="1"/>
-          </p:cNvGrpSpPr>
-          <p:nvPr/>
-        </p:nvGrpSpPr>
-        <p:grpSpPr>
-          <a:xfrm>
-            <a:off x="5891174" y="1397574"/>
-            <a:ext cx="192024" cy="336042"/>
-            <a:chOff x="2339181" y="3718719"/>
-            <a:chExt cx="304800" cy="533400"/>
-          </a:xfrm>
-        </p:grpSpPr>
-        <p:sp>
-          <p:nvSpPr>
-            <p:cNvPr id="190" name="Flowchart: Connector 189"/>
-            <p:cNvSpPr/>
-            <p:nvPr/>
-          </p:nvSpPr>
-          <p:spPr>
-            <a:xfrm>
-              <a:off x="2377281" y="3718719"/>
-              <a:ext cx="228600" cy="228600"/>
-            </a:xfrm>
-            <a:prstGeom prst="flowChartConnector">
-              <a:avLst/>
-            </a:prstGeom>
-          </p:spPr>
-          <p:style>
-            <a:lnRef idx="2">
-              <a:schemeClr val="accent1">
-                <a:shade val="50000"/>
-              </a:schemeClr>
-            </a:lnRef>
-            <a:fillRef idx="1">
-              <a:schemeClr val="accent1"/>
-            </a:fillRef>
-            <a:effectRef idx="0">
-              <a:schemeClr val="accent1"/>
-            </a:effectRef>
-            <a:fontRef idx="minor">
-              <a:schemeClr val="lt1"/>
-            </a:fontRef>
-          </p:style>
-          <p:txBody>
-            <a:bodyPr rtlCol="0" anchor="ctr"/>
-            <a:lstStyle/>
-            <a:p>
-              <a:pPr algn="ctr"/>
-              <a:endParaRPr lang="en-US" b="1"/>
-            </a:p>
-          </p:txBody>
-        </p:sp>
-        <p:sp>
-          <p:nvSpPr>
-            <p:cNvPr id="191" name="Flowchart: Delay 190"/>
-            <p:cNvSpPr/>
-            <p:nvPr/>
-          </p:nvSpPr>
-          <p:spPr>
-            <a:xfrm rot="16200000">
-              <a:off x="2339181" y="3947319"/>
-              <a:ext cx="304800" cy="304800"/>
-            </a:xfrm>
-            <a:prstGeom prst="flowChartDelay">
-              <a:avLst/>
-            </a:prstGeom>
-          </p:spPr>
-          <p:style>
-            <a:lnRef idx="2">
-              <a:schemeClr val="accent1">
-                <a:shade val="50000"/>
-              </a:schemeClr>
-            </a:lnRef>
-            <a:fillRef idx="1">
-              <a:schemeClr val="accent1"/>
-            </a:fillRef>
-            <a:effectRef idx="0">
-              <a:schemeClr val="accent1"/>
-            </a:effectRef>
-            <a:fontRef idx="minor">
-              <a:schemeClr val="lt1"/>
-            </a:fontRef>
-          </p:style>
-          <p:txBody>
-            <a:bodyPr rtlCol="0" anchor="ctr"/>
-            <a:lstStyle/>
-            <a:p>
-              <a:pPr algn="ctr"/>
-              <a:endParaRPr lang="en-US" b="1"/>
-            </a:p>
-          </p:txBody>
-        </p:sp>
-      </p:grpSp>
-      <p:sp>
-        <p:nvSpPr>
-          <p:cNvPr id="192" name="TextBox 191"/>
-          <p:cNvSpPr txBox="1"/>
-          <p:nvPr/>
-        </p:nvSpPr>
-        <p:spPr>
-          <a:xfrm>
-            <a:off x="3413125" y="1019244"/>
-            <a:ext cx="533400" cy="323165"/>
-          </a:xfrm>
-          <a:prstGeom prst="rect">
-            <a:avLst/>
-          </a:prstGeom>
-          <a:noFill/>
-        </p:spPr>
-        <p:txBody>
-          <a:bodyPr wrap="square" rtlCol="0">
-            <a:spAutoFit/>
-          </a:bodyPr>
-          <a:lstStyle/>
-          <a:p>
-            <a:r>
-              <a:rPr lang="en-US" b="1" dirty="0" err="1" smtClean="0">
-                <a:solidFill>
-                  <a:srgbClr val="00B050"/>
-                </a:solidFill>
-              </a:rPr>
-              <a:t>Dev</a:t>
-            </a:r>
-            <a:endParaRPr lang="en-SG" b="1" dirty="0">
-              <a:solidFill>
-                <a:srgbClr val="00B050"/>
-              </a:solidFill>
-            </a:endParaRPr>
-          </a:p>
-        </p:txBody>
-      </p:sp>
-      <p:sp>
-        <p:nvSpPr>
-          <p:cNvPr id="193" name="TextBox 192"/>
-          <p:cNvSpPr txBox="1"/>
-          <p:nvPr/>
-        </p:nvSpPr>
-        <p:spPr>
-          <a:xfrm>
-            <a:off x="4449053" y="896829"/>
-            <a:ext cx="958774" cy="323165"/>
-          </a:xfrm>
-          <a:prstGeom prst="rect">
-            <a:avLst/>
-          </a:prstGeom>
-          <a:noFill/>
-        </p:spPr>
-        <p:txBody>
-          <a:bodyPr wrap="square" rtlCol="0">
-            <a:spAutoFit/>
-          </a:bodyPr>
-          <a:lstStyle/>
-          <a:p>
-            <a:r>
-              <a:rPr lang="en-US" b="1" dirty="0" smtClean="0">
-                <a:solidFill>
-                  <a:schemeClr val="accent6">
-                    <a:lumMod val="75000"/>
-                  </a:schemeClr>
-                </a:solidFill>
-              </a:rPr>
-              <a:t>Reviewer</a:t>
-            </a:r>
-            <a:endParaRPr lang="en-SG" b="1" dirty="0">
-              <a:solidFill>
-                <a:schemeClr val="accent6">
-                  <a:lumMod val="75000"/>
-                </a:schemeClr>
-              </a:solidFill>
-            </a:endParaRPr>
-          </a:p>
-        </p:txBody>
-      </p:sp>
-      <p:sp>
-        <p:nvSpPr>
-          <p:cNvPr id="194" name="TextBox 193"/>
-          <p:cNvSpPr txBox="1"/>
-          <p:nvPr/>
-        </p:nvSpPr>
-        <p:spPr>
-          <a:xfrm>
-            <a:off x="6782367" y="519812"/>
-            <a:ext cx="1103123" cy="323165"/>
-          </a:xfrm>
-          <a:prstGeom prst="rect">
-            <a:avLst/>
-          </a:prstGeom>
-          <a:noFill/>
-        </p:spPr>
-        <p:txBody>
-          <a:bodyPr wrap="square" rtlCol="0">
-            <a:spAutoFit/>
-          </a:bodyPr>
-          <a:lstStyle/>
-          <a:p>
-            <a:r>
-              <a:rPr lang="en-US" b="1" dirty="0" smtClean="0">
-                <a:solidFill>
-                  <a:srgbClr val="7030A0"/>
-                </a:solidFill>
-              </a:rPr>
-              <a:t>Team Lead</a:t>
-            </a:r>
-            <a:endParaRPr lang="en-SG" b="1" dirty="0">
-              <a:solidFill>
-                <a:srgbClr val="7030A0"/>
-              </a:solidFill>
-            </a:endParaRPr>
-          </a:p>
-        </p:txBody>
-      </p:sp>
-      <p:sp>
-        <p:nvSpPr>
-          <p:cNvPr id="195" name="TextBox 194"/>
-          <p:cNvSpPr txBox="1"/>
-          <p:nvPr/>
-        </p:nvSpPr>
-        <p:spPr>
-          <a:xfrm>
-            <a:off x="5775325" y="1735029"/>
-            <a:ext cx="533400" cy="323165"/>
-          </a:xfrm>
-          <a:prstGeom prst="rect">
-            <a:avLst/>
-          </a:prstGeom>
-          <a:noFill/>
-        </p:spPr>
-        <p:txBody>
-          <a:bodyPr wrap="square" rtlCol="0">
-            <a:spAutoFit/>
-          </a:bodyPr>
-          <a:lstStyle/>
-          <a:p>
-            <a:r>
-              <a:rPr lang="en-US" b="1" dirty="0" smtClean="0">
-                <a:solidFill>
-                  <a:srgbClr val="0070C0"/>
-                </a:solidFill>
-              </a:rPr>
-              <a:t>PM</a:t>
-            </a:r>
-            <a:endParaRPr lang="en-SG" b="1" dirty="0">
-              <a:solidFill>
-                <a:srgbClr val="0070C0"/>
-              </a:solidFill>
-            </a:endParaRPr>
-          </a:p>
-        </p:txBody>
-      </p:sp>
-      <p:sp>
-        <p:nvSpPr>
-          <p:cNvPr id="140" name="Rounded Rectangle 139"/>
-          <p:cNvSpPr/>
-          <p:nvPr/>
-        </p:nvSpPr>
-        <p:spPr>
-          <a:xfrm>
-            <a:off x="6260861" y="939107"/>
-            <a:ext cx="1182855" cy="228600"/>
-          </a:xfrm>
-          <a:prstGeom prst="roundRect">
-            <a:avLst>
-              <a:gd name="adj" fmla="val 9190"/>
-            </a:avLst>
-          </a:prstGeom>
-          <a:ln>
-            <a:solidFill>
-              <a:srgbClr val="7030A0"/>
-            </a:solidFill>
-          </a:ln>
-        </p:spPr>
-        <p:style>
-          <a:lnRef idx="2">
-            <a:schemeClr val="accent2"/>
-          </a:lnRef>
-          <a:fillRef idx="1">
-            <a:schemeClr val="lt1"/>
-          </a:fillRef>
-          <a:effectRef idx="0">
-            <a:schemeClr val="accent2"/>
-          </a:effectRef>
-          <a:fontRef idx="minor">
-            <a:schemeClr val="dk1"/>
-          </a:fontRef>
-        </p:style>
-        <p:txBody>
-          <a:bodyPr vert="horz" rtlCol="0" anchor="ctr" anchorCtr="0"/>
-          <a:lstStyle/>
-          <a:p>
-            <a:pPr algn="ctr"/>
-            <a:r>
-              <a:rPr lang="en-US" sz="1400" dirty="0" err="1" smtClean="0">
-                <a:solidFill>
-                  <a:srgbClr val="7030A0"/>
-                </a:solidFill>
-                <a:latin typeface="Consolas" pitchFamily="49" charset="0"/>
-                <a:cs typeface="Consolas" pitchFamily="49" charset="0"/>
-              </a:rPr>
-              <a:t>s.</a:t>
-            </a:r>
-            <a:r>
-              <a:rPr lang="en-US" sz="1400" b="1" dirty="0" err="1" smtClean="0">
-                <a:solidFill>
-                  <a:srgbClr val="7030A0"/>
-                </a:solidFill>
-                <a:latin typeface="Consolas" pitchFamily="49" charset="0"/>
-                <a:cs typeface="Consolas" pitchFamily="49" charset="0"/>
-              </a:rPr>
-              <a:t>Merging</a:t>
-            </a:r>
-            <a:endParaRPr lang="en-US" sz="1400" b="1" dirty="0" smtClean="0">
-              <a:solidFill>
-                <a:srgbClr val="7030A0"/>
-              </a:solidFill>
-              <a:latin typeface="Consolas" pitchFamily="49" charset="0"/>
-              <a:cs typeface="Consolas" pitchFamily="49" charset="0"/>
-            </a:endParaRPr>
-          </a:p>
-        </p:txBody>
-      </p:sp>
-      <p:sp>
-        <p:nvSpPr>
-          <p:cNvPr id="103" name="Rounded Rectangle 102"/>
-          <p:cNvSpPr/>
-          <p:nvPr/>
-        </p:nvSpPr>
-        <p:spPr>
-          <a:xfrm>
-            <a:off x="6255384" y="1741510"/>
-            <a:ext cx="1173481" cy="228600"/>
-          </a:xfrm>
-          <a:prstGeom prst="roundRect">
-            <a:avLst>
-              <a:gd name="adj" fmla="val 9190"/>
-            </a:avLst>
-          </a:prstGeom>
-          <a:ln>
-            <a:solidFill>
-              <a:srgbClr val="0070C0"/>
-            </a:solidFill>
-          </a:ln>
-        </p:spPr>
-        <p:style>
-          <a:lnRef idx="2">
-            <a:schemeClr val="accent2"/>
-          </a:lnRef>
-          <a:fillRef idx="1">
-            <a:schemeClr val="lt1"/>
-          </a:fillRef>
-          <a:effectRef idx="0">
-            <a:schemeClr val="accent2"/>
-          </a:effectRef>
-          <a:fontRef idx="minor">
-            <a:schemeClr val="dk1"/>
-          </a:fontRef>
-        </p:style>
-        <p:txBody>
-          <a:bodyPr vert="horz" rtlCol="0" anchor="ctr" anchorCtr="0"/>
-          <a:lstStyle/>
-          <a:p>
-            <a:pPr algn="ctr"/>
-            <a:r>
-              <a:rPr lang="en-US" sz="1400" b="1" dirty="0" smtClean="0">
-                <a:solidFill>
-                  <a:srgbClr val="0070C0"/>
-                </a:solidFill>
-                <a:latin typeface="Consolas" pitchFamily="49" charset="0"/>
-                <a:cs typeface="Consolas" pitchFamily="49" charset="0"/>
-              </a:rPr>
-              <a:t>Deployed</a:t>
-            </a:r>
-          </a:p>
-        </p:txBody>
-      </p:sp>
       <p:cxnSp>
         <p:nvCxnSpPr>
-          <p:cNvPr id="107" name="Straight Arrow Connector 106"/>
+          <p:cNvPr id="125" name="Curved Connector 124"/>
           <p:cNvCxnSpPr>
-            <a:stCxn id="142" idx="2"/>
-            <a:endCxn id="103" idx="0"/>
+            <a:endCxn id="114" idx="2"/>
           </p:cNvCxnSpPr>
           <p:nvPr/>
         </p:nvCxnSpPr>
         <p:spPr>
-          <a:xfrm>
-            <a:off x="6842125" y="1610783"/>
-            <a:ext cx="0" cy="130727"/>
-          </a:xfrm>
-          <a:prstGeom prst="straightConnector1">
+          <a:xfrm rot="5400000" flipH="1" flipV="1">
+            <a:off x="3353097" y="645714"/>
+            <a:ext cx="755329" cy="393232"/>
+          </a:xfrm>
+          <a:prstGeom prst="curvedConnector2">
             <a:avLst/>
           </a:prstGeom>
           <a:ln w="28575">
             <a:solidFill>
-              <a:srgbClr val="0070C0"/>
+              <a:srgbClr val="00B050"/>
             </a:solidFill>
+            <a:prstDash val="sysDot"/>
             <a:headEnd type="none" w="med" len="med"/>
             <a:tailEnd type="triangle" w="med" len="med"/>
           </a:ln>
@@ -5434,23 +4708,26 @@
       </p:cxnSp>
       <p:cxnSp>
         <p:nvCxnSpPr>
-          <p:cNvPr id="127" name="Straight Arrow Connector 126"/>
+          <p:cNvPr id="129" name="Curved Connector 128"/>
           <p:cNvCxnSpPr>
-            <a:endCxn id="177" idx="1"/>
+            <a:stCxn id="178" idx="3"/>
+            <a:endCxn id="139" idx="0"/>
           </p:cNvCxnSpPr>
           <p:nvPr/>
         </p:nvCxnSpPr>
         <p:spPr>
           <a:xfrm>
-            <a:off x="2660896" y="302084"/>
-            <a:ext cx="376356" cy="0"/>
-          </a:xfrm>
-          <a:prstGeom prst="straightConnector1">
+            <a:off x="6502949" y="428720"/>
+            <a:ext cx="339045" cy="772661"/>
+          </a:xfrm>
+          <a:prstGeom prst="curvedConnector2">
             <a:avLst/>
           </a:prstGeom>
           <a:ln w="28575">
             <a:solidFill>
-              <a:srgbClr val="00B050"/>
+              <a:schemeClr val="accent6">
+                <a:lumMod val="75000"/>
+              </a:schemeClr>
             </a:solidFill>
             <a:headEnd type="none" w="med" len="med"/>
             <a:tailEnd type="triangle" w="med" len="med"/>
@@ -5471,6 +4748,464 @@
           </a:fontRef>
         </p:style>
       </p:cxnSp>
+      <p:sp>
+        <p:nvSpPr>
+          <p:cNvPr id="159" name="Rounded Rectangle 158"/>
+          <p:cNvSpPr/>
+          <p:nvPr/>
+        </p:nvSpPr>
+        <p:spPr>
+          <a:xfrm>
+            <a:off x="3794125" y="2061858"/>
+            <a:ext cx="1775707" cy="301136"/>
+          </a:xfrm>
+          <a:prstGeom prst="roundRect">
+            <a:avLst>
+              <a:gd name="adj" fmla="val 9190"/>
+            </a:avLst>
+          </a:prstGeom>
+          <a:noFill/>
+          <a:ln>
+            <a:noFill/>
+          </a:ln>
+        </p:spPr>
+        <p:style>
+          <a:lnRef idx="2">
+            <a:schemeClr val="accent2"/>
+          </a:lnRef>
+          <a:fillRef idx="1">
+            <a:schemeClr val="lt1"/>
+          </a:fillRef>
+          <a:effectRef idx="0">
+            <a:schemeClr val="accent2"/>
+          </a:effectRef>
+          <a:fontRef idx="minor">
+            <a:schemeClr val="dk1"/>
+          </a:fontRef>
+        </p:style>
+        <p:txBody>
+          <a:bodyPr vert="horz" lIns="0" rIns="0" rtlCol="0" anchor="ctr" anchorCtr="0"/>
+          <a:lstStyle/>
+          <a:p>
+            <a:pPr algn="ctr"/>
+            <a:r>
+              <a:rPr lang="en-US" sz="1400" b="1" dirty="0" smtClean="0">
+                <a:solidFill>
+                  <a:schemeClr val="tx1">
+                    <a:lumMod val="50000"/>
+                    <a:lumOff val="50000"/>
+                  </a:schemeClr>
+                </a:solidFill>
+                <a:latin typeface="Consolas" pitchFamily="49" charset="0"/>
+                <a:cs typeface="Consolas" pitchFamily="49" charset="0"/>
+              </a:rPr>
+              <a:t>Closed</a:t>
+            </a:r>
+            <a:r>
+              <a:rPr lang="en-US" sz="1400" dirty="0" smtClean="0">
+                <a:solidFill>
+                  <a:schemeClr val="tx1">
+                    <a:lumMod val="50000"/>
+                    <a:lumOff val="50000"/>
+                  </a:schemeClr>
+                </a:solidFill>
+                <a:latin typeface="Consolas" pitchFamily="49" charset="0"/>
+                <a:cs typeface="Consolas" pitchFamily="49" charset="0"/>
+              </a:rPr>
+              <a:t>[no </a:t>
+            </a:r>
+            <a:r>
+              <a:rPr lang="en-US" sz="1400" dirty="0" smtClean="0">
+                <a:solidFill>
+                  <a:schemeClr val="tx1">
+                    <a:lumMod val="50000"/>
+                    <a:lumOff val="50000"/>
+                  </a:schemeClr>
+                </a:solidFill>
+                <a:latin typeface="Consolas" pitchFamily="49" charset="0"/>
+                <a:cs typeface="Consolas" pitchFamily="49" charset="0"/>
+              </a:rPr>
+              <a:t>status]</a:t>
+            </a:r>
+          </a:p>
+        </p:txBody>
+      </p:sp>
+      <p:cxnSp>
+        <p:nvCxnSpPr>
+          <p:cNvPr id="113" name="Straight Arrow Connector 112"/>
+          <p:cNvCxnSpPr/>
+          <p:nvPr/>
+        </p:nvCxnSpPr>
+        <p:spPr>
+          <a:xfrm>
+            <a:off x="594360" y="2397960"/>
+            <a:ext cx="342756" cy="0"/>
+          </a:xfrm>
+          <a:prstGeom prst="straightConnector1">
+            <a:avLst/>
+          </a:prstGeom>
+          <a:ln w="28575">
+            <a:solidFill>
+              <a:srgbClr val="00B050"/>
+            </a:solidFill>
+            <a:headEnd type="none" w="med" len="med"/>
+            <a:tailEnd type="triangle" w="med" len="med"/>
+          </a:ln>
+        </p:spPr>
+        <p:style>
+          <a:lnRef idx="1">
+            <a:schemeClr val="accent1"/>
+          </a:lnRef>
+          <a:fillRef idx="0">
+            <a:schemeClr val="accent1"/>
+          </a:fillRef>
+          <a:effectRef idx="0">
+            <a:schemeClr val="accent1"/>
+          </a:effectRef>
+          <a:fontRef idx="minor">
+            <a:schemeClr val="tx1"/>
+          </a:fontRef>
+        </p:style>
+      </p:cxnSp>
+      <p:cxnSp>
+        <p:nvCxnSpPr>
+          <p:cNvPr id="164" name="Straight Arrow Connector 163"/>
+          <p:cNvCxnSpPr/>
+          <p:nvPr/>
+        </p:nvCxnSpPr>
+        <p:spPr>
+          <a:xfrm>
+            <a:off x="1906117" y="2417951"/>
+            <a:ext cx="342756" cy="0"/>
+          </a:xfrm>
+          <a:prstGeom prst="straightConnector1">
+            <a:avLst/>
+          </a:prstGeom>
+          <a:ln w="28575">
+            <a:solidFill>
+              <a:schemeClr val="accent6">
+                <a:lumMod val="75000"/>
+              </a:schemeClr>
+            </a:solidFill>
+            <a:headEnd type="none" w="med" len="med"/>
+            <a:tailEnd type="triangle" w="med" len="med"/>
+          </a:ln>
+        </p:spPr>
+        <p:style>
+          <a:lnRef idx="1">
+            <a:schemeClr val="accent1"/>
+          </a:lnRef>
+          <a:fillRef idx="0">
+            <a:schemeClr val="accent1"/>
+          </a:fillRef>
+          <a:effectRef idx="0">
+            <a:schemeClr val="accent1"/>
+          </a:effectRef>
+          <a:fontRef idx="minor">
+            <a:schemeClr val="tx1"/>
+          </a:fontRef>
+        </p:style>
+      </p:cxnSp>
+      <p:cxnSp>
+        <p:nvCxnSpPr>
+          <p:cNvPr id="165" name="Straight Arrow Connector 164"/>
+          <p:cNvCxnSpPr/>
+          <p:nvPr/>
+        </p:nvCxnSpPr>
+        <p:spPr>
+          <a:xfrm>
+            <a:off x="3292023" y="2429306"/>
+            <a:ext cx="342756" cy="0"/>
+          </a:xfrm>
+          <a:prstGeom prst="straightConnector1">
+            <a:avLst/>
+          </a:prstGeom>
+          <a:ln w="28575">
+            <a:solidFill>
+              <a:srgbClr val="7030A0"/>
+            </a:solidFill>
+            <a:headEnd type="none" w="med" len="med"/>
+            <a:tailEnd type="triangle" w="med" len="med"/>
+          </a:ln>
+        </p:spPr>
+        <p:style>
+          <a:lnRef idx="1">
+            <a:schemeClr val="accent1"/>
+          </a:lnRef>
+          <a:fillRef idx="0">
+            <a:schemeClr val="accent1"/>
+          </a:fillRef>
+          <a:effectRef idx="0">
+            <a:schemeClr val="accent1"/>
+          </a:effectRef>
+          <a:fontRef idx="minor">
+            <a:schemeClr val="tx1"/>
+          </a:fontRef>
+        </p:style>
+      </p:cxnSp>
+      <p:sp>
+        <p:nvSpPr>
+          <p:cNvPr id="116" name="TextBox 115"/>
+          <p:cNvSpPr txBox="1"/>
+          <p:nvPr/>
+        </p:nvSpPr>
+        <p:spPr>
+          <a:xfrm rot="1653643">
+            <a:off x="479654" y="1333389"/>
+            <a:ext cx="685800" cy="323165"/>
+          </a:xfrm>
+          <a:prstGeom prst="rect">
+            <a:avLst/>
+          </a:prstGeom>
+          <a:noFill/>
+        </p:spPr>
+        <p:txBody>
+          <a:bodyPr wrap="square" rtlCol="0">
+            <a:spAutoFit/>
+          </a:bodyPr>
+          <a:lstStyle/>
+          <a:p>
+            <a:r>
+              <a:rPr lang="en-US" dirty="0" smtClean="0">
+                <a:solidFill>
+                  <a:schemeClr val="bg1">
+                    <a:lumMod val="50000"/>
+                  </a:schemeClr>
+                </a:solidFill>
+              </a:rPr>
+              <a:t>Reject</a:t>
+            </a:r>
+            <a:endParaRPr lang="en-SG" dirty="0">
+              <a:solidFill>
+                <a:schemeClr val="bg1">
+                  <a:lumMod val="50000"/>
+                </a:schemeClr>
+              </a:solidFill>
+            </a:endParaRPr>
+          </a:p>
+        </p:txBody>
+      </p:sp>
+      <p:pic>
+        <p:nvPicPr>
+          <p:cNvPr id="171" name="Picture 2"/>
+          <p:cNvPicPr>
+            <a:picLocks noChangeAspect="1" noChangeArrowheads="1"/>
+          </p:cNvPicPr>
+          <p:nvPr/>
+        </p:nvPicPr>
+        <p:blipFill>
+          <a:blip r:embed="rId3">
+            <a:duotone>
+              <a:schemeClr val="bg2">
+                <a:shade val="45000"/>
+                <a:satMod val="135000"/>
+              </a:schemeClr>
+              <a:prstClr val="white"/>
+            </a:duotone>
+            <a:extLst>
+              <a:ext uri="{28A0092B-C50C-407E-A947-70E740481C1C}">
+                <a14:useLocalDpi xmlns:a14="http://schemas.microsoft.com/office/drawing/2010/main" val="0"/>
+              </a:ext>
+            </a:extLst>
+          </a:blip>
+          <a:srcRect/>
+          <a:stretch>
+            <a:fillRect/>
+          </a:stretch>
+        </p:blipFill>
+        <p:spPr bwMode="auto">
+          <a:xfrm>
+            <a:off x="3413125" y="1905794"/>
+            <a:ext cx="238125" cy="238125"/>
+          </a:xfrm>
+          <a:prstGeom prst="rect">
+            <a:avLst/>
+          </a:prstGeom>
+          <a:noFill/>
+          <a:ln>
+            <a:noFill/>
+          </a:ln>
+          <a:effectLst/>
+          <a:extLst>
+            <a:ext uri="{909E8E84-426E-40DD-AFC4-6F175D3DCCD1}">
+              <a14:hiddenFill xmlns:a14="http://schemas.microsoft.com/office/drawing/2010/main">
+                <a:solidFill>
+                  <a:schemeClr val="accent1"/>
+                </a:solidFill>
+              </a14:hiddenFill>
+            </a:ext>
+            <a:ext uri="{91240B29-F687-4F45-9708-019B960494DF}">
+              <a14:hiddenLine xmlns:a14="http://schemas.microsoft.com/office/drawing/2010/main" w="9525">
+                <a:solidFill>
+                  <a:schemeClr val="tx1"/>
+                </a:solidFill>
+                <a:miter lim="800000"/>
+                <a:headEnd/>
+                <a:tailEnd/>
+              </a14:hiddenLine>
+            </a:ext>
+            <a:ext uri="{AF507438-7753-43E0-B8FC-AC1667EBCBE1}">
+              <a14:hiddenEffects xmlns:a14="http://schemas.microsoft.com/office/drawing/2010/main">
+                <a:effectLst>
+                  <a:outerShdw dist="35921" dir="2700000" algn="ctr" rotWithShape="0">
+                    <a:schemeClr val="bg2"/>
+                  </a:outerShdw>
+                </a:effectLst>
+              </a14:hiddenEffects>
+            </a:ext>
+          </a:extLst>
+        </p:spPr>
+      </p:pic>
+      <p:cxnSp>
+        <p:nvCxnSpPr>
+          <p:cNvPr id="1030" name="Straight Arrow Connector 1029"/>
+          <p:cNvCxnSpPr/>
+          <p:nvPr/>
+        </p:nvCxnSpPr>
+        <p:spPr>
+          <a:xfrm flipV="1">
+            <a:off x="5070377" y="544376"/>
+            <a:ext cx="0" cy="657005"/>
+          </a:xfrm>
+          <a:prstGeom prst="straightConnector1">
+            <a:avLst/>
+          </a:prstGeom>
+          <a:ln w="28575">
+            <a:solidFill>
+              <a:srgbClr val="00B050"/>
+            </a:solidFill>
+            <a:headEnd type="none" w="med" len="med"/>
+            <a:tailEnd type="triangle" w="med" len="med"/>
+          </a:ln>
+        </p:spPr>
+        <p:style>
+          <a:lnRef idx="1">
+            <a:schemeClr val="accent1"/>
+          </a:lnRef>
+          <a:fillRef idx="0">
+            <a:schemeClr val="accent1"/>
+          </a:fillRef>
+          <a:effectRef idx="0">
+            <a:schemeClr val="accent1"/>
+          </a:effectRef>
+          <a:fontRef idx="minor">
+            <a:schemeClr val="tx1"/>
+          </a:fontRef>
+        </p:style>
+      </p:cxnSp>
+      <p:cxnSp>
+        <p:nvCxnSpPr>
+          <p:cNvPr id="1032" name="Straight Arrow Connector 1031"/>
+          <p:cNvCxnSpPr/>
+          <p:nvPr/>
+        </p:nvCxnSpPr>
+        <p:spPr>
+          <a:xfrm flipH="1">
+            <a:off x="5679977" y="1327381"/>
+            <a:ext cx="361917" cy="0"/>
+          </a:xfrm>
+          <a:prstGeom prst="straightConnector1">
+            <a:avLst/>
+          </a:prstGeom>
+          <a:ln w="28575">
+            <a:solidFill>
+              <a:srgbClr val="7030A0"/>
+            </a:solidFill>
+            <a:headEnd type="none" w="med" len="med"/>
+            <a:tailEnd type="triangle" w="med" len="med"/>
+          </a:ln>
+        </p:spPr>
+        <p:style>
+          <a:lnRef idx="1">
+            <a:schemeClr val="accent1"/>
+          </a:lnRef>
+          <a:fillRef idx="0">
+            <a:schemeClr val="accent1"/>
+          </a:fillRef>
+          <a:effectRef idx="0">
+            <a:schemeClr val="accent1"/>
+          </a:effectRef>
+          <a:fontRef idx="minor">
+            <a:schemeClr val="tx1"/>
+          </a:fontRef>
+        </p:style>
+      </p:cxnSp>
+      <p:sp>
+        <p:nvSpPr>
+          <p:cNvPr id="1036" name="TextBox 1035"/>
+          <p:cNvSpPr txBox="1"/>
+          <p:nvPr/>
+        </p:nvSpPr>
+        <p:spPr>
+          <a:xfrm>
+            <a:off x="1936193" y="96142"/>
+            <a:ext cx="815985" cy="323165"/>
+          </a:xfrm>
+          <a:prstGeom prst="rect">
+            <a:avLst/>
+          </a:prstGeom>
+          <a:noFill/>
+        </p:spPr>
+        <p:txBody>
+          <a:bodyPr wrap="square" rtlCol="0">
+            <a:spAutoFit/>
+          </a:bodyPr>
+          <a:lstStyle/>
+          <a:p>
+            <a:r>
+              <a:rPr lang="en-US" b="1" dirty="0" smtClean="0">
+                <a:solidFill>
+                  <a:schemeClr val="bg1"/>
+                </a:solidFill>
+              </a:rPr>
+              <a:t>Issues</a:t>
+            </a:r>
+            <a:endParaRPr lang="en-SG" b="1" dirty="0">
+              <a:solidFill>
+                <a:schemeClr val="bg1"/>
+              </a:solidFill>
+            </a:endParaRPr>
+          </a:p>
+        </p:txBody>
+      </p:sp>
+      <p:sp>
+        <p:nvSpPr>
+          <p:cNvPr id="205" name="TextBox 204"/>
+          <p:cNvSpPr txBox="1"/>
+          <p:nvPr/>
+        </p:nvSpPr>
+        <p:spPr>
+          <a:xfrm>
+            <a:off x="6795551" y="209011"/>
+            <a:ext cx="815985" cy="323165"/>
+          </a:xfrm>
+          <a:prstGeom prst="rect">
+            <a:avLst/>
+          </a:prstGeom>
+          <a:noFill/>
+        </p:spPr>
+        <p:txBody>
+          <a:bodyPr wrap="square" rtlCol="0">
+            <a:spAutoFit/>
+          </a:bodyPr>
+          <a:lstStyle/>
+          <a:p>
+            <a:r>
+              <a:rPr lang="en-US" b="1" dirty="0" smtClean="0">
+                <a:solidFill>
+                  <a:schemeClr val="bg1"/>
+                </a:solidFill>
+              </a:rPr>
+              <a:t>PRs</a:t>
+            </a:r>
+            <a:endParaRPr lang="en-SG" b="1" dirty="0">
+              <a:solidFill>
+                <a:schemeClr val="bg1"/>
+              </a:solidFill>
+            </a:endParaRPr>
+          </a:p>
+        </p:txBody>
+      </p:sp>
     </p:spTree>
     <p:extLst>
       <p:ext uri="{BB962C8B-B14F-4D97-AF65-F5344CB8AC3E}">

</xml_diff>

<commit_message>
shortened status labels. refined process.md accordingly
</commit_message>
<xml_diff>
--- a/doc/diagrams/IssueLifecycle.pptx
+++ b/doc/diagrams/IssueLifecycle.pptx
@@ -192,7 +192,7 @@
           <a:p>
             <a:fld id="{EB56B9F1-9881-483D-AC17-B3C6E9A32E68}" type="datetimeFigureOut">
               <a:rPr lang="en-SG" smtClean="0"/>
-              <a:t>11/8/2014</a:t>
+              <a:t>3/1/2015</a:t>
             </a:fld>
             <a:endParaRPr lang="en-SG"/>
           </a:p>
@@ -731,7 +731,7 @@
             <a:fld id="{1D8BD707-D9CF-40AE-B4C6-C98DA3205C09}" type="datetimeFigureOut">
               <a:rPr lang="en-US" smtClean="0"/>
               <a:pPr/>
-              <a:t>8/11/2014</a:t>
+              <a:t>1/3/2015</a:t>
             </a:fld>
             <a:endParaRPr lang="en-US"/>
           </a:p>
@@ -898,7 +898,7 @@
             <a:fld id="{1D8BD707-D9CF-40AE-B4C6-C98DA3205C09}" type="datetimeFigureOut">
               <a:rPr lang="en-US" smtClean="0"/>
               <a:pPr/>
-              <a:t>8/11/2014</a:t>
+              <a:t>1/3/2015</a:t>
             </a:fld>
             <a:endParaRPr lang="en-US"/>
           </a:p>
@@ -1075,7 +1075,7 @@
             <a:fld id="{1D8BD707-D9CF-40AE-B4C6-C98DA3205C09}" type="datetimeFigureOut">
               <a:rPr lang="en-US" smtClean="0"/>
               <a:pPr/>
-              <a:t>8/11/2014</a:t>
+              <a:t>1/3/2015</a:t>
             </a:fld>
             <a:endParaRPr lang="en-US"/>
           </a:p>
@@ -1242,7 +1242,7 @@
             <a:fld id="{1D8BD707-D9CF-40AE-B4C6-C98DA3205C09}" type="datetimeFigureOut">
               <a:rPr lang="en-US" smtClean="0"/>
               <a:pPr/>
-              <a:t>8/11/2014</a:t>
+              <a:t>1/3/2015</a:t>
             </a:fld>
             <a:endParaRPr lang="en-US"/>
           </a:p>
@@ -1485,7 +1485,7 @@
             <a:fld id="{1D8BD707-D9CF-40AE-B4C6-C98DA3205C09}" type="datetimeFigureOut">
               <a:rPr lang="en-US" smtClean="0"/>
               <a:pPr/>
-              <a:t>8/11/2014</a:t>
+              <a:t>1/3/2015</a:t>
             </a:fld>
             <a:endParaRPr lang="en-US"/>
           </a:p>
@@ -1770,7 +1770,7 @@
             <a:fld id="{1D8BD707-D9CF-40AE-B4C6-C98DA3205C09}" type="datetimeFigureOut">
               <a:rPr lang="en-US" smtClean="0"/>
               <a:pPr/>
-              <a:t>8/11/2014</a:t>
+              <a:t>1/3/2015</a:t>
             </a:fld>
             <a:endParaRPr lang="en-US"/>
           </a:p>
@@ -2189,7 +2189,7 @@
             <a:fld id="{1D8BD707-D9CF-40AE-B4C6-C98DA3205C09}" type="datetimeFigureOut">
               <a:rPr lang="en-US" smtClean="0"/>
               <a:pPr/>
-              <a:t>8/11/2014</a:t>
+              <a:t>1/3/2015</a:t>
             </a:fld>
             <a:endParaRPr lang="en-US"/>
           </a:p>
@@ -2304,7 +2304,7 @@
             <a:fld id="{1D8BD707-D9CF-40AE-B4C6-C98DA3205C09}" type="datetimeFigureOut">
               <a:rPr lang="en-US" smtClean="0"/>
               <a:pPr/>
-              <a:t>8/11/2014</a:t>
+              <a:t>1/3/2015</a:t>
             </a:fld>
             <a:endParaRPr lang="en-US"/>
           </a:p>
@@ -2396,7 +2396,7 @@
             <a:fld id="{1D8BD707-D9CF-40AE-B4C6-C98DA3205C09}" type="datetimeFigureOut">
               <a:rPr lang="en-US" smtClean="0"/>
               <a:pPr/>
-              <a:t>8/11/2014</a:t>
+              <a:t>1/3/2015</a:t>
             </a:fld>
             <a:endParaRPr lang="en-US"/>
           </a:p>
@@ -2670,7 +2670,7 @@
             <a:fld id="{1D8BD707-D9CF-40AE-B4C6-C98DA3205C09}" type="datetimeFigureOut">
               <a:rPr lang="en-US" smtClean="0"/>
               <a:pPr/>
-              <a:t>8/11/2014</a:t>
+              <a:t>1/3/2015</a:t>
             </a:fld>
             <a:endParaRPr lang="en-US"/>
           </a:p>
@@ -2920,7 +2920,7 @@
             <a:fld id="{1D8BD707-D9CF-40AE-B4C6-C98DA3205C09}" type="datetimeFigureOut">
               <a:rPr lang="en-US" smtClean="0"/>
               <a:pPr/>
-              <a:t>8/11/2014</a:t>
+              <a:t>1/3/2015</a:t>
             </a:fld>
             <a:endParaRPr lang="en-US"/>
           </a:p>
@@ -3130,7 +3130,7 @@
             <a:fld id="{1D8BD707-D9CF-40AE-B4C6-C98DA3205C09}" type="datetimeFigureOut">
               <a:rPr lang="en-US" smtClean="0"/>
               <a:pPr/>
-              <a:t>8/11/2014</a:t>
+              <a:t>1/3/2015</a:t>
             </a:fld>
             <a:endParaRPr lang="en-US"/>
           </a:p>
@@ -3704,7 +3704,7 @@
                 <a:latin typeface="Consolas" pitchFamily="49" charset="0"/>
                 <a:cs typeface="Consolas" pitchFamily="49" charset="0"/>
               </a:rPr>
-              <a:t>status.</a:t>
+              <a:t>s.</a:t>
             </a:r>
             <a:r>
               <a:rPr lang="en-US" sz="1400" b="1" dirty="0" err="1" smtClean="0">
@@ -3798,7 +3798,7 @@
                 <a:latin typeface="Consolas" pitchFamily="49" charset="0"/>
                 <a:cs typeface="Consolas" pitchFamily="49" charset="0"/>
               </a:rPr>
-              <a:t>ReadyToMerge</a:t>
+              <a:t>ToMerge</a:t>
             </a:r>
             <a:endParaRPr lang="en-US" sz="1400" b="1" dirty="0" smtClean="0">
               <a:solidFill>
@@ -4081,7 +4081,7 @@
                 <a:latin typeface="Consolas" pitchFamily="49" charset="0"/>
                 <a:cs typeface="Consolas" pitchFamily="49" charset="0"/>
               </a:rPr>
-              <a:t>Status.</a:t>
+              <a:t>s.</a:t>
             </a:r>
             <a:r>
               <a:rPr lang="en-US" sz="1400" b="1" dirty="0" err="1" smtClean="0">
@@ -4162,7 +4162,7 @@
                 <a:latin typeface="Consolas" pitchFamily="49" charset="0"/>
                 <a:cs typeface="Consolas" pitchFamily="49" charset="0"/>
               </a:rPr>
-              <a:t>status.</a:t>
+              <a:t>s.</a:t>
             </a:r>
             <a:r>
               <a:rPr lang="en-US" sz="1400" b="1" dirty="0" err="1" smtClean="0">
@@ -4175,7 +4175,20 @@
                 <a:latin typeface="Consolas" pitchFamily="49" charset="0"/>
                 <a:cs typeface="Consolas" pitchFamily="49" charset="0"/>
               </a:rPr>
-              <a:t>PendingReview</a:t>
+              <a:t>To</a:t>
+            </a:r>
+            <a:r>
+              <a:rPr lang="en-US" sz="1400" b="1" dirty="0" err="1" smtClean="0">
+                <a:solidFill>
+                  <a:schemeClr val="tx1">
+                    <a:lumMod val="50000"/>
+                    <a:lumOff val="50000"/>
+                  </a:schemeClr>
+                </a:solidFill>
+                <a:latin typeface="Consolas" pitchFamily="49" charset="0"/>
+                <a:cs typeface="Consolas" pitchFamily="49" charset="0"/>
+              </a:rPr>
+              <a:t>Review</a:t>
             </a:r>
             <a:endParaRPr lang="en-US" sz="1400" b="1" dirty="0">
               <a:solidFill>
@@ -4384,23 +4397,7 @@
                   <a:srgbClr val="7030A0"/>
                 </a:solidFill>
               </a:rPr>
-              <a:t>Area</a:t>
-            </a:r>
-            <a:r>
-              <a:rPr lang="en-US" b="1" dirty="0" smtClean="0">
-                <a:solidFill>
-                  <a:srgbClr val="7030A0"/>
-                </a:solidFill>
-              </a:rPr>
-              <a:t> </a:t>
-            </a:r>
-            <a:r>
-              <a:rPr lang="en-US" b="1" dirty="0" smtClean="0">
-                <a:solidFill>
-                  <a:srgbClr val="7030A0"/>
-                </a:solidFill>
-              </a:rPr>
-              <a:t>Lead</a:t>
+              <a:t>Area Lead</a:t>
             </a:r>
             <a:endParaRPr lang="en-SG" b="1" dirty="0">
               <a:solidFill>
@@ -4638,7 +4635,7 @@
                 <a:latin typeface="Consolas" pitchFamily="49" charset="0"/>
                 <a:cs typeface="Consolas" pitchFamily="49" charset="0"/>
               </a:rPr>
-              <a:t>Status.</a:t>
+              <a:t>s.</a:t>
             </a:r>
             <a:r>
               <a:rPr lang="en-US" sz="1400" b="1" dirty="0" err="1" smtClean="0">
@@ -4812,20 +4809,7 @@
                 <a:latin typeface="Consolas" pitchFamily="49" charset="0"/>
                 <a:cs typeface="Consolas" pitchFamily="49" charset="0"/>
               </a:rPr>
-              <a:t>[no </a:t>
-            </a:r>
-            <a:r>
-              <a:rPr lang="en-US" sz="1400" dirty="0" smtClean="0">
-                <a:solidFill>
-                  <a:schemeClr val="tx1">
-                    <a:lumMod val="50000"/>
-                    <a:lumOff val="50000"/>
-                  </a:schemeClr>
-                </a:solidFill>
-                <a:latin typeface="Consolas" pitchFamily="49" charset="0"/>
-                <a:cs typeface="Consolas" pitchFamily="49" charset="0"/>
-              </a:rPr>
-              <a:t>status]</a:t>
+              <a:t>[no status]</a:t>
             </a:r>
           </a:p>
         </p:txBody>
@@ -4951,7 +4935,7 @@
         </p:nvSpPr>
         <p:spPr>
           <a:xfrm rot="1653643">
-            <a:off x="479654" y="1333389"/>
+            <a:off x="335344" y="1572952"/>
             <a:ext cx="685800" cy="323165"/>
           </a:xfrm>
           <a:prstGeom prst="rect">
@@ -5201,6 +5185,99 @@
             <a:endParaRPr lang="en-SG" b="1" dirty="0">
               <a:solidFill>
                 <a:schemeClr val="bg1"/>
+              </a:solidFill>
+            </a:endParaRPr>
+          </a:p>
+        </p:txBody>
+      </p:sp>
+      <p:cxnSp>
+        <p:nvCxnSpPr>
+          <p:cNvPr id="35" name="Curved Connector 34"/>
+          <p:cNvCxnSpPr>
+            <a:stCxn id="177" idx="1"/>
+            <a:endCxn id="135" idx="2"/>
+          </p:cNvCxnSpPr>
+          <p:nvPr/>
+        </p:nvCxnSpPr>
+        <p:spPr>
+          <a:xfrm rot="10800000">
+            <a:off x="1767779" y="1078947"/>
+            <a:ext cx="146200" cy="265842"/>
+          </a:xfrm>
+          <a:prstGeom prst="curvedConnector2">
+            <a:avLst/>
+          </a:prstGeom>
+          <a:ln w="28575">
+            <a:solidFill>
+              <a:srgbClr val="00B050"/>
+            </a:solidFill>
+            <a:headEnd type="none" w="med" len="med"/>
+            <a:tailEnd type="triangle" w="med" len="med"/>
+          </a:ln>
+        </p:spPr>
+        <p:style>
+          <a:lnRef idx="1">
+            <a:schemeClr val="accent1"/>
+          </a:lnRef>
+          <a:fillRef idx="0">
+            <a:schemeClr val="accent1"/>
+          </a:fillRef>
+          <a:effectRef idx="0">
+            <a:schemeClr val="accent1"/>
+          </a:effectRef>
+          <a:fontRef idx="minor">
+            <a:schemeClr val="tx1"/>
+          </a:fontRef>
+        </p:style>
+      </p:cxnSp>
+      <p:sp>
+        <p:nvSpPr>
+          <p:cNvPr id="38" name="TextBox 37"/>
+          <p:cNvSpPr txBox="1"/>
+          <p:nvPr/>
+        </p:nvSpPr>
+        <p:spPr>
+          <a:xfrm>
+            <a:off x="765739" y="1067594"/>
+            <a:ext cx="1002040" cy="461665"/>
+          </a:xfrm>
+          <a:prstGeom prst="rect">
+            <a:avLst/>
+          </a:prstGeom>
+          <a:noFill/>
+        </p:spPr>
+        <p:txBody>
+          <a:bodyPr wrap="square" rtlCol="0">
+            <a:spAutoFit/>
+          </a:bodyPr>
+          <a:lstStyle/>
+          <a:p>
+            <a:pPr algn="r"/>
+            <a:r>
+              <a:rPr lang="en-US" sz="1200" dirty="0" smtClean="0">
+                <a:solidFill>
+                  <a:schemeClr val="bg1">
+                    <a:lumMod val="50000"/>
+                  </a:schemeClr>
+                </a:solidFill>
+              </a:rPr>
+              <a:t>Abandoned by </a:t>
+            </a:r>
+            <a:r>
+              <a:rPr lang="en-US" sz="1200" dirty="0" err="1" smtClean="0">
+                <a:solidFill>
+                  <a:schemeClr val="bg1">
+                    <a:lumMod val="50000"/>
+                  </a:schemeClr>
+                </a:solidFill>
+              </a:rPr>
+              <a:t>dev</a:t>
+            </a:r>
+            <a:endParaRPr lang="en-SG" sz="1200" dirty="0">
+              <a:solidFill>
+                <a:schemeClr val="bg1">
+                  <a:lumMod val="50000"/>
+                </a:schemeClr>
               </a:solidFill>
             </a:endParaRPr>
           </a:p>

</xml_diff>

<commit_message>
updated the issue lifecycle diagram
</commit_message>
<xml_diff>
--- a/doc/diagrams/IssueLifecycle.pptx
+++ b/doc/diagrams/IssueLifecycle.pptx
@@ -107,6 +107,22 @@
       </a:defRPr>
     </a:lvl9pPr>
   </p:defaultTextStyle>
+  <p:extLst>
+    <p:ext uri="{EFAFB233-063F-42B5-8137-9DF3F51BA10A}">
+      <p15:sldGuideLst xmlns:p15="http://schemas.microsoft.com/office/powerpoint/2012/main">
+        <p15:guide id="1" orient="horz" pos="817">
+          <p15:clr>
+            <a:srgbClr val="A4A3A4"/>
+          </p15:clr>
+        </p15:guide>
+        <p15:guide id="2" pos="2439">
+          <p15:clr>
+            <a:srgbClr val="A4A3A4"/>
+          </p15:clr>
+        </p15:guide>
+      </p15:sldGuideLst>
+    </p:ext>
+  </p:extLst>
 </p:presentation>
 </file>
 
@@ -192,7 +208,7 @@
           <a:p>
             <a:fld id="{EB56B9F1-9881-483D-AC17-B3C6E9A32E68}" type="datetimeFigureOut">
               <a:rPr lang="en-SG" smtClean="0"/>
-              <a:t>3/1/2015</a:t>
+              <a:t>10/2/2016</a:t>
             </a:fld>
             <a:endParaRPr lang="en-SG"/>
           </a:p>
@@ -731,7 +747,7 @@
             <a:fld id="{1D8BD707-D9CF-40AE-B4C6-C98DA3205C09}" type="datetimeFigureOut">
               <a:rPr lang="en-US" smtClean="0"/>
               <a:pPr/>
-              <a:t>1/3/2015</a:t>
+              <a:t>2/10/2016</a:t>
             </a:fld>
             <a:endParaRPr lang="en-US"/>
           </a:p>
@@ -898,7 +914,7 @@
             <a:fld id="{1D8BD707-D9CF-40AE-B4C6-C98DA3205C09}" type="datetimeFigureOut">
               <a:rPr lang="en-US" smtClean="0"/>
               <a:pPr/>
-              <a:t>1/3/2015</a:t>
+              <a:t>2/10/2016</a:t>
             </a:fld>
             <a:endParaRPr lang="en-US"/>
           </a:p>
@@ -1075,7 +1091,7 @@
             <a:fld id="{1D8BD707-D9CF-40AE-B4C6-C98DA3205C09}" type="datetimeFigureOut">
               <a:rPr lang="en-US" smtClean="0"/>
               <a:pPr/>
-              <a:t>1/3/2015</a:t>
+              <a:t>2/10/2016</a:t>
             </a:fld>
             <a:endParaRPr lang="en-US"/>
           </a:p>
@@ -1242,7 +1258,7 @@
             <a:fld id="{1D8BD707-D9CF-40AE-B4C6-C98DA3205C09}" type="datetimeFigureOut">
               <a:rPr lang="en-US" smtClean="0"/>
               <a:pPr/>
-              <a:t>1/3/2015</a:t>
+              <a:t>2/10/2016</a:t>
             </a:fld>
             <a:endParaRPr lang="en-US"/>
           </a:p>
@@ -1485,7 +1501,7 @@
             <a:fld id="{1D8BD707-D9CF-40AE-B4C6-C98DA3205C09}" type="datetimeFigureOut">
               <a:rPr lang="en-US" smtClean="0"/>
               <a:pPr/>
-              <a:t>1/3/2015</a:t>
+              <a:t>2/10/2016</a:t>
             </a:fld>
             <a:endParaRPr lang="en-US"/>
           </a:p>
@@ -1770,7 +1786,7 @@
             <a:fld id="{1D8BD707-D9CF-40AE-B4C6-C98DA3205C09}" type="datetimeFigureOut">
               <a:rPr lang="en-US" smtClean="0"/>
               <a:pPr/>
-              <a:t>1/3/2015</a:t>
+              <a:t>2/10/2016</a:t>
             </a:fld>
             <a:endParaRPr lang="en-US"/>
           </a:p>
@@ -2189,7 +2205,7 @@
             <a:fld id="{1D8BD707-D9CF-40AE-B4C6-C98DA3205C09}" type="datetimeFigureOut">
               <a:rPr lang="en-US" smtClean="0"/>
               <a:pPr/>
-              <a:t>1/3/2015</a:t>
+              <a:t>2/10/2016</a:t>
             </a:fld>
             <a:endParaRPr lang="en-US"/>
           </a:p>
@@ -2304,7 +2320,7 @@
             <a:fld id="{1D8BD707-D9CF-40AE-B4C6-C98DA3205C09}" type="datetimeFigureOut">
               <a:rPr lang="en-US" smtClean="0"/>
               <a:pPr/>
-              <a:t>1/3/2015</a:t>
+              <a:t>2/10/2016</a:t>
             </a:fld>
             <a:endParaRPr lang="en-US"/>
           </a:p>
@@ -2396,7 +2412,7 @@
             <a:fld id="{1D8BD707-D9CF-40AE-B4C6-C98DA3205C09}" type="datetimeFigureOut">
               <a:rPr lang="en-US" smtClean="0"/>
               <a:pPr/>
-              <a:t>1/3/2015</a:t>
+              <a:t>2/10/2016</a:t>
             </a:fld>
             <a:endParaRPr lang="en-US"/>
           </a:p>
@@ -2670,7 +2686,7 @@
             <a:fld id="{1D8BD707-D9CF-40AE-B4C6-C98DA3205C09}" type="datetimeFigureOut">
               <a:rPr lang="en-US" smtClean="0"/>
               <a:pPr/>
-              <a:t>1/3/2015</a:t>
+              <a:t>2/10/2016</a:t>
             </a:fld>
             <a:endParaRPr lang="en-US"/>
           </a:p>
@@ -2920,7 +2936,7 @@
             <a:fld id="{1D8BD707-D9CF-40AE-B4C6-C98DA3205C09}" type="datetimeFigureOut">
               <a:rPr lang="en-US" smtClean="0"/>
               <a:pPr/>
-              <a:t>1/3/2015</a:t>
+              <a:t>2/10/2016</a:t>
             </a:fld>
             <a:endParaRPr lang="en-US"/>
           </a:p>
@@ -3130,7 +3146,7 @@
             <a:fld id="{1D8BD707-D9CF-40AE-B4C6-C98DA3205C09}" type="datetimeFigureOut">
               <a:rPr lang="en-US" smtClean="0"/>
               <a:pPr/>
-              <a:t>1/3/2015</a:t>
+              <a:t>2/10/2016</a:t>
             </a:fld>
             <a:endParaRPr lang="en-US"/>
           </a:p>
@@ -3611,8 +3627,8 @@
         </p:nvSpPr>
         <p:spPr>
           <a:xfrm>
-            <a:off x="123207" y="2256368"/>
-            <a:ext cx="3641786" cy="293769"/>
+            <a:off x="123207" y="2272425"/>
+            <a:ext cx="5347318" cy="293769"/>
           </a:xfrm>
           <a:prstGeom prst="roundRect">
             <a:avLst/>
@@ -3740,8 +3756,8 @@
         </p:nvSpPr>
         <p:spPr>
           <a:xfrm>
-            <a:off x="6041894" y="1201381"/>
-            <a:ext cx="1600200" cy="252000"/>
+            <a:off x="6025272" y="312864"/>
+            <a:ext cx="1426453" cy="244729"/>
           </a:xfrm>
           <a:prstGeom prst="roundRect">
             <a:avLst>
@@ -3869,22 +3885,24 @@
         <p:nvCxnSpPr>
           <p:cNvPr id="152" name="Curved Connector 151"/>
           <p:cNvCxnSpPr>
-            <a:stCxn id="139" idx="2"/>
+            <a:stCxn id="57" idx="2"/>
             <a:endCxn id="171" idx="3"/>
           </p:cNvCxnSpPr>
           <p:nvPr/>
         </p:nvCxnSpPr>
         <p:spPr>
           <a:xfrm rot="5400000">
-            <a:off x="4960884" y="143747"/>
-            <a:ext cx="571476" cy="3190744"/>
+            <a:off x="4953105" y="151525"/>
+            <a:ext cx="571477" cy="3175186"/>
           </a:xfrm>
           <a:prstGeom prst="curvedConnector2">
             <a:avLst/>
           </a:prstGeom>
           <a:ln w="28575">
             <a:solidFill>
-              <a:srgbClr val="7030A0"/>
+              <a:schemeClr val="accent6">
+                <a:lumMod val="75000"/>
+              </a:schemeClr>
             </a:solidFill>
             <a:headEnd type="none" w="med" len="med"/>
             <a:tailEnd type="triangle" w="med" len="med"/>
@@ -3925,7 +3943,7 @@
           </a:prstGeom>
           <a:ln w="28575">
             <a:solidFill>
-              <a:srgbClr val="7030A0"/>
+              <a:srgbClr val="0070C0"/>
             </a:solidFill>
             <a:headEnd type="none" w="med" len="med"/>
             <a:tailEnd type="triangle" w="med" len="med"/>
@@ -3965,7 +3983,7 @@
           </a:prstGeom>
           <a:ln w="28575">
             <a:solidFill>
-              <a:srgbClr val="00B050"/>
+              <a:srgbClr val="0070C0"/>
             </a:solidFill>
             <a:headEnd type="none" w="med" len="med"/>
             <a:tailEnd type="triangle" w="med" len="med"/>
@@ -4118,7 +4136,7 @@
         <p:spPr>
           <a:xfrm>
             <a:off x="4233481" y="313064"/>
-            <a:ext cx="2269468" cy="231311"/>
+            <a:ext cx="1417517" cy="244529"/>
           </a:xfrm>
           <a:prstGeom prst="roundRect">
             <a:avLst>
@@ -4175,20 +4193,7 @@
                 <a:latin typeface="Consolas" pitchFamily="49" charset="0"/>
                 <a:cs typeface="Consolas" pitchFamily="49" charset="0"/>
               </a:rPr>
-              <a:t>To</a:t>
-            </a:r>
-            <a:r>
-              <a:rPr lang="en-US" sz="1400" b="1" dirty="0" err="1" smtClean="0">
-                <a:solidFill>
-                  <a:schemeClr val="tx1">
-                    <a:lumMod val="50000"/>
-                    <a:lumOff val="50000"/>
-                  </a:schemeClr>
-                </a:solidFill>
-                <a:latin typeface="Consolas" pitchFamily="49" charset="0"/>
-                <a:cs typeface="Consolas" pitchFamily="49" charset="0"/>
-              </a:rPr>
-              <a:t>Review</a:t>
+              <a:t>ToReview</a:t>
             </a:r>
             <a:endParaRPr lang="en-US" sz="1400" b="1" dirty="0">
               <a:solidFill>
@@ -4376,8 +4381,8 @@
         </p:nvSpPr>
         <p:spPr>
           <a:xfrm>
-            <a:off x="2270125" y="2256368"/>
-            <a:ext cx="1103123" cy="323165"/>
+            <a:off x="3622416" y="2255529"/>
+            <a:ext cx="1447800" cy="323165"/>
           </a:xfrm>
           <a:prstGeom prst="rect">
             <a:avLst/>
@@ -4394,14 +4399,14 @@
             <a:r>
               <a:rPr lang="en-US" b="1" dirty="0" smtClean="0">
                 <a:solidFill>
-                  <a:srgbClr val="7030A0"/>
+                  <a:srgbClr val="0070C0"/>
                 </a:solidFill>
               </a:rPr>
-              <a:t>Area Lead</a:t>
+              <a:t>Project Mentor</a:t>
             </a:r>
             <a:endParaRPr lang="en-SG" b="1" dirty="0">
               <a:solidFill>
-                <a:srgbClr val="7030A0"/>
+                <a:srgbClr val="0070C0"/>
               </a:solidFill>
             </a:endParaRPr>
           </a:p>
@@ -4451,24 +4456,25 @@
         <p:nvCxnSpPr>
           <p:cNvPr id="64" name="Curved Connector 63"/>
           <p:cNvCxnSpPr>
-            <a:stCxn id="177" idx="3"/>
-            <a:endCxn id="171" idx="3"/>
+            <a:endCxn id="171" idx="0"/>
           </p:cNvCxnSpPr>
           <p:nvPr/>
         </p:nvCxnSpPr>
         <p:spPr>
-          <a:xfrm>
-            <a:off x="3590379" y="1344789"/>
-            <a:ext cx="60871" cy="680068"/>
+          <a:xfrm rot="16200000" flipH="1">
+            <a:off x="3158162" y="1531767"/>
+            <a:ext cx="426503" cy="321550"/>
           </a:xfrm>
           <a:prstGeom prst="curvedConnector3">
             <a:avLst>
-              <a:gd name="adj1" fmla="val 475548"/>
+              <a:gd name="adj1" fmla="val 63102"/>
             </a:avLst>
           </a:prstGeom>
           <a:ln w="28575">
             <a:solidFill>
-              <a:srgbClr val="7030A0"/>
+              <a:schemeClr val="accent6">
+                <a:lumMod val="75000"/>
+              </a:schemeClr>
             </a:solidFill>
             <a:headEnd type="none" w="med" len="med"/>
             <a:tailEnd type="triangle" w="med" len="med"/>
@@ -4590,8 +4596,8 @@
         </p:nvSpPr>
         <p:spPr>
           <a:xfrm>
-            <a:off x="4086797" y="1201381"/>
-            <a:ext cx="1593180" cy="252000"/>
+            <a:off x="4233481" y="1201381"/>
+            <a:ext cx="1417517" cy="252000"/>
           </a:xfrm>
           <a:prstGeom prst="roundRect">
             <a:avLst>
@@ -4708,17 +4714,19 @@
           <p:cNvPr id="129" name="Curved Connector 128"/>
           <p:cNvCxnSpPr>
             <a:stCxn id="178" idx="3"/>
-            <a:endCxn id="139" idx="0"/>
+            <a:endCxn id="139" idx="1"/>
           </p:cNvCxnSpPr>
           <p:nvPr/>
         </p:nvCxnSpPr>
         <p:spPr>
-          <a:xfrm>
-            <a:off x="6502949" y="428720"/>
-            <a:ext cx="339045" cy="772661"/>
-          </a:xfrm>
-          <a:prstGeom prst="curvedConnector2">
-            <a:avLst/>
+          <a:xfrm flipV="1">
+            <a:off x="5650998" y="435229"/>
+            <a:ext cx="374274" cy="100"/>
+          </a:xfrm>
+          <a:prstGeom prst="curvedConnector3">
+            <a:avLst>
+              <a:gd name="adj1" fmla="val 50000"/>
+            </a:avLst>
           </a:prstGeom>
           <a:ln w="28575">
             <a:solidFill>
@@ -4753,7 +4761,7 @@
         </p:nvSpPr>
         <p:spPr>
           <a:xfrm>
-            <a:off x="3794125" y="2061858"/>
+            <a:off x="3557745" y="2024856"/>
             <a:ext cx="1775707" cy="301136"/>
           </a:xfrm>
           <a:prstGeom prst="roundRect">
@@ -4898,7 +4906,7 @@
         </p:nvCxnSpPr>
         <p:spPr>
           <a:xfrm>
-            <a:off x="3292023" y="2429306"/>
+            <a:off x="5051569" y="2428337"/>
             <a:ext cx="342756" cy="0"/>
           </a:xfrm>
           <a:prstGeom prst="straightConnector1">
@@ -4906,7 +4914,7 @@
           </a:prstGeom>
           <a:ln w="28575">
             <a:solidFill>
-              <a:srgbClr val="7030A0"/>
+              <a:srgbClr val="0070C0"/>
             </a:solidFill>
             <a:headEnd type="none" w="med" len="med"/>
             <a:tailEnd type="triangle" w="med" len="med"/>
@@ -5048,8 +5056,8 @@
         </p:nvCxnSpPr>
         <p:spPr>
           <a:xfrm flipV="1">
-            <a:off x="5070377" y="544376"/>
-            <a:ext cx="0" cy="657005"/>
+            <a:off x="5013325" y="557593"/>
+            <a:ext cx="0" cy="643789"/>
           </a:xfrm>
           <a:prstGeom prst="straightConnector1">
             <a:avLst/>
@@ -5077,16 +5085,497 @@
           </a:fontRef>
         </p:style>
       </p:cxnSp>
+      <p:sp>
+        <p:nvSpPr>
+          <p:cNvPr id="1036" name="TextBox 1035"/>
+          <p:cNvSpPr txBox="1"/>
+          <p:nvPr/>
+        </p:nvSpPr>
+        <p:spPr>
+          <a:xfrm>
+            <a:off x="1936193" y="96142"/>
+            <a:ext cx="815985" cy="323165"/>
+          </a:xfrm>
+          <a:prstGeom prst="rect">
+            <a:avLst/>
+          </a:prstGeom>
+          <a:noFill/>
+        </p:spPr>
+        <p:txBody>
+          <a:bodyPr wrap="square" rtlCol="0">
+            <a:spAutoFit/>
+          </a:bodyPr>
+          <a:lstStyle/>
+          <a:p>
+            <a:r>
+              <a:rPr lang="en-US" b="1" dirty="0" smtClean="0">
+                <a:solidFill>
+                  <a:schemeClr val="bg1"/>
+                </a:solidFill>
+              </a:rPr>
+              <a:t>Issues</a:t>
+            </a:r>
+            <a:endParaRPr lang="en-SG" b="1" dirty="0">
+              <a:solidFill>
+                <a:schemeClr val="bg1"/>
+              </a:solidFill>
+            </a:endParaRPr>
+          </a:p>
+        </p:txBody>
+      </p:sp>
+      <p:sp>
+        <p:nvSpPr>
+          <p:cNvPr id="205" name="TextBox 204"/>
+          <p:cNvSpPr txBox="1"/>
+          <p:nvPr/>
+        </p:nvSpPr>
+        <p:spPr>
+          <a:xfrm>
+            <a:off x="6905433" y="61412"/>
+            <a:ext cx="525337" cy="323165"/>
+          </a:xfrm>
+          <a:prstGeom prst="rect">
+            <a:avLst/>
+          </a:prstGeom>
+          <a:noFill/>
+        </p:spPr>
+        <p:txBody>
+          <a:bodyPr wrap="square" rtlCol="0">
+            <a:spAutoFit/>
+          </a:bodyPr>
+          <a:lstStyle/>
+          <a:p>
+            <a:r>
+              <a:rPr lang="en-US" b="1" dirty="0" smtClean="0">
+                <a:solidFill>
+                  <a:schemeClr val="bg1"/>
+                </a:solidFill>
+              </a:rPr>
+              <a:t>PRs</a:t>
+            </a:r>
+            <a:endParaRPr lang="en-SG" b="1" dirty="0">
+              <a:solidFill>
+                <a:schemeClr val="bg1"/>
+              </a:solidFill>
+            </a:endParaRPr>
+          </a:p>
+        </p:txBody>
+      </p:sp>
       <p:cxnSp>
         <p:nvCxnSpPr>
-          <p:cNvPr id="1032" name="Straight Arrow Connector 1031"/>
+          <p:cNvPr id="35" name="Curved Connector 34"/>
+          <p:cNvCxnSpPr>
+            <a:stCxn id="177" idx="1"/>
+            <a:endCxn id="135" idx="2"/>
+          </p:cNvCxnSpPr>
+          <p:nvPr/>
+        </p:nvCxnSpPr>
+        <p:spPr>
+          <a:xfrm rot="10800000">
+            <a:off x="1767779" y="1078947"/>
+            <a:ext cx="146200" cy="265842"/>
+          </a:xfrm>
+          <a:prstGeom prst="curvedConnector2">
+            <a:avLst/>
+          </a:prstGeom>
+          <a:ln w="28575">
+            <a:solidFill>
+              <a:srgbClr val="7030A0"/>
+            </a:solidFill>
+            <a:headEnd type="none" w="med" len="med"/>
+            <a:tailEnd type="triangle" w="med" len="med"/>
+          </a:ln>
+        </p:spPr>
+        <p:style>
+          <a:lnRef idx="1">
+            <a:schemeClr val="accent1"/>
+          </a:lnRef>
+          <a:fillRef idx="0">
+            <a:schemeClr val="accent1"/>
+          </a:fillRef>
+          <a:effectRef idx="0">
+            <a:schemeClr val="accent1"/>
+          </a:effectRef>
+          <a:fontRef idx="minor">
+            <a:schemeClr val="tx1"/>
+          </a:fontRef>
+        </p:style>
+      </p:cxnSp>
+      <p:cxnSp>
+        <p:nvCxnSpPr>
+          <p:cNvPr id="37" name="Straight Arrow Connector 36"/>
           <p:cNvCxnSpPr/>
           <p:nvPr/>
         </p:nvCxnSpPr>
         <p:spPr>
+          <a:xfrm>
+            <a:off x="4784725" y="557593"/>
+            <a:ext cx="0" cy="643788"/>
+          </a:xfrm>
+          <a:prstGeom prst="straightConnector1">
+            <a:avLst/>
+          </a:prstGeom>
+          <a:ln w="28575">
+            <a:solidFill>
+              <a:schemeClr val="accent6">
+                <a:lumMod val="75000"/>
+              </a:schemeClr>
+            </a:solidFill>
+            <a:headEnd type="none" w="med" len="med"/>
+            <a:tailEnd type="triangle" w="med" len="med"/>
+          </a:ln>
+        </p:spPr>
+        <p:style>
+          <a:lnRef idx="1">
+            <a:schemeClr val="accent1"/>
+          </a:lnRef>
+          <a:fillRef idx="0">
+            <a:schemeClr val="accent1"/>
+          </a:fillRef>
+          <a:effectRef idx="0">
+            <a:schemeClr val="accent1"/>
+          </a:effectRef>
+          <a:fontRef idx="minor">
+            <a:schemeClr val="tx1"/>
+          </a:fontRef>
+        </p:style>
+      </p:cxnSp>
+      <p:sp>
+        <p:nvSpPr>
+          <p:cNvPr id="57" name="Rounded Rectangle 56"/>
+          <p:cNvSpPr/>
+          <p:nvPr/>
+        </p:nvSpPr>
+        <p:spPr>
+          <a:xfrm>
+            <a:off x="5972546" y="1201381"/>
+            <a:ext cx="1707780" cy="251999"/>
+          </a:xfrm>
+          <a:prstGeom prst="roundRect">
+            <a:avLst>
+              <a:gd name="adj" fmla="val 9190"/>
+            </a:avLst>
+          </a:prstGeom>
+          <a:solidFill>
+            <a:schemeClr val="bg1"/>
+          </a:solidFill>
+          <a:ln>
+            <a:noFill/>
+          </a:ln>
+        </p:spPr>
+        <p:style>
+          <a:lnRef idx="2">
+            <a:schemeClr val="accent2"/>
+          </a:lnRef>
+          <a:fillRef idx="1">
+            <a:schemeClr val="lt1"/>
+          </a:fillRef>
+          <a:effectRef idx="0">
+            <a:schemeClr val="accent2"/>
+          </a:effectRef>
+          <a:fontRef idx="minor">
+            <a:schemeClr val="dk1"/>
+          </a:fontRef>
+        </p:style>
+        <p:txBody>
+          <a:bodyPr vert="horz" rtlCol="0" anchor="ctr" anchorCtr="0"/>
+          <a:lstStyle/>
+          <a:p>
+            <a:pPr algn="ctr"/>
+            <a:r>
+              <a:rPr lang="en-US" sz="1400" dirty="0" err="1" smtClean="0">
+                <a:solidFill>
+                  <a:schemeClr val="tx1">
+                    <a:lumMod val="50000"/>
+                    <a:lumOff val="50000"/>
+                  </a:schemeClr>
+                </a:solidFill>
+                <a:latin typeface="Consolas" pitchFamily="49" charset="0"/>
+                <a:cs typeface="Consolas" pitchFamily="49" charset="0"/>
+              </a:rPr>
+              <a:t>s.m</a:t>
+            </a:r>
+            <a:r>
+              <a:rPr lang="en-US" sz="1400" b="1" dirty="0" err="1" smtClean="0">
+                <a:solidFill>
+                  <a:schemeClr val="tx1">
+                    <a:lumMod val="50000"/>
+                    <a:lumOff val="50000"/>
+                  </a:schemeClr>
+                </a:solidFill>
+                <a:latin typeface="Consolas" pitchFamily="49" charset="0"/>
+                <a:cs typeface="Consolas" pitchFamily="49" charset="0"/>
+              </a:rPr>
+              <a:t>ergeApproved</a:t>
+            </a:r>
+            <a:endParaRPr lang="en-US" sz="1400" b="1" dirty="0" smtClean="0">
+              <a:solidFill>
+                <a:schemeClr val="tx1">
+                  <a:lumMod val="50000"/>
+                  <a:lumOff val="50000"/>
+                </a:schemeClr>
+              </a:solidFill>
+              <a:latin typeface="Consolas" pitchFamily="49" charset="0"/>
+              <a:cs typeface="Consolas" pitchFamily="49" charset="0"/>
+            </a:endParaRPr>
+          </a:p>
+        </p:txBody>
+      </p:sp>
+      <p:cxnSp>
+        <p:nvCxnSpPr>
+          <p:cNvPr id="73" name="Straight Arrow Connector 72"/>
+          <p:cNvCxnSpPr/>
+          <p:nvPr/>
+        </p:nvCxnSpPr>
+        <p:spPr>
+          <a:xfrm flipV="1">
+            <a:off x="5650998" y="596604"/>
+            <a:ext cx="580224" cy="626856"/>
+          </a:xfrm>
+          <a:prstGeom prst="straightConnector1">
+            <a:avLst/>
+          </a:prstGeom>
+          <a:ln w="28575">
+            <a:solidFill>
+              <a:srgbClr val="00B050"/>
+            </a:solidFill>
+            <a:headEnd type="none" w="med" len="med"/>
+            <a:tailEnd type="triangle" w="med" len="med"/>
+          </a:ln>
+        </p:spPr>
+        <p:style>
+          <a:lnRef idx="1">
+            <a:schemeClr val="accent1"/>
+          </a:lnRef>
+          <a:fillRef idx="0">
+            <a:schemeClr val="accent1"/>
+          </a:fillRef>
+          <a:effectRef idx="0">
+            <a:schemeClr val="accent1"/>
+          </a:effectRef>
+          <a:fontRef idx="minor">
+            <a:schemeClr val="tx1"/>
+          </a:fontRef>
+        </p:style>
+      </p:cxnSp>
+      <p:cxnSp>
+        <p:nvCxnSpPr>
+          <p:cNvPr id="76" name="Straight Arrow Connector 75"/>
+          <p:cNvCxnSpPr/>
+          <p:nvPr/>
+        </p:nvCxnSpPr>
+        <p:spPr>
           <a:xfrm flipH="1">
-            <a:off x="5679977" y="1327381"/>
-            <a:ext cx="361917" cy="0"/>
+            <a:off x="5394325" y="544375"/>
+            <a:ext cx="608066" cy="657006"/>
+          </a:xfrm>
+          <a:prstGeom prst="straightConnector1">
+            <a:avLst/>
+          </a:prstGeom>
+          <a:ln w="28575">
+            <a:solidFill>
+              <a:srgbClr val="0070C0"/>
+            </a:solidFill>
+            <a:headEnd type="none" w="med" len="med"/>
+            <a:tailEnd type="triangle" w="med" len="med"/>
+          </a:ln>
+        </p:spPr>
+        <p:style>
+          <a:lnRef idx="1">
+            <a:schemeClr val="accent1"/>
+          </a:lnRef>
+          <a:fillRef idx="0">
+            <a:schemeClr val="accent1"/>
+          </a:fillRef>
+          <a:effectRef idx="0">
+            <a:schemeClr val="accent1"/>
+          </a:effectRef>
+          <a:fontRef idx="minor">
+            <a:schemeClr val="tx1"/>
+          </a:fontRef>
+        </p:style>
+      </p:cxnSp>
+      <p:cxnSp>
+        <p:nvCxnSpPr>
+          <p:cNvPr id="83" name="Straight Arrow Connector 82"/>
+          <p:cNvCxnSpPr/>
+          <p:nvPr/>
+        </p:nvCxnSpPr>
+        <p:spPr>
+          <a:xfrm>
+            <a:off x="6826436" y="557593"/>
+            <a:ext cx="0" cy="643788"/>
+          </a:xfrm>
+          <a:prstGeom prst="straightConnector1">
+            <a:avLst/>
+          </a:prstGeom>
+          <a:ln w="28575">
+            <a:solidFill>
+              <a:srgbClr val="0070C0"/>
+            </a:solidFill>
+            <a:headEnd type="none" w="med" len="med"/>
+            <a:tailEnd type="triangle" w="med" len="med"/>
+          </a:ln>
+        </p:spPr>
+        <p:style>
+          <a:lnRef idx="1">
+            <a:schemeClr val="accent1"/>
+          </a:lnRef>
+          <a:fillRef idx="0">
+            <a:schemeClr val="accent1"/>
+          </a:fillRef>
+          <a:effectRef idx="0">
+            <a:schemeClr val="accent1"/>
+          </a:effectRef>
+          <a:fontRef idx="minor">
+            <a:schemeClr val="tx1"/>
+          </a:fontRef>
+        </p:style>
+      </p:cxnSp>
+      <p:cxnSp>
+        <p:nvCxnSpPr>
+          <p:cNvPr id="85" name="Curved Connector 84"/>
+          <p:cNvCxnSpPr>
+            <a:stCxn id="120" idx="2"/>
+            <a:endCxn id="171" idx="0"/>
+          </p:cNvCxnSpPr>
+          <p:nvPr/>
+        </p:nvCxnSpPr>
+        <p:spPr>
+          <a:xfrm rot="5400000">
+            <a:off x="4011008" y="974561"/>
+            <a:ext cx="452413" cy="1410052"/>
+          </a:xfrm>
+          <a:prstGeom prst="curvedConnector3">
+            <a:avLst>
+              <a:gd name="adj1" fmla="val 81441"/>
+            </a:avLst>
+          </a:prstGeom>
+          <a:ln w="28575">
+            <a:solidFill>
+              <a:srgbClr val="7030A0"/>
+            </a:solidFill>
+            <a:headEnd type="none" w="med" len="med"/>
+            <a:tailEnd type="triangle" w="med" len="med"/>
+          </a:ln>
+        </p:spPr>
+        <p:style>
+          <a:lnRef idx="1">
+            <a:schemeClr val="accent1"/>
+          </a:lnRef>
+          <a:fillRef idx="0">
+            <a:schemeClr val="accent1"/>
+          </a:fillRef>
+          <a:effectRef idx="0">
+            <a:schemeClr val="accent1"/>
+          </a:effectRef>
+          <a:fontRef idx="minor">
+            <a:schemeClr val="tx1"/>
+          </a:fontRef>
+        </p:style>
+      </p:cxnSp>
+      <p:sp>
+        <p:nvSpPr>
+          <p:cNvPr id="92" name="TextBox 91"/>
+          <p:cNvSpPr txBox="1"/>
+          <p:nvPr/>
+        </p:nvSpPr>
+        <p:spPr>
+          <a:xfrm>
+            <a:off x="3595179" y="1595228"/>
+            <a:ext cx="1057275" cy="230832"/>
+          </a:xfrm>
+          <a:prstGeom prst="rect">
+            <a:avLst/>
+          </a:prstGeom>
+          <a:noFill/>
+        </p:spPr>
+        <p:txBody>
+          <a:bodyPr wrap="square" rtlCol="0">
+            <a:spAutoFit/>
+          </a:bodyPr>
+          <a:lstStyle/>
+          <a:p>
+            <a:pPr algn="r"/>
+            <a:r>
+              <a:rPr lang="en-US" sz="900" dirty="0" smtClean="0">
+                <a:solidFill>
+                  <a:schemeClr val="bg1">
+                    <a:lumMod val="50000"/>
+                  </a:schemeClr>
+                </a:solidFill>
+              </a:rPr>
+              <a:t>Abandoned by </a:t>
+            </a:r>
+            <a:r>
+              <a:rPr lang="en-US" sz="900" dirty="0" err="1" smtClean="0">
+                <a:solidFill>
+                  <a:schemeClr val="bg1">
+                    <a:lumMod val="50000"/>
+                  </a:schemeClr>
+                </a:solidFill>
+              </a:rPr>
+              <a:t>dev</a:t>
+            </a:r>
+            <a:endParaRPr lang="en-SG" sz="900" dirty="0">
+              <a:solidFill>
+                <a:schemeClr val="bg1">
+                  <a:lumMod val="50000"/>
+                </a:schemeClr>
+              </a:solidFill>
+            </a:endParaRPr>
+          </a:p>
+        </p:txBody>
+      </p:sp>
+      <p:sp>
+        <p:nvSpPr>
+          <p:cNvPr id="99" name="TextBox 98"/>
+          <p:cNvSpPr txBox="1"/>
+          <p:nvPr/>
+        </p:nvSpPr>
+        <p:spPr>
+          <a:xfrm>
+            <a:off x="2259718" y="2246043"/>
+            <a:ext cx="984919" cy="323165"/>
+          </a:xfrm>
+          <a:prstGeom prst="rect">
+            <a:avLst/>
+          </a:prstGeom>
+          <a:noFill/>
+        </p:spPr>
+        <p:txBody>
+          <a:bodyPr wrap="square" rtlCol="0">
+            <a:spAutoFit/>
+          </a:bodyPr>
+          <a:lstStyle/>
+          <a:p>
+            <a:pPr algn="r"/>
+            <a:r>
+              <a:rPr lang="en-US" b="1" dirty="0" smtClean="0">
+                <a:solidFill>
+                  <a:srgbClr val="7030A0"/>
+                </a:solidFill>
+              </a:rPr>
+              <a:t>Area Lead</a:t>
+            </a:r>
+            <a:endParaRPr lang="en-SG" b="1" dirty="0">
+              <a:solidFill>
+                <a:srgbClr val="7030A0"/>
+              </a:solidFill>
+            </a:endParaRPr>
+          </a:p>
+        </p:txBody>
+      </p:sp>
+      <p:cxnSp>
+        <p:nvCxnSpPr>
+          <p:cNvPr id="100" name="Straight Arrow Connector 99"/>
+          <p:cNvCxnSpPr/>
+          <p:nvPr/>
+        </p:nvCxnSpPr>
+        <p:spPr>
+          <a:xfrm>
+            <a:off x="3241747" y="2417951"/>
+            <a:ext cx="342756" cy="0"/>
           </a:xfrm>
           <a:prstGeom prst="straightConnector1">
             <a:avLst/>
@@ -5116,14 +5605,14 @@
       </p:cxnSp>
       <p:sp>
         <p:nvSpPr>
-          <p:cNvPr id="1036" name="TextBox 1035"/>
+          <p:cNvPr id="105" name="TextBox 104"/>
           <p:cNvSpPr txBox="1"/>
           <p:nvPr/>
         </p:nvSpPr>
         <p:spPr>
           <a:xfrm>
-            <a:off x="1936193" y="96142"/>
-            <a:ext cx="815985" cy="323165"/>
+            <a:off x="776448" y="1142324"/>
+            <a:ext cx="1057275" cy="230832"/>
           </a:xfrm>
           <a:prstGeom prst="rect">
             <a:avLst/>
@@ -5136,125 +5625,9 @@
           </a:bodyPr>
           <a:lstStyle/>
           <a:p>
-            <a:r>
-              <a:rPr lang="en-US" b="1" dirty="0" smtClean="0">
-                <a:solidFill>
-                  <a:schemeClr val="bg1"/>
-                </a:solidFill>
-              </a:rPr>
-              <a:t>Issues</a:t>
-            </a:r>
-            <a:endParaRPr lang="en-SG" b="1" dirty="0">
-              <a:solidFill>
-                <a:schemeClr val="bg1"/>
-              </a:solidFill>
-            </a:endParaRPr>
-          </a:p>
-        </p:txBody>
-      </p:sp>
-      <p:sp>
-        <p:nvSpPr>
-          <p:cNvPr id="205" name="TextBox 204"/>
-          <p:cNvSpPr txBox="1"/>
-          <p:nvPr/>
-        </p:nvSpPr>
-        <p:spPr>
-          <a:xfrm>
-            <a:off x="6795551" y="209011"/>
-            <a:ext cx="815985" cy="323165"/>
-          </a:xfrm>
-          <a:prstGeom prst="rect">
-            <a:avLst/>
-          </a:prstGeom>
-          <a:noFill/>
-        </p:spPr>
-        <p:txBody>
-          <a:bodyPr wrap="square" rtlCol="0">
-            <a:spAutoFit/>
-          </a:bodyPr>
-          <a:lstStyle/>
-          <a:p>
-            <a:r>
-              <a:rPr lang="en-US" b="1" dirty="0" smtClean="0">
-                <a:solidFill>
-                  <a:schemeClr val="bg1"/>
-                </a:solidFill>
-              </a:rPr>
-              <a:t>PRs</a:t>
-            </a:r>
-            <a:endParaRPr lang="en-SG" b="1" dirty="0">
-              <a:solidFill>
-                <a:schemeClr val="bg1"/>
-              </a:solidFill>
-            </a:endParaRPr>
-          </a:p>
-        </p:txBody>
-      </p:sp>
-      <p:cxnSp>
-        <p:nvCxnSpPr>
-          <p:cNvPr id="35" name="Curved Connector 34"/>
-          <p:cNvCxnSpPr>
-            <a:stCxn id="177" idx="1"/>
-            <a:endCxn id="135" idx="2"/>
-          </p:cNvCxnSpPr>
-          <p:nvPr/>
-        </p:nvCxnSpPr>
-        <p:spPr>
-          <a:xfrm rot="10800000">
-            <a:off x="1767779" y="1078947"/>
-            <a:ext cx="146200" cy="265842"/>
-          </a:xfrm>
-          <a:prstGeom prst="curvedConnector2">
-            <a:avLst/>
-          </a:prstGeom>
-          <a:ln w="28575">
-            <a:solidFill>
-              <a:srgbClr val="00B050"/>
-            </a:solidFill>
-            <a:headEnd type="none" w="med" len="med"/>
-            <a:tailEnd type="triangle" w="med" len="med"/>
-          </a:ln>
-        </p:spPr>
-        <p:style>
-          <a:lnRef idx="1">
-            <a:schemeClr val="accent1"/>
-          </a:lnRef>
-          <a:fillRef idx="0">
-            <a:schemeClr val="accent1"/>
-          </a:fillRef>
-          <a:effectRef idx="0">
-            <a:schemeClr val="accent1"/>
-          </a:effectRef>
-          <a:fontRef idx="minor">
-            <a:schemeClr val="tx1"/>
-          </a:fontRef>
-        </p:style>
-      </p:cxnSp>
-      <p:sp>
-        <p:nvSpPr>
-          <p:cNvPr id="38" name="TextBox 37"/>
-          <p:cNvSpPr txBox="1"/>
-          <p:nvPr/>
-        </p:nvSpPr>
-        <p:spPr>
-          <a:xfrm>
-            <a:off x="765739" y="1067594"/>
-            <a:ext cx="1002040" cy="461665"/>
-          </a:xfrm>
-          <a:prstGeom prst="rect">
-            <a:avLst/>
-          </a:prstGeom>
-          <a:noFill/>
-        </p:spPr>
-        <p:txBody>
-          <a:bodyPr wrap="square" rtlCol="0">
-            <a:spAutoFit/>
-          </a:bodyPr>
-          <a:lstStyle/>
-          <a:p>
             <a:pPr algn="r"/>
             <a:r>
-              <a:rPr lang="en-US" sz="1200" dirty="0" smtClean="0">
+              <a:rPr lang="en-US" sz="900" dirty="0" smtClean="0">
                 <a:solidFill>
                   <a:schemeClr val="bg1">
                     <a:lumMod val="50000"/>
@@ -5264,7 +5637,7 @@
               <a:t>Abandoned by </a:t>
             </a:r>
             <a:r>
-              <a:rPr lang="en-US" sz="1200" dirty="0" err="1" smtClean="0">
+              <a:rPr lang="en-US" sz="900" dirty="0" err="1" smtClean="0">
                 <a:solidFill>
                   <a:schemeClr val="bg1">
                     <a:lumMod val="50000"/>
@@ -5273,7 +5646,7 @@
               </a:rPr>
               <a:t>dev</a:t>
             </a:r>
-            <a:endParaRPr lang="en-SG" sz="1200" dirty="0">
+            <a:endParaRPr lang="en-SG" sz="900" dirty="0">
               <a:solidFill>
                 <a:schemeClr val="bg1">
                   <a:lumMod val="50000"/>

</xml_diff>

<commit_message>
removed s.Accepted and s.Ongoing from issue lifecycle
</commit_message>
<xml_diff>
--- a/doc/diagrams/IssueLifecycle.pptx
+++ b/doc/diagrams/IssueLifecycle.pptx
@@ -3710,7 +3710,7 @@
           <a:p>
             <a:pPr algn="ctr"/>
             <a:r>
-              <a:rPr lang="en-US" sz="1400" dirty="0" err="1" smtClean="0">
+              <a:rPr lang="en-US" sz="1400" b="1" dirty="0" smtClean="0">
                 <a:solidFill>
                   <a:schemeClr val="tx1">
                     <a:lumMod val="50000"/>
@@ -3720,20 +3720,7 @@
                 <a:latin typeface="Consolas" pitchFamily="49" charset="0"/>
                 <a:cs typeface="Consolas" pitchFamily="49" charset="0"/>
               </a:rPr>
-              <a:t>s.</a:t>
-            </a:r>
-            <a:r>
-              <a:rPr lang="en-US" sz="1400" b="1" dirty="0" err="1" smtClean="0">
-                <a:solidFill>
-                  <a:schemeClr val="tx1">
-                    <a:lumMod val="50000"/>
-                    <a:lumOff val="50000"/>
-                  </a:schemeClr>
-                </a:solidFill>
-                <a:latin typeface="Consolas" pitchFamily="49" charset="0"/>
-                <a:cs typeface="Consolas" pitchFamily="49" charset="0"/>
-              </a:rPr>
-              <a:t>Accepted</a:t>
+              <a:t>Prioritized</a:t>
             </a:r>
             <a:endParaRPr lang="en-US" sz="1400" b="1" dirty="0" smtClean="0">
               <a:solidFill>
@@ -4089,7 +4076,7 @@
           <a:p>
             <a:pPr algn="ctr"/>
             <a:r>
-              <a:rPr lang="en-US" sz="1400" dirty="0" err="1" smtClean="0">
+              <a:rPr lang="en-US" sz="1400" b="1" smtClean="0">
                 <a:solidFill>
                   <a:schemeClr val="tx1">
                     <a:lumMod val="50000"/>
@@ -4099,20 +4086,7 @@
                 <a:latin typeface="Consolas" pitchFamily="49" charset="0"/>
                 <a:cs typeface="Consolas" pitchFamily="49" charset="0"/>
               </a:rPr>
-              <a:t>s.</a:t>
-            </a:r>
-            <a:r>
-              <a:rPr lang="en-US" sz="1400" b="1" dirty="0" err="1" smtClean="0">
-                <a:solidFill>
-                  <a:schemeClr val="tx1">
-                    <a:lumMod val="50000"/>
-                    <a:lumOff val="50000"/>
-                  </a:schemeClr>
-                </a:solidFill>
-                <a:latin typeface="Consolas" pitchFamily="49" charset="0"/>
-                <a:cs typeface="Consolas" pitchFamily="49" charset="0"/>
-              </a:rPr>
-              <a:t>Ongoing</a:t>
+              <a:t>Assigned</a:t>
             </a:r>
             <a:endParaRPr lang="en-US" sz="1400" b="1" dirty="0" smtClean="0">
               <a:solidFill>

</xml_diff>